<commit_message>
Status in kleur toegevoegd
</commit_message>
<xml_diff>
--- a/Submutatiescenario_s.pptx
+++ b/Submutatiescenario_s.pptx
@@ -146,6 +146,13 @@
       </p:ext>
     </p:extLst>
   </p:cmAuthor>
+  <p:cmAuthor id="2" name="Kasper Lingbeek" initials="KL" lastIdx="3" clrIdx="1">
+    <p:extLst>
+      <p:ext uri="{19B8F6BF-5375-455C-9EA6-DF929625EA0E}">
+        <p15:presenceInfo xmlns:p15="http://schemas.microsoft.com/office/powerpoint/2012/main" userId="S::k.lingbeek@geonovum.nl::f2390735-05ad-4371-bf81-fc311706dfcc" providerId="AD"/>
+      </p:ext>
+    </p:extLst>
+  </p:cmAuthor>
 </p:cmAuthorLst>
 </file>
 
@@ -155,6 +162,48 @@
     <p1510:client id="{DC44A040-4C88-432F-B725-85B17EB6140D}" v="6" dt="2020-02-13T15:42:18.335"/>
   </p1510:revLst>
 </p1510:revInfo>
+</file>
+
+<file path=ppt/comments/comment1.xml><?xml version="1.0" encoding="utf-8"?>
+<p:cmLst xmlns:a="http://schemas.openxmlformats.org/drawingml/2006/main" xmlns:r="http://schemas.openxmlformats.org/officeDocument/2006/relationships" xmlns:p="http://schemas.openxmlformats.org/presentationml/2006/main">
+  <p:cm authorId="2" dt="2020-09-23T10:25:01.716" idx="1">
+    <p:pos x="6430" y="871"/>
+    <p:text>Verkeerd plaatje?</p:text>
+    <p:extLst>
+      <p:ext uri="{C676402C-5697-4E1C-873F-D02D1690AC5C}">
+        <p15:threadingInfo xmlns:p15="http://schemas.microsoft.com/office/powerpoint/2012/main" timeZoneBias="-120"/>
+      </p:ext>
+    </p:extLst>
+  </p:cm>
+</p:cmLst>
+</file>
+
+<file path=ppt/comments/comment2.xml><?xml version="1.0" encoding="utf-8"?>
+<p:cmLst xmlns:a="http://schemas.openxmlformats.org/drawingml/2006/main" xmlns:r="http://schemas.openxmlformats.org/officeDocument/2006/relationships" xmlns:p="http://schemas.openxmlformats.org/presentationml/2006/main">
+  <p:cm authorId="2" dt="2020-09-23T11:35:13.048" idx="2">
+    <p:pos x="6805" y="647"/>
+    <p:text>Dit wordt gedaan bij artikel 2.10, item d</p:text>
+    <p:extLst>
+      <p:ext uri="{C676402C-5697-4E1C-873F-D02D1690AC5C}">
+        <p15:threadingInfo xmlns:p15="http://schemas.microsoft.com/office/powerpoint/2012/main" timeZoneBias="-120"/>
+      </p:ext>
+    </p:extLst>
+  </p:cm>
+</p:cmLst>
+</file>
+
+<file path=ppt/comments/comment3.xml><?xml version="1.0" encoding="utf-8"?>
+<p:cmLst xmlns:a="http://schemas.openxmlformats.org/drawingml/2006/main" xmlns:r="http://schemas.openxmlformats.org/officeDocument/2006/relationships" xmlns:p="http://schemas.openxmlformats.org/presentationml/2006/main">
+  <p:cm authorId="2" dt="2020-09-23T11:36:57.231" idx="3">
+    <p:pos x="6886" y="718"/>
+    <p:text>Dit wordt gedaan bij artikel 2.10, item f</p:text>
+    <p:extLst>
+      <p:ext uri="{C676402C-5697-4E1C-873F-D02D1690AC5C}">
+        <p15:threadingInfo xmlns:p15="http://schemas.microsoft.com/office/powerpoint/2012/main" timeZoneBias="-120"/>
+      </p:ext>
+    </p:extLst>
+  </p:cm>
+</p:cmLst>
 </file>
 
 <file path=ppt/slideLayouts/slideLayout1.xml><?xml version="1.0" encoding="utf-8"?>
@@ -304,7 +353,7 @@
           <a:p>
             <a:fld id="{02A6C647-4F39-4E22-BFA0-7A057A8C404A}" type="datetimeFigureOut">
               <a:rPr lang="nl-NL" smtClean="0"/>
-              <a:t>21-8-2020</a:t>
+              <a:t>29-9-2020</a:t>
             </a:fld>
             <a:endParaRPr lang="nl-NL"/>
           </a:p>
@@ -502,7 +551,7 @@
           <a:p>
             <a:fld id="{02A6C647-4F39-4E22-BFA0-7A057A8C404A}" type="datetimeFigureOut">
               <a:rPr lang="nl-NL" smtClean="0"/>
-              <a:t>21-8-2020</a:t>
+              <a:t>29-9-2020</a:t>
             </a:fld>
             <a:endParaRPr lang="nl-NL"/>
           </a:p>
@@ -710,7 +759,7 @@
           <a:p>
             <a:fld id="{02A6C647-4F39-4E22-BFA0-7A057A8C404A}" type="datetimeFigureOut">
               <a:rPr lang="nl-NL" smtClean="0"/>
-              <a:t>21-8-2020</a:t>
+              <a:t>29-9-2020</a:t>
             </a:fld>
             <a:endParaRPr lang="nl-NL"/>
           </a:p>
@@ -908,7 +957,7 @@
           <a:p>
             <a:fld id="{02A6C647-4F39-4E22-BFA0-7A057A8C404A}" type="datetimeFigureOut">
               <a:rPr lang="nl-NL" smtClean="0"/>
-              <a:t>21-8-2020</a:t>
+              <a:t>29-9-2020</a:t>
             </a:fld>
             <a:endParaRPr lang="nl-NL"/>
           </a:p>
@@ -1183,7 +1232,7 @@
           <a:p>
             <a:fld id="{02A6C647-4F39-4E22-BFA0-7A057A8C404A}" type="datetimeFigureOut">
               <a:rPr lang="nl-NL" smtClean="0"/>
-              <a:t>21-8-2020</a:t>
+              <a:t>29-9-2020</a:t>
             </a:fld>
             <a:endParaRPr lang="nl-NL"/>
           </a:p>
@@ -1448,7 +1497,7 @@
           <a:p>
             <a:fld id="{02A6C647-4F39-4E22-BFA0-7A057A8C404A}" type="datetimeFigureOut">
               <a:rPr lang="nl-NL" smtClean="0"/>
-              <a:t>21-8-2020</a:t>
+              <a:t>29-9-2020</a:t>
             </a:fld>
             <a:endParaRPr lang="nl-NL"/>
           </a:p>
@@ -1860,7 +1909,7 @@
           <a:p>
             <a:fld id="{02A6C647-4F39-4E22-BFA0-7A057A8C404A}" type="datetimeFigureOut">
               <a:rPr lang="nl-NL" smtClean="0"/>
-              <a:t>21-8-2020</a:t>
+              <a:t>29-9-2020</a:t>
             </a:fld>
             <a:endParaRPr lang="nl-NL"/>
           </a:p>
@@ -2001,7 +2050,7 @@
           <a:p>
             <a:fld id="{02A6C647-4F39-4E22-BFA0-7A057A8C404A}" type="datetimeFigureOut">
               <a:rPr lang="nl-NL" smtClean="0"/>
-              <a:t>21-8-2020</a:t>
+              <a:t>29-9-2020</a:t>
             </a:fld>
             <a:endParaRPr lang="nl-NL"/>
           </a:p>
@@ -2114,7 +2163,7 @@
           <a:p>
             <a:fld id="{02A6C647-4F39-4E22-BFA0-7A057A8C404A}" type="datetimeFigureOut">
               <a:rPr lang="nl-NL" smtClean="0"/>
-              <a:t>21-8-2020</a:t>
+              <a:t>29-9-2020</a:t>
             </a:fld>
             <a:endParaRPr lang="nl-NL"/>
           </a:p>
@@ -2425,7 +2474,7 @@
           <a:p>
             <a:fld id="{02A6C647-4F39-4E22-BFA0-7A057A8C404A}" type="datetimeFigureOut">
               <a:rPr lang="nl-NL" smtClean="0"/>
-              <a:t>21-8-2020</a:t>
+              <a:t>29-9-2020</a:t>
             </a:fld>
             <a:endParaRPr lang="nl-NL"/>
           </a:p>
@@ -2713,7 +2762,7 @@
           <a:p>
             <a:fld id="{02A6C647-4F39-4E22-BFA0-7A057A8C404A}" type="datetimeFigureOut">
               <a:rPr lang="nl-NL" smtClean="0"/>
-              <a:t>21-8-2020</a:t>
+              <a:t>29-9-2020</a:t>
             </a:fld>
             <a:endParaRPr lang="nl-NL"/>
           </a:p>
@@ -2954,7 +3003,7 @@
           <a:p>
             <a:fld id="{02A6C647-4F39-4E22-BFA0-7A057A8C404A}" type="datetimeFigureOut">
               <a:rPr lang="nl-NL" smtClean="0"/>
-              <a:t>21-8-2020</a:t>
+              <a:t>29-9-2020</a:t>
             </a:fld>
             <a:endParaRPr lang="nl-NL"/>
           </a:p>
@@ -8167,8 +8216,16 @@
           <a:lstStyle/>
           <a:p>
             <a:r>
-              <a:rPr lang="nl-NL" dirty="0"/>
-              <a:t>0 	</a:t>
+              <a:rPr lang="nl-NL" dirty="0">
+                <a:solidFill>
+                  <a:srgbClr val="00B050"/>
+                </a:solidFill>
+              </a:rPr>
+              <a:t>0</a:t>
+            </a:r>
+            <a:r>
+              <a:rPr lang="nl-NL" dirty="0"/>
+              <a:t> 	</a:t>
             </a:r>
             <a:r>
               <a:rPr lang="nl-NL" dirty="0" err="1"/>
@@ -8181,15 +8238,31 @@
           </a:p>
           <a:p>
             <a:r>
-              <a:rPr lang="nl-NL" dirty="0"/>
-              <a:t>2	Wijziging artikelstructuur (toevoegen, verwijderen, wijzigen)</a:t>
+              <a:rPr lang="nl-NL" dirty="0">
+                <a:solidFill>
+                  <a:srgbClr val="00B050"/>
+                </a:solidFill>
+              </a:rPr>
+              <a:t>2</a:t>
+            </a:r>
+            <a:r>
+              <a:rPr lang="nl-NL" dirty="0"/>
+              <a:t>	Wijziging artikelstructuur (toevoegen, verwijderen, wijzigen)</a:t>
             </a:r>
           </a:p>
           <a:p>
             <a:pPr lvl="1"/>
             <a:r>
+              <a:rPr lang="nl-NL" sz="2000" b="1" dirty="0">
+                <a:solidFill>
+                  <a:srgbClr val="00B050"/>
+                </a:solidFill>
+              </a:rPr>
+              <a:t>2a</a:t>
+            </a:r>
+            <a:r>
               <a:rPr lang="nl-NL" sz="2000" b="1" dirty="0"/>
-              <a:t>2a) </a:t>
+              <a:t>) </a:t>
             </a:r>
             <a:r>
               <a:rPr lang="nl-NL" sz="2000" dirty="0"/>
@@ -8199,8 +8272,16 @@
           <a:p>
             <a:pPr lvl="1"/>
             <a:r>
+              <a:rPr lang="nl-NL" sz="2000" b="1" dirty="0">
+                <a:solidFill>
+                  <a:srgbClr val="00B050"/>
+                </a:solidFill>
+              </a:rPr>
+              <a:t>2b</a:t>
+            </a:r>
+            <a:r>
               <a:rPr lang="nl-NL" sz="2000" b="1" dirty="0"/>
-              <a:t>2b) </a:t>
+              <a:t>) </a:t>
             </a:r>
             <a:r>
               <a:rPr lang="nl-NL" sz="2000" dirty="0"/>
@@ -8210,8 +8291,16 @@
           <a:p>
             <a:pPr lvl="1"/>
             <a:r>
+              <a:rPr lang="nl-NL" sz="2000" b="1" dirty="0">
+                <a:solidFill>
+                  <a:srgbClr val="00B050"/>
+                </a:solidFill>
+              </a:rPr>
+              <a:t>2c</a:t>
+            </a:r>
+            <a:r>
               <a:rPr lang="nl-NL" sz="2000" b="1" dirty="0"/>
-              <a:t>2c) </a:t>
+              <a:t>) </a:t>
             </a:r>
             <a:r>
               <a:rPr lang="nl-NL" sz="2000" dirty="0"/>
@@ -8221,8 +8310,16 @@
           <a:p>
             <a:pPr lvl="1"/>
             <a:r>
+              <a:rPr lang="nl-NL" sz="2000" b="1" dirty="0">
+                <a:solidFill>
+                  <a:srgbClr val="00B050"/>
+                </a:solidFill>
+              </a:rPr>
+              <a:t>2d</a:t>
+            </a:r>
+            <a:r>
               <a:rPr lang="nl-NL" sz="2000" b="1" dirty="0"/>
-              <a:t>2d) </a:t>
+              <a:t>) </a:t>
             </a:r>
             <a:r>
               <a:rPr lang="nl-NL" sz="2000" dirty="0"/>
@@ -8232,8 +8329,16 @@
           <a:p>
             <a:pPr lvl="1"/>
             <a:r>
+              <a:rPr lang="nl-NL" sz="2000" b="1" dirty="0">
+                <a:solidFill>
+                  <a:srgbClr val="00B050"/>
+                </a:solidFill>
+              </a:rPr>
+              <a:t>2e</a:t>
+            </a:r>
+            <a:r>
               <a:rPr lang="nl-NL" sz="2000" b="1" dirty="0"/>
-              <a:t>2e) </a:t>
+              <a:t>) </a:t>
             </a:r>
             <a:r>
               <a:rPr lang="nl-NL" sz="2000" dirty="0"/>
@@ -8249,7 +8354,11 @@
           <a:p>
             <a:pPr lvl="1"/>
             <a:r>
-              <a:rPr lang="nl-NL" sz="2000" b="1" dirty="0"/>
+              <a:rPr lang="nl-NL" sz="2000" b="1" dirty="0">
+                <a:solidFill>
+                  <a:srgbClr val="00B050"/>
+                </a:solidFill>
+              </a:rPr>
               <a:t>3a</a:t>
             </a:r>
             <a:r>
@@ -8260,7 +8369,11 @@
           <a:p>
             <a:pPr lvl="1"/>
             <a:r>
-              <a:rPr lang="nl-NL" sz="2000" b="1" dirty="0"/>
+              <a:rPr lang="nl-NL" sz="2000" b="1" dirty="0">
+                <a:solidFill>
+                  <a:srgbClr val="00B050"/>
+                </a:solidFill>
+              </a:rPr>
               <a:t>3b</a:t>
             </a:r>
             <a:r>
@@ -8279,7 +8392,11 @@
           <a:p>
             <a:pPr lvl="1"/>
             <a:r>
-              <a:rPr lang="nl-NL" sz="2000" b="1" dirty="0"/>
+              <a:rPr lang="nl-NL" sz="2000" b="1" dirty="0">
+                <a:solidFill>
+                  <a:srgbClr val="00B050"/>
+                </a:solidFill>
+              </a:rPr>
               <a:t>3c</a:t>
             </a:r>
             <a:r>
@@ -8374,7 +8491,11 @@
           <a:p>
             <a:pPr lvl="1"/>
             <a:r>
-              <a:rPr lang="nl-NL" sz="2000" b="1" dirty="0"/>
+              <a:rPr lang="nl-NL" sz="2000" b="1" dirty="0">
+                <a:solidFill>
+                  <a:schemeClr val="accent2"/>
+                </a:solidFill>
+              </a:rPr>
               <a:t>10a</a:t>
             </a:r>
             <a:r>
@@ -8385,7 +8506,11 @@
           <a:p>
             <a:pPr lvl="1"/>
             <a:r>
-              <a:rPr lang="nl-NL" sz="2000" b="1" dirty="0"/>
+              <a:rPr lang="nl-NL" sz="2000" b="1" dirty="0">
+                <a:solidFill>
+                  <a:schemeClr val="accent2"/>
+                </a:solidFill>
+              </a:rPr>
               <a:t>10b</a:t>
             </a:r>
             <a:r>
@@ -8396,7 +8521,11 @@
           <a:p>
             <a:pPr lvl="1"/>
             <a:r>
-              <a:rPr lang="nl-NL" sz="2000" b="1" dirty="0"/>
+              <a:rPr lang="nl-NL" sz="2000" b="1" dirty="0">
+                <a:solidFill>
+                  <a:schemeClr val="accent2"/>
+                </a:solidFill>
+              </a:rPr>
               <a:t>10c</a:t>
             </a:r>
             <a:r>
@@ -8407,7 +8536,11 @@
           <a:p>
             <a:pPr lvl="1"/>
             <a:r>
-              <a:rPr lang="nl-NL" sz="2000" b="1" dirty="0"/>
+              <a:rPr lang="nl-NL" sz="2000" b="1" dirty="0">
+                <a:solidFill>
+                  <a:schemeClr val="accent2"/>
+                </a:solidFill>
+              </a:rPr>
               <a:t>10d</a:t>
             </a:r>
             <a:r>
@@ -8418,7 +8551,11 @@
           <a:p>
             <a:pPr lvl="1"/>
             <a:r>
-              <a:rPr lang="nl-NL" sz="2000" b="1" dirty="0"/>
+              <a:rPr lang="nl-NL" sz="2000" b="1" dirty="0">
+                <a:solidFill>
+                  <a:schemeClr val="accent2"/>
+                </a:solidFill>
+              </a:rPr>
               <a:t>10e</a:t>
             </a:r>
             <a:r>

</xml_diff>

<commit_message>
aangepast plaatje bij 2d2e
</commit_message>
<xml_diff>
--- a/Submutatiescenario_s.pptx
+++ b/Submutatiescenario_s.pptx
@@ -166,20 +166,6 @@
 
 <file path=ppt/comments/comment1.xml><?xml version="1.0" encoding="utf-8"?>
 <p:cmLst xmlns:a="http://schemas.openxmlformats.org/drawingml/2006/main" xmlns:r="http://schemas.openxmlformats.org/officeDocument/2006/relationships" xmlns:p="http://schemas.openxmlformats.org/presentationml/2006/main">
-  <p:cm authorId="2" dt="2020-09-23T10:25:01.716" idx="1">
-    <p:pos x="6430" y="871"/>
-    <p:text>Verkeerd plaatje?</p:text>
-    <p:extLst>
-      <p:ext uri="{C676402C-5697-4E1C-873F-D02D1690AC5C}">
-        <p15:threadingInfo xmlns:p15="http://schemas.microsoft.com/office/powerpoint/2012/main" timeZoneBias="-120"/>
-      </p:ext>
-    </p:extLst>
-  </p:cm>
-</p:cmLst>
-</file>
-
-<file path=ppt/comments/comment2.xml><?xml version="1.0" encoding="utf-8"?>
-<p:cmLst xmlns:a="http://schemas.openxmlformats.org/drawingml/2006/main" xmlns:r="http://schemas.openxmlformats.org/officeDocument/2006/relationships" xmlns:p="http://schemas.openxmlformats.org/presentationml/2006/main">
   <p:cm authorId="2" dt="2020-09-23T11:35:13.048" idx="2">
     <p:pos x="6805" y="647"/>
     <p:text>Dit wordt gedaan bij artikel 2.10, item d</p:text>
@@ -192,7 +178,7 @@
 </p:cmLst>
 </file>
 
-<file path=ppt/comments/comment3.xml><?xml version="1.0" encoding="utf-8"?>
+<file path=ppt/comments/comment2.xml><?xml version="1.0" encoding="utf-8"?>
 <p:cmLst xmlns:a="http://schemas.openxmlformats.org/drawingml/2006/main" xmlns:r="http://schemas.openxmlformats.org/officeDocument/2006/relationships" xmlns:p="http://schemas.openxmlformats.org/presentationml/2006/main">
   <p:cm authorId="2" dt="2020-09-23T11:36:57.231" idx="3">
     <p:pos x="6886" y="718"/>
@@ -3508,15 +3494,15 @@
       </p:sp>
       <p:pic>
         <p:nvPicPr>
-          <p:cNvPr id="6" name="Content Placeholder 8" descr="A screenshot of a cell phone&#10;&#10;Description automatically generated">
-            <a:extLst>
-              <a:ext uri="{FF2B5EF4-FFF2-40B4-BE49-F238E27FC236}">
-                <a16:creationId xmlns:a16="http://schemas.microsoft.com/office/drawing/2014/main" id="{938CFC9A-8846-424D-8814-4318AB4C29EB}"/>
+          <p:cNvPr id="4" name="Afbeelding 3">
+            <a:extLst>
+              <a:ext uri="{FF2B5EF4-FFF2-40B4-BE49-F238E27FC236}">
+                <a16:creationId xmlns:a16="http://schemas.microsoft.com/office/drawing/2014/main" id="{DA7CD9DF-27AE-4230-97B7-17E04BC107A6}"/>
               </a:ext>
             </a:extLst>
           </p:cNvPr>
           <p:cNvPicPr>
-            <a:picLocks noGrp="1" noChangeAspect="1"/>
+            <a:picLocks noChangeAspect="1"/>
           </p:cNvPicPr>
           <p:nvPr/>
         </p:nvPicPr>
@@ -3534,8 +3520,8 @@
         </p:blipFill>
         <p:spPr>
           <a:xfrm>
-            <a:off x="838200" y="1383076"/>
-            <a:ext cx="9368822" cy="5271719"/>
+            <a:off x="664849" y="1367059"/>
+            <a:ext cx="10162053" cy="5718060"/>
           </a:xfrm>
           <a:prstGeom prst="rect">
             <a:avLst/>
@@ -9564,15 +9550,6 @@
 </file>
 
 <file path=customXml/item1.xml><?xml version="1.0" encoding="utf-8"?>
-<?mso-contentType ?>
-<FormTemplates xmlns="http://schemas.microsoft.com/sharepoint/v3/contenttype/forms">
-  <Display>DocumentLibraryForm</Display>
-  <Edit>DocumentLibraryForm</Edit>
-  <New>DocumentLibraryForm</New>
-</FormTemplates>
-</file>
-
-<file path=customXml/item2.xml><?xml version="1.0" encoding="utf-8"?>
 <ct:contentTypeSchema xmlns:ct="http://schemas.microsoft.com/office/2006/metadata/contentType" xmlns:ma="http://schemas.microsoft.com/office/2006/metadata/properties/metaAttributes" ct:_="" ma:_="" ma:contentTypeName="Document" ma:contentTypeID="0x0101003ADD3040E3157B4E913BCA65F34844D7" ma:contentTypeVersion="10" ma:contentTypeDescription="Een nieuw document maken." ma:contentTypeScope="" ma:versionID="c1765059aa1475931adc12138fdcfd8c">
   <xsd:schema xmlns:xsd="http://www.w3.org/2001/XMLSchema" xmlns:xs="http://www.w3.org/2001/XMLSchema" xmlns:p="http://schemas.microsoft.com/office/2006/metadata/properties" xmlns:ns2="aafb19fa-82be-411d-a6df-c75e9235a4ea" xmlns:ns3="3dfebdfe-2b22-40ba-8672-9fbc9b4066c4" targetNamespace="http://schemas.microsoft.com/office/2006/metadata/properties" ma:root="true" ma:fieldsID="42d79c55539af1f9f274032ce6041302" ns2:_="" ns3:_="">
     <xsd:import namespace="aafb19fa-82be-411d-a6df-c75e9235a4ea"/>
@@ -9775,6 +9752,15 @@
 </ct:contentTypeSchema>
 </file>
 
+<file path=customXml/item2.xml><?xml version="1.0" encoding="utf-8"?>
+<?mso-contentType ?>
+<FormTemplates xmlns="http://schemas.microsoft.com/sharepoint/v3/contenttype/forms">
+  <Display>DocumentLibraryForm</Display>
+  <Edit>DocumentLibraryForm</Edit>
+  <New>DocumentLibraryForm</New>
+</FormTemplates>
+</file>
+
 <file path=customXml/item3.xml><?xml version="1.0" encoding="utf-8"?>
 <p:properties xmlns:p="http://schemas.microsoft.com/office/2006/metadata/properties" xmlns:xsi="http://www.w3.org/2001/XMLSchema-instance" xmlns:pc="http://schemas.microsoft.com/office/infopath/2007/PartnerControls">
   <documentManagement/>
@@ -9782,14 +9768,6 @@
 </file>
 
 <file path=customXml/itemProps1.xml><?xml version="1.0" encoding="utf-8"?>
-<ds:datastoreItem xmlns:ds="http://schemas.openxmlformats.org/officeDocument/2006/customXml" ds:itemID="{F8CFDD08-2AF3-45C0-9BFB-55C0CB45D846}">
-  <ds:schemaRefs>
-    <ds:schemaRef ds:uri="http://schemas.microsoft.com/sharepoint/v3/contenttype/forms"/>
-  </ds:schemaRefs>
-</ds:datastoreItem>
-</file>
-
-<file path=customXml/itemProps2.xml><?xml version="1.0" encoding="utf-8"?>
 <ds:datastoreItem xmlns:ds="http://schemas.openxmlformats.org/officeDocument/2006/customXml" ds:itemID="{86B9146A-7E8D-43BD-BCDA-EAF916D7BF88}">
   <ds:schemaRefs>
     <ds:schemaRef ds:uri="http://schemas.microsoft.com/office/2006/metadata/contentType"/>
@@ -9804,6 +9782,14 @@
     <ds:schemaRef ds:uri="http://purl.org/dc/elements/1.1/"/>
     <ds:schemaRef ds:uri="http://purl.org/dc/terms/"/>
     <ds:schemaRef ds:uri="http://schemas.microsoft.com/internal/obd"/>
+  </ds:schemaRefs>
+</ds:datastoreItem>
+</file>
+
+<file path=customXml/itemProps2.xml><?xml version="1.0" encoding="utf-8"?>
+<ds:datastoreItem xmlns:ds="http://schemas.openxmlformats.org/officeDocument/2006/customXml" ds:itemID="{F8CFDD08-2AF3-45C0-9BFB-55C0CB45D846}">
+  <ds:schemaRefs>
+    <ds:schemaRef ds:uri="http://schemas.microsoft.com/sharepoint/v3/contenttype/forms"/>
   </ds:schemaRefs>
 </ds:datastoreItem>
 </file>

</xml_diff>

<commit_message>
pptx aangepast (directe mutaties bij slide 2 toegevoegd)
</commit_message>
<xml_diff>
--- a/Submutatiescenario_s.pptx
+++ b/Submutatiescenario_s.pptx
@@ -5671,6 +5671,15 @@
               <a:t>GIO’s</a:t>
             </a:r>
             <a:endParaRPr lang="nl-NL" dirty="0"/>
+          </a:p>
+          <a:p>
+            <a:pPr marL="457200" lvl="1" indent="0">
+              <a:buNone/>
+            </a:pPr>
+            <a:r>
+              <a:rPr lang="nl-NL" dirty="0"/>
+              <a:t>10. Directe mutaties</a:t>
+            </a:r>
           </a:p>
           <a:p>
             <a:pPr marL="914400" lvl="1" indent="-457200">
@@ -8411,8 +8420,12 @@
           </a:p>
           <a:p>
             <a:r>
+              <a:rPr lang="nl-NL" sz="3200" dirty="0"/>
+              <a:t>4</a:t>
+            </a:r>
+            <a:r>
               <a:rPr lang="nl-NL" sz="3200" b="1" dirty="0"/>
-              <a:t>4	</a:t>
+              <a:t>	</a:t>
             </a:r>
             <a:r>
               <a:rPr lang="nl-NL" sz="3200" dirty="0"/>
@@ -9753,18 +9766,18 @@
 </file>
 
 <file path=customXml/item2.xml><?xml version="1.0" encoding="utf-8"?>
+<p:properties xmlns:p="http://schemas.microsoft.com/office/2006/metadata/properties" xmlns:xsi="http://www.w3.org/2001/XMLSchema-instance" xmlns:pc="http://schemas.microsoft.com/office/infopath/2007/PartnerControls">
+  <documentManagement/>
+</p:properties>
+</file>
+
+<file path=customXml/item3.xml><?xml version="1.0" encoding="utf-8"?>
 <?mso-contentType ?>
 <FormTemplates xmlns="http://schemas.microsoft.com/sharepoint/v3/contenttype/forms">
   <Display>DocumentLibraryForm</Display>
   <Edit>DocumentLibraryForm</Edit>
   <New>DocumentLibraryForm</New>
 </FormTemplates>
-</file>
-
-<file path=customXml/item3.xml><?xml version="1.0" encoding="utf-8"?>
-<p:properties xmlns:p="http://schemas.microsoft.com/office/2006/metadata/properties" xmlns:xsi="http://www.w3.org/2001/XMLSchema-instance" xmlns:pc="http://schemas.microsoft.com/office/infopath/2007/PartnerControls">
-  <documentManagement/>
-</p:properties>
 </file>
 
 <file path=customXml/itemProps1.xml><?xml version="1.0" encoding="utf-8"?>
@@ -9787,14 +9800,6 @@
 </file>
 
 <file path=customXml/itemProps2.xml><?xml version="1.0" encoding="utf-8"?>
-<ds:datastoreItem xmlns:ds="http://schemas.openxmlformats.org/officeDocument/2006/customXml" ds:itemID="{F8CFDD08-2AF3-45C0-9BFB-55C0CB45D846}">
-  <ds:schemaRefs>
-    <ds:schemaRef ds:uri="http://schemas.microsoft.com/sharepoint/v3/contenttype/forms"/>
-  </ds:schemaRefs>
-</ds:datastoreItem>
-</file>
-
-<file path=customXml/itemProps3.xml><?xml version="1.0" encoding="utf-8"?>
 <ds:datastoreItem xmlns:ds="http://schemas.openxmlformats.org/officeDocument/2006/customXml" ds:itemID="{44F744C1-7216-4F24-AF2B-C028C1AC510B}">
   <ds:schemaRefs>
     <ds:schemaRef ds:uri="http://purl.org/dc/elements/1.1/"/>
@@ -9809,4 +9814,12 @@
     <ds:schemaRef ds:uri="aafb19fa-82be-411d-a6df-c75e9235a4ea"/>
   </ds:schemaRefs>
 </ds:datastoreItem>
+</file>
+
+<file path=customXml/itemProps3.xml><?xml version="1.0" encoding="utf-8"?>
+<ds:datastoreItem xmlns:ds="http://schemas.openxmlformats.org/officeDocument/2006/customXml" ds:itemID="{F8CFDD08-2AF3-45C0-9BFB-55C0CB45D846}">
+  <ds:schemaRefs>
+    <ds:schemaRef ds:uri="http://schemas.microsoft.com/sharepoint/v3/contenttype/forms"/>
+  </ds:schemaRefs>
+</ds:datastoreItem>
 </file>
</xml_diff>

<commit_message>
Opdracht 3d aangepast naar aanleiding wijzigingen initieel omgevingsplan
</commit_message>
<xml_diff>
--- a/Submutatiescenario_s.pptx
+++ b/Submutatiescenario_s.pptx
@@ -146,7 +146,7 @@
       </p:ext>
     </p:extLst>
   </p:cmAuthor>
-  <p:cmAuthor id="2" name="Kasper Lingbeek" initials="KL" lastIdx="3" clrIdx="1">
+  <p:cmAuthor id="2" name="Kasper Lingbeek" initials="KL" lastIdx="5" clrIdx="1">
     <p:extLst>
       <p:ext uri="{19B8F6BF-5375-455C-9EA6-DF929625EA0E}">
         <p15:presenceInfo xmlns:p15="http://schemas.microsoft.com/office/powerpoint/2012/main" userId="S::k.lingbeek@geonovum.nl::f2390735-05ad-4371-bf81-fc311706dfcc" providerId="AD"/>
@@ -192,6 +192,29 @@
 </p:cmLst>
 </file>
 
+<file path=ppt/comments/comment3.xml><?xml version="1.0" encoding="utf-8"?>
+<p:cmLst xmlns:a="http://schemas.openxmlformats.org/drawingml/2006/main" xmlns:r="http://schemas.openxmlformats.org/officeDocument/2006/relationships" xmlns:p="http://schemas.openxmlformats.org/presentationml/2006/main">
+  <p:cm authorId="2" dt="2020-10-06T15:57:48.884" idx="4">
+    <p:pos x="6709" y="3024"/>
+    <p:text>Wordt met omgevingswaarde beeindigd</p:text>
+    <p:extLst>
+      <p:ext uri="{C676402C-5697-4E1C-873F-D02D1690AC5C}">
+        <p15:threadingInfo xmlns:p15="http://schemas.microsoft.com/office/powerpoint/2012/main" timeZoneBias="-120"/>
+      </p:ext>
+    </p:extLst>
+  </p:cm>
+  <p:cm authorId="2" dt="2020-10-06T16:02:10.984" idx="5">
+    <p:pos x="6072" y="3582"/>
+    <p:text>Locatie wordt elders nog gebruikt</p:text>
+    <p:extLst>
+      <p:ext uri="{C676402C-5697-4E1C-873F-D02D1690AC5C}">
+        <p15:threadingInfo xmlns:p15="http://schemas.microsoft.com/office/powerpoint/2012/main" timeZoneBias="-120"/>
+      </p:ext>
+    </p:extLst>
+  </p:cm>
+</p:cmLst>
+</file>
+
 <file path=ppt/slideLayouts/slideLayout1.xml><?xml version="1.0" encoding="utf-8"?>
 <p:sldLayout xmlns:a="http://schemas.openxmlformats.org/drawingml/2006/main" xmlns:r="http://schemas.openxmlformats.org/officeDocument/2006/relationships" xmlns:p="http://schemas.openxmlformats.org/presentationml/2006/main" type="title" preserve="1">
   <p:cSld name="Titeldia">
@@ -339,7 +362,7 @@
           <a:p>
             <a:fld id="{02A6C647-4F39-4E22-BFA0-7A057A8C404A}" type="datetimeFigureOut">
               <a:rPr lang="nl-NL" smtClean="0"/>
-              <a:t>29-9-2020</a:t>
+              <a:t>6-10-2020</a:t>
             </a:fld>
             <a:endParaRPr lang="nl-NL"/>
           </a:p>
@@ -537,7 +560,7 @@
           <a:p>
             <a:fld id="{02A6C647-4F39-4E22-BFA0-7A057A8C404A}" type="datetimeFigureOut">
               <a:rPr lang="nl-NL" smtClean="0"/>
-              <a:t>29-9-2020</a:t>
+              <a:t>6-10-2020</a:t>
             </a:fld>
             <a:endParaRPr lang="nl-NL"/>
           </a:p>
@@ -745,7 +768,7 @@
           <a:p>
             <a:fld id="{02A6C647-4F39-4E22-BFA0-7A057A8C404A}" type="datetimeFigureOut">
               <a:rPr lang="nl-NL" smtClean="0"/>
-              <a:t>29-9-2020</a:t>
+              <a:t>6-10-2020</a:t>
             </a:fld>
             <a:endParaRPr lang="nl-NL"/>
           </a:p>
@@ -943,7 +966,7 @@
           <a:p>
             <a:fld id="{02A6C647-4F39-4E22-BFA0-7A057A8C404A}" type="datetimeFigureOut">
               <a:rPr lang="nl-NL" smtClean="0"/>
-              <a:t>29-9-2020</a:t>
+              <a:t>6-10-2020</a:t>
             </a:fld>
             <a:endParaRPr lang="nl-NL"/>
           </a:p>
@@ -1218,7 +1241,7 @@
           <a:p>
             <a:fld id="{02A6C647-4F39-4E22-BFA0-7A057A8C404A}" type="datetimeFigureOut">
               <a:rPr lang="nl-NL" smtClean="0"/>
-              <a:t>29-9-2020</a:t>
+              <a:t>6-10-2020</a:t>
             </a:fld>
             <a:endParaRPr lang="nl-NL"/>
           </a:p>
@@ -1483,7 +1506,7 @@
           <a:p>
             <a:fld id="{02A6C647-4F39-4E22-BFA0-7A057A8C404A}" type="datetimeFigureOut">
               <a:rPr lang="nl-NL" smtClean="0"/>
-              <a:t>29-9-2020</a:t>
+              <a:t>6-10-2020</a:t>
             </a:fld>
             <a:endParaRPr lang="nl-NL"/>
           </a:p>
@@ -1895,7 +1918,7 @@
           <a:p>
             <a:fld id="{02A6C647-4F39-4E22-BFA0-7A057A8C404A}" type="datetimeFigureOut">
               <a:rPr lang="nl-NL" smtClean="0"/>
-              <a:t>29-9-2020</a:t>
+              <a:t>6-10-2020</a:t>
             </a:fld>
             <a:endParaRPr lang="nl-NL"/>
           </a:p>
@@ -2036,7 +2059,7 @@
           <a:p>
             <a:fld id="{02A6C647-4F39-4E22-BFA0-7A057A8C404A}" type="datetimeFigureOut">
               <a:rPr lang="nl-NL" smtClean="0"/>
-              <a:t>29-9-2020</a:t>
+              <a:t>6-10-2020</a:t>
             </a:fld>
             <a:endParaRPr lang="nl-NL"/>
           </a:p>
@@ -2149,7 +2172,7 @@
           <a:p>
             <a:fld id="{02A6C647-4F39-4E22-BFA0-7A057A8C404A}" type="datetimeFigureOut">
               <a:rPr lang="nl-NL" smtClean="0"/>
-              <a:t>29-9-2020</a:t>
+              <a:t>6-10-2020</a:t>
             </a:fld>
             <a:endParaRPr lang="nl-NL"/>
           </a:p>
@@ -2460,7 +2483,7 @@
           <a:p>
             <a:fld id="{02A6C647-4F39-4E22-BFA0-7A057A8C404A}" type="datetimeFigureOut">
               <a:rPr lang="nl-NL" smtClean="0"/>
-              <a:t>29-9-2020</a:t>
+              <a:t>6-10-2020</a:t>
             </a:fld>
             <a:endParaRPr lang="nl-NL"/>
           </a:p>
@@ -2748,7 +2771,7 @@
           <a:p>
             <a:fld id="{02A6C647-4F39-4E22-BFA0-7A057A8C404A}" type="datetimeFigureOut">
               <a:rPr lang="nl-NL" smtClean="0"/>
-              <a:t>29-9-2020</a:t>
+              <a:t>6-10-2020</a:t>
             </a:fld>
             <a:endParaRPr lang="nl-NL"/>
           </a:p>
@@ -2989,7 +3012,7 @@
           <a:p>
             <a:fld id="{02A6C647-4F39-4E22-BFA0-7A057A8C404A}" type="datetimeFigureOut">
               <a:rPr lang="nl-NL" smtClean="0"/>
-              <a:t>29-9-2020</a:t>
+              <a:t>6-10-2020</a:t>
             </a:fld>
             <a:endParaRPr lang="nl-NL"/>
           </a:p>
@@ -4356,7 +4379,7 @@
             <a:pPr lvl="2"/>
             <a:r>
               <a:rPr lang="nl-NL" dirty="0"/>
-              <a:t>Paragraaf 4</a:t>
+              <a:t>Afdeling 2.4</a:t>
             </a:r>
           </a:p>
           <a:p>
@@ -4371,7 +4394,7 @@
                   <a:srgbClr val="FF0000"/>
                 </a:solidFill>
               </a:rPr>
-              <a:t>VERWIJDEREN</a:t>
+              <a:t>VERVALLEN</a:t>
             </a:r>
             <a:r>
               <a:rPr lang="nl-NL" dirty="0"/>
@@ -4390,7 +4413,7 @@
             <a:pPr lvl="2"/>
             <a:r>
               <a:rPr lang="nl-NL" dirty="0"/>
-              <a:t>Paragraaf 5 </a:t>
+              <a:t>Afdeling 2.5 </a:t>
             </a:r>
           </a:p>
           <a:p>
@@ -4437,7 +4460,7 @@
                   <a:schemeClr val="accent1"/>
                 </a:solidFill>
               </a:rPr>
-              <a:t>van GIO (proces onbekend) </a:t>
+              <a:t>van GIO ‘Zuilichem’(begrippenlijst aanpassen) </a:t>
             </a:r>
           </a:p>
           <a:p>
@@ -4447,7 +4470,7 @@
                   <a:schemeClr val="accent6"/>
                 </a:solidFill>
               </a:rPr>
-              <a:t>Beëindigen van regeltekst (nl.imow-gm0037.regeltekst.2019001) </a:t>
+              <a:t>Beëindigen van regeltekst (nl.imow-gm0297.regeltekst.2019000009) </a:t>
             </a:r>
             <a:r>
               <a:rPr lang="nl-NL" i="1" dirty="0">
@@ -4455,7 +4478,7 @@
                   <a:schemeClr val="accent6"/>
                 </a:solidFill>
               </a:rPr>
-              <a:t>(status ‘Beëindigd’)</a:t>
+              <a:t>(OP-status ‘B’ = beëindigd)</a:t>
             </a:r>
           </a:p>
           <a:p>
@@ -4465,31 +4488,15 @@
                   <a:schemeClr val="accent6"/>
                 </a:solidFill>
               </a:rPr>
-              <a:t>Beëindigen van Juridische regel (</a:t>
-            </a:r>
-            <a:r>
-              <a:rPr lang="nl-NL" dirty="0" err="1">
+              <a:t>Beëindigen van Juridische regel (Omgevingswaarderegel nl.imow-gm0297.juridischeregel.2019000015) </a:t>
+            </a:r>
+            <a:r>
+              <a:rPr lang="nl-NL" i="1" dirty="0">
                 <a:solidFill>
                   <a:schemeClr val="accent6"/>
                 </a:solidFill>
               </a:rPr>
-              <a:t>RegelVoorIedereen</a:t>
-            </a:r>
-            <a:r>
-              <a:rPr lang="nl-NL" dirty="0">
-                <a:solidFill>
-                  <a:schemeClr val="accent6"/>
-                </a:solidFill>
-              </a:rPr>
-              <a:t>) </a:t>
-            </a:r>
-            <a:r>
-              <a:rPr lang="nl-NL" i="1" dirty="0">
-                <a:solidFill>
-                  <a:schemeClr val="accent6"/>
-                </a:solidFill>
-              </a:rPr>
-              <a:t>(status ‘Beëindigd’)</a:t>
+              <a:t>(OW-status ‘B’ = beëindigd)</a:t>
             </a:r>
             <a:endParaRPr lang="nl-NL" dirty="0">
               <a:solidFill>
@@ -4499,12 +4506,35 @@
           </a:p>
           <a:p>
             <a:r>
+              <a:rPr lang="nl-NL" strike="sngStrike" dirty="0">
+                <a:solidFill>
+                  <a:schemeClr val="accent6"/>
+                </a:solidFill>
+              </a:rPr>
+              <a:t>Beëindigen van normwaarde (nl.imow-gm0037.normwaarde.20190001). </a:t>
+            </a:r>
+            <a:r>
+              <a:rPr lang="nl-NL" i="1" strike="sngStrike" dirty="0">
+                <a:solidFill>
+                  <a:schemeClr val="accent6"/>
+                </a:solidFill>
+              </a:rPr>
+              <a:t>(status ‘Beëindigd’)</a:t>
+            </a:r>
+            <a:endParaRPr lang="nl-NL" strike="sngStrike" dirty="0">
+              <a:solidFill>
+                <a:schemeClr val="accent6"/>
+              </a:solidFill>
+            </a:endParaRPr>
+          </a:p>
+          <a:p>
+            <a:r>
               <a:rPr lang="nl-NL" dirty="0">
                 <a:solidFill>
                   <a:schemeClr val="accent6"/>
                 </a:solidFill>
               </a:rPr>
-              <a:t>Beëindigen van normwaarde (nl.imow-gm0037.normwaarde.20190001). </a:t>
+              <a:t>Beëindigen van omgevingswaarde (nl.imow-gm0297.omgevingswaarde.2019000001) </a:t>
             </a:r>
             <a:r>
               <a:rPr lang="nl-NL" i="1" dirty="0">
@@ -4512,7 +4542,7 @@
                   <a:schemeClr val="accent6"/>
                 </a:solidFill>
               </a:rPr>
-              <a:t>(status ‘Beëindigd’)</a:t>
+              <a:t>(status ‘B’ = beëindigd)</a:t>
             </a:r>
             <a:endParaRPr lang="nl-NL" dirty="0">
               <a:solidFill>
@@ -4522,45 +4552,22 @@
           </a:p>
           <a:p>
             <a:r>
-              <a:rPr lang="nl-NL" dirty="0">
+              <a:rPr lang="nl-NL" strike="sngStrike" dirty="0">
                 <a:solidFill>
                   <a:schemeClr val="accent6"/>
                 </a:solidFill>
               </a:rPr>
-              <a:t>Beëindigen van omgevingswaarde (nl.imow-gm0037.omgevingswaarde.20190001) </a:t>
-            </a:r>
-            <a:r>
-              <a:rPr lang="nl-NL" i="1" dirty="0">
+              <a:t>Beëindigen van locatie (nl.imow-gm0297.gebied.2019000011) </a:t>
+            </a:r>
+            <a:r>
+              <a:rPr lang="nl-NL" i="1" strike="sngStrike" dirty="0">
                 <a:solidFill>
                   <a:schemeClr val="accent6"/>
                 </a:solidFill>
               </a:rPr>
-              <a:t>(status ‘Beëindigd’)</a:t>
-            </a:r>
-            <a:endParaRPr lang="nl-NL" dirty="0">
-              <a:solidFill>
-                <a:schemeClr val="accent6"/>
-              </a:solidFill>
-            </a:endParaRPr>
-          </a:p>
-          <a:p>
-            <a:r>
-              <a:rPr lang="nl-NL" dirty="0">
-                <a:solidFill>
-                  <a:schemeClr val="accent6"/>
-                </a:solidFill>
-              </a:rPr>
-              <a:t>Beëindigen van locatie (nl.imow-gm0037.Locatie.20190006) </a:t>
-            </a:r>
-            <a:r>
-              <a:rPr lang="nl-NL" i="1" dirty="0">
-                <a:solidFill>
-                  <a:schemeClr val="accent6"/>
-                </a:solidFill>
-              </a:rPr>
               <a:t>(status ‘Beëindigd’ )</a:t>
             </a:r>
-            <a:endParaRPr lang="nl-NL" dirty="0">
+            <a:endParaRPr lang="nl-NL" strike="sngStrike" dirty="0">
               <a:solidFill>
                 <a:schemeClr val="accent6"/>
               </a:solidFill>

</xml_diff>

<commit_message>
Initiele versie mutatie 4a
</commit_message>
<xml_diff>
--- a/Submutatiescenario_s.pptx
+++ b/Submutatiescenario_s.pptx
@@ -362,7 +362,7 @@
           <a:p>
             <a:fld id="{02A6C647-4F39-4E22-BFA0-7A057A8C404A}" type="datetimeFigureOut">
               <a:rPr lang="nl-NL" smtClean="0"/>
-              <a:t>6-10-2020</a:t>
+              <a:t>29-10-2020</a:t>
             </a:fld>
             <a:endParaRPr lang="nl-NL"/>
           </a:p>
@@ -560,7 +560,7 @@
           <a:p>
             <a:fld id="{02A6C647-4F39-4E22-BFA0-7A057A8C404A}" type="datetimeFigureOut">
               <a:rPr lang="nl-NL" smtClean="0"/>
-              <a:t>6-10-2020</a:t>
+              <a:t>29-10-2020</a:t>
             </a:fld>
             <a:endParaRPr lang="nl-NL"/>
           </a:p>
@@ -768,7 +768,7 @@
           <a:p>
             <a:fld id="{02A6C647-4F39-4E22-BFA0-7A057A8C404A}" type="datetimeFigureOut">
               <a:rPr lang="nl-NL" smtClean="0"/>
-              <a:t>6-10-2020</a:t>
+              <a:t>29-10-2020</a:t>
             </a:fld>
             <a:endParaRPr lang="nl-NL"/>
           </a:p>
@@ -966,7 +966,7 @@
           <a:p>
             <a:fld id="{02A6C647-4F39-4E22-BFA0-7A057A8C404A}" type="datetimeFigureOut">
               <a:rPr lang="nl-NL" smtClean="0"/>
-              <a:t>6-10-2020</a:t>
+              <a:t>29-10-2020</a:t>
             </a:fld>
             <a:endParaRPr lang="nl-NL"/>
           </a:p>
@@ -1241,7 +1241,7 @@
           <a:p>
             <a:fld id="{02A6C647-4F39-4E22-BFA0-7A057A8C404A}" type="datetimeFigureOut">
               <a:rPr lang="nl-NL" smtClean="0"/>
-              <a:t>6-10-2020</a:t>
+              <a:t>29-10-2020</a:t>
             </a:fld>
             <a:endParaRPr lang="nl-NL"/>
           </a:p>
@@ -1506,7 +1506,7 @@
           <a:p>
             <a:fld id="{02A6C647-4F39-4E22-BFA0-7A057A8C404A}" type="datetimeFigureOut">
               <a:rPr lang="nl-NL" smtClean="0"/>
-              <a:t>6-10-2020</a:t>
+              <a:t>29-10-2020</a:t>
             </a:fld>
             <a:endParaRPr lang="nl-NL"/>
           </a:p>
@@ -1918,7 +1918,7 @@
           <a:p>
             <a:fld id="{02A6C647-4F39-4E22-BFA0-7A057A8C404A}" type="datetimeFigureOut">
               <a:rPr lang="nl-NL" smtClean="0"/>
-              <a:t>6-10-2020</a:t>
+              <a:t>29-10-2020</a:t>
             </a:fld>
             <a:endParaRPr lang="nl-NL"/>
           </a:p>
@@ -2059,7 +2059,7 @@
           <a:p>
             <a:fld id="{02A6C647-4F39-4E22-BFA0-7A057A8C404A}" type="datetimeFigureOut">
               <a:rPr lang="nl-NL" smtClean="0"/>
-              <a:t>6-10-2020</a:t>
+              <a:t>29-10-2020</a:t>
             </a:fld>
             <a:endParaRPr lang="nl-NL"/>
           </a:p>
@@ -2172,7 +2172,7 @@
           <a:p>
             <a:fld id="{02A6C647-4F39-4E22-BFA0-7A057A8C404A}" type="datetimeFigureOut">
               <a:rPr lang="nl-NL" smtClean="0"/>
-              <a:t>6-10-2020</a:t>
+              <a:t>29-10-2020</a:t>
             </a:fld>
             <a:endParaRPr lang="nl-NL"/>
           </a:p>
@@ -2483,7 +2483,7 @@
           <a:p>
             <a:fld id="{02A6C647-4F39-4E22-BFA0-7A057A8C404A}" type="datetimeFigureOut">
               <a:rPr lang="nl-NL" smtClean="0"/>
-              <a:t>6-10-2020</a:t>
+              <a:t>29-10-2020</a:t>
             </a:fld>
             <a:endParaRPr lang="nl-NL"/>
           </a:p>
@@ -2771,7 +2771,7 @@
           <a:p>
             <a:fld id="{02A6C647-4F39-4E22-BFA0-7A057A8C404A}" type="datetimeFigureOut">
               <a:rPr lang="nl-NL" smtClean="0"/>
-              <a:t>6-10-2020</a:t>
+              <a:t>29-10-2020</a:t>
             </a:fld>
             <a:endParaRPr lang="nl-NL"/>
           </a:p>
@@ -3012,7 +3012,7 @@
           <a:p>
             <a:fld id="{02A6C647-4F39-4E22-BFA0-7A057A8C404A}" type="datetimeFigureOut">
               <a:rPr lang="nl-NL" smtClean="0"/>
-              <a:t>6-10-2020</a:t>
+              <a:t>29-10-2020</a:t>
             </a:fld>
             <a:endParaRPr lang="nl-NL"/>
           </a:p>
@@ -4656,17 +4656,53 @@
           <a:p>
             <a:r>
               <a:rPr lang="nl-NL" dirty="0"/>
-              <a:t>Van de onderstaande plek naar een andere willekeurige plek in Zuilichem.</a:t>
-            </a:r>
+              <a:t>Speelhal valt deels buiten grens Zuilichem, moet alleen binnen de grens vallen.</a:t>
+            </a:r>
+          </a:p>
+        </p:txBody>
+      </p:sp>
+      <p:sp>
+        <p:nvSpPr>
+          <p:cNvPr id="6" name="Tekstvak 5">
+            <a:extLst>
+              <a:ext uri="{FF2B5EF4-FFF2-40B4-BE49-F238E27FC236}">
+                <a16:creationId xmlns:a16="http://schemas.microsoft.com/office/drawing/2014/main" id="{3E199FF9-9457-47EE-8992-D56354F6E548}"/>
+              </a:ext>
+            </a:extLst>
+          </p:cNvPr>
+          <p:cNvSpPr txBox="1"/>
+          <p:nvPr/>
+        </p:nvSpPr>
+        <p:spPr>
+          <a:xfrm>
+            <a:off x="562062" y="6090407"/>
+            <a:ext cx="11325138" cy="369332"/>
+          </a:xfrm>
+          <a:prstGeom prst="rect">
+            <a:avLst/>
+          </a:prstGeom>
+          <a:noFill/>
+        </p:spPr>
+        <p:txBody>
+          <a:bodyPr wrap="square" rtlCol="0">
+            <a:spAutoFit/>
+          </a:bodyPr>
+          <a:lstStyle/>
+          <a:p>
+            <a:r>
+              <a:rPr lang="nl-NL" dirty="0"/>
+              <a:t>Let op dat het splitsen van GIO ook beschreven wordt. </a:t>
+            </a:r>
+            <a:endParaRPr lang="en-NL" dirty="0"/>
           </a:p>
         </p:txBody>
       </p:sp>
       <p:pic>
         <p:nvPicPr>
-          <p:cNvPr id="4" name="Afbeelding 3">
-            <a:extLst>
-              <a:ext uri="{FF2B5EF4-FFF2-40B4-BE49-F238E27FC236}">
-                <a16:creationId xmlns:a16="http://schemas.microsoft.com/office/drawing/2014/main" id="{59958D37-5579-4A8B-9F52-A344C737A2A2}"/>
+          <p:cNvPr id="5" name="Afbeelding 4">
+            <a:extLst>
+              <a:ext uri="{FF2B5EF4-FFF2-40B4-BE49-F238E27FC236}">
+                <a16:creationId xmlns:a16="http://schemas.microsoft.com/office/drawing/2014/main" id="{A4539461-A403-4265-97C2-3DB919852580}"/>
               </a:ext>
             </a:extLst>
           </p:cNvPr>
@@ -4683,50 +4719,44 @@
         </p:blipFill>
         <p:spPr>
           <a:xfrm>
-            <a:off x="2980935" y="2415318"/>
-            <a:ext cx="4755292" cy="3513124"/>
+            <a:off x="838200" y="2831340"/>
+            <a:ext cx="3328274" cy="2253353"/>
           </a:xfrm>
           <a:prstGeom prst="rect">
             <a:avLst/>
           </a:prstGeom>
         </p:spPr>
       </p:pic>
-      <p:sp>
-        <p:nvSpPr>
-          <p:cNvPr id="6" name="Tekstvak 5">
-            <a:extLst>
-              <a:ext uri="{FF2B5EF4-FFF2-40B4-BE49-F238E27FC236}">
-                <a16:creationId xmlns:a16="http://schemas.microsoft.com/office/drawing/2014/main" id="{3E199FF9-9457-47EE-8992-D56354F6E548}"/>
-              </a:ext>
-            </a:extLst>
-          </p:cNvPr>
-          <p:cNvSpPr txBox="1"/>
+      <p:pic>
+        <p:nvPicPr>
+          <p:cNvPr id="7" name="Afbeelding 6">
+            <a:extLst>
+              <a:ext uri="{FF2B5EF4-FFF2-40B4-BE49-F238E27FC236}">
+                <a16:creationId xmlns:a16="http://schemas.microsoft.com/office/drawing/2014/main" id="{9F23D0D8-7A5C-4016-A1A2-4680B7CDE9C6}"/>
+              </a:ext>
+            </a:extLst>
+          </p:cNvPr>
+          <p:cNvPicPr>
+            <a:picLocks noChangeAspect="1"/>
+          </p:cNvPicPr>
           <p:nvPr/>
-        </p:nvSpPr>
+        </p:nvPicPr>
+        <p:blipFill>
+          <a:blip r:embed="rId3"/>
+          <a:stretch>
+            <a:fillRect/>
+          </a:stretch>
+        </p:blipFill>
         <p:spPr>
           <a:xfrm>
-            <a:off x="562062" y="6090407"/>
-            <a:ext cx="11325138" cy="369332"/>
+            <a:off x="5674236" y="2831341"/>
+            <a:ext cx="3328272" cy="2253352"/>
           </a:xfrm>
           <a:prstGeom prst="rect">
             <a:avLst/>
           </a:prstGeom>
-          <a:noFill/>
         </p:spPr>
-        <p:txBody>
-          <a:bodyPr wrap="square" rtlCol="0">
-            <a:spAutoFit/>
-          </a:bodyPr>
-          <a:lstStyle/>
-          <a:p>
-            <a:r>
-              <a:rPr lang="nl-NL" dirty="0"/>
-              <a:t>Let op dat het splitsen van GIO ook beschreven wordt. </a:t>
-            </a:r>
-            <a:endParaRPr lang="en-NL" dirty="0"/>
-          </a:p>
-        </p:txBody>
-      </p:sp>
+      </p:pic>
     </p:spTree>
     <p:extLst>
       <p:ext uri="{BB962C8B-B14F-4D97-AF65-F5344CB8AC3E}">
@@ -9570,6 +9600,12 @@
 </file>
 
 <file path=customXml/item1.xml><?xml version="1.0" encoding="utf-8"?>
+<p:properties xmlns:p="http://schemas.microsoft.com/office/2006/metadata/properties" xmlns:xsi="http://www.w3.org/2001/XMLSchema-instance" xmlns:pc="http://schemas.microsoft.com/office/infopath/2007/PartnerControls">
+  <documentManagement/>
+</p:properties>
+</file>
+
+<file path=customXml/item2.xml><?xml version="1.0" encoding="utf-8"?>
 <ct:contentTypeSchema xmlns:ct="http://schemas.microsoft.com/office/2006/metadata/contentType" xmlns:ma="http://schemas.microsoft.com/office/2006/metadata/properties/metaAttributes" ct:_="" ma:_="" ma:contentTypeName="Document" ma:contentTypeID="0x0101003ADD3040E3157B4E913BCA65F34844D7" ma:contentTypeVersion="10" ma:contentTypeDescription="Een nieuw document maken." ma:contentTypeScope="" ma:versionID="c1765059aa1475931adc12138fdcfd8c">
   <xsd:schema xmlns:xsd="http://www.w3.org/2001/XMLSchema" xmlns:xs="http://www.w3.org/2001/XMLSchema" xmlns:p="http://schemas.microsoft.com/office/2006/metadata/properties" xmlns:ns2="aafb19fa-82be-411d-a6df-c75e9235a4ea" xmlns:ns3="3dfebdfe-2b22-40ba-8672-9fbc9b4066c4" targetNamespace="http://schemas.microsoft.com/office/2006/metadata/properties" ma:root="true" ma:fieldsID="42d79c55539af1f9f274032ce6041302" ns2:_="" ns3:_="">
     <xsd:import namespace="aafb19fa-82be-411d-a6df-c75e9235a4ea"/>
@@ -9772,12 +9808,6 @@
 </ct:contentTypeSchema>
 </file>
 
-<file path=customXml/item2.xml><?xml version="1.0" encoding="utf-8"?>
-<p:properties xmlns:p="http://schemas.microsoft.com/office/2006/metadata/properties" xmlns:xsi="http://www.w3.org/2001/XMLSchema-instance" xmlns:pc="http://schemas.microsoft.com/office/infopath/2007/PartnerControls">
-  <documentManagement/>
-</p:properties>
-</file>
-
 <file path=customXml/item3.xml><?xml version="1.0" encoding="utf-8"?>
 <?mso-contentType ?>
 <FormTemplates xmlns="http://schemas.microsoft.com/sharepoint/v3/contenttype/forms">
@@ -9788,6 +9818,23 @@
 </file>
 
 <file path=customXml/itemProps1.xml><?xml version="1.0" encoding="utf-8"?>
+<ds:datastoreItem xmlns:ds="http://schemas.openxmlformats.org/officeDocument/2006/customXml" ds:itemID="{44F744C1-7216-4F24-AF2B-C028C1AC510B}">
+  <ds:schemaRefs>
+    <ds:schemaRef ds:uri="http://purl.org/dc/elements/1.1/"/>
+    <ds:schemaRef ds:uri="http://purl.org/dc/terms/"/>
+    <ds:schemaRef ds:uri="3dfebdfe-2b22-40ba-8672-9fbc9b4066c4"/>
+    <ds:schemaRef ds:uri="http://www.w3.org/XML/1998/namespace"/>
+    <ds:schemaRef ds:uri="http://schemas.microsoft.com/office/2006/documentManagement/types"/>
+    <ds:schemaRef ds:uri="http://schemas.microsoft.com/office/2006/metadata/properties"/>
+    <ds:schemaRef ds:uri="http://purl.org/dc/dcmitype/"/>
+    <ds:schemaRef ds:uri="http://schemas.microsoft.com/office/infopath/2007/PartnerControls"/>
+    <ds:schemaRef ds:uri="http://schemas.openxmlformats.org/package/2006/metadata/core-properties"/>
+    <ds:schemaRef ds:uri="aafb19fa-82be-411d-a6df-c75e9235a4ea"/>
+  </ds:schemaRefs>
+</ds:datastoreItem>
+</file>
+
+<file path=customXml/itemProps2.xml><?xml version="1.0" encoding="utf-8"?>
 <ds:datastoreItem xmlns:ds="http://schemas.openxmlformats.org/officeDocument/2006/customXml" ds:itemID="{86B9146A-7E8D-43BD-BCDA-EAF916D7BF88}">
   <ds:schemaRefs>
     <ds:schemaRef ds:uri="http://schemas.microsoft.com/office/2006/metadata/contentType"/>
@@ -9806,23 +9853,6 @@
 </ds:datastoreItem>
 </file>
 
-<file path=customXml/itemProps2.xml><?xml version="1.0" encoding="utf-8"?>
-<ds:datastoreItem xmlns:ds="http://schemas.openxmlformats.org/officeDocument/2006/customXml" ds:itemID="{44F744C1-7216-4F24-AF2B-C028C1AC510B}">
-  <ds:schemaRefs>
-    <ds:schemaRef ds:uri="http://purl.org/dc/elements/1.1/"/>
-    <ds:schemaRef ds:uri="http://purl.org/dc/terms/"/>
-    <ds:schemaRef ds:uri="3dfebdfe-2b22-40ba-8672-9fbc9b4066c4"/>
-    <ds:schemaRef ds:uri="http://www.w3.org/XML/1998/namespace"/>
-    <ds:schemaRef ds:uri="http://schemas.microsoft.com/office/2006/documentManagement/types"/>
-    <ds:schemaRef ds:uri="http://schemas.microsoft.com/office/2006/metadata/properties"/>
-    <ds:schemaRef ds:uri="http://purl.org/dc/dcmitype/"/>
-    <ds:schemaRef ds:uri="http://schemas.microsoft.com/office/infopath/2007/PartnerControls"/>
-    <ds:schemaRef ds:uri="http://schemas.openxmlformats.org/package/2006/metadata/core-properties"/>
-    <ds:schemaRef ds:uri="aafb19fa-82be-411d-a6df-c75e9235a4ea"/>
-  </ds:schemaRefs>
-</ds:datastoreItem>
-</file>
-
 <file path=customXml/itemProps3.xml><?xml version="1.0" encoding="utf-8"?>
 <ds:datastoreItem xmlns:ds="http://schemas.openxmlformats.org/officeDocument/2006/customXml" ds:itemID="{F8CFDD08-2AF3-45C0-9BFB-55C0CB45D846}">
   <ds:schemaRefs>

</xml_diff>

<commit_message>
Mutatie 4c verder ingevuld
</commit_message>
<xml_diff>
--- a/Submutatiescenario_s.pptx
+++ b/Submutatiescenario_s.pptx
@@ -362,7 +362,7 @@
           <a:p>
             <a:fld id="{02A6C647-4F39-4E22-BFA0-7A057A8C404A}" type="datetimeFigureOut">
               <a:rPr lang="nl-NL" smtClean="0"/>
-              <a:t>9-11-2020</a:t>
+              <a:t>10-11-2020</a:t>
             </a:fld>
             <a:endParaRPr lang="nl-NL"/>
           </a:p>
@@ -560,7 +560,7 @@
           <a:p>
             <a:fld id="{02A6C647-4F39-4E22-BFA0-7A057A8C404A}" type="datetimeFigureOut">
               <a:rPr lang="nl-NL" smtClean="0"/>
-              <a:t>9-11-2020</a:t>
+              <a:t>10-11-2020</a:t>
             </a:fld>
             <a:endParaRPr lang="nl-NL"/>
           </a:p>
@@ -768,7 +768,7 @@
           <a:p>
             <a:fld id="{02A6C647-4F39-4E22-BFA0-7A057A8C404A}" type="datetimeFigureOut">
               <a:rPr lang="nl-NL" smtClean="0"/>
-              <a:t>9-11-2020</a:t>
+              <a:t>10-11-2020</a:t>
             </a:fld>
             <a:endParaRPr lang="nl-NL"/>
           </a:p>
@@ -966,7 +966,7 @@
           <a:p>
             <a:fld id="{02A6C647-4F39-4E22-BFA0-7A057A8C404A}" type="datetimeFigureOut">
               <a:rPr lang="nl-NL" smtClean="0"/>
-              <a:t>9-11-2020</a:t>
+              <a:t>10-11-2020</a:t>
             </a:fld>
             <a:endParaRPr lang="nl-NL"/>
           </a:p>
@@ -1241,7 +1241,7 @@
           <a:p>
             <a:fld id="{02A6C647-4F39-4E22-BFA0-7A057A8C404A}" type="datetimeFigureOut">
               <a:rPr lang="nl-NL" smtClean="0"/>
-              <a:t>9-11-2020</a:t>
+              <a:t>10-11-2020</a:t>
             </a:fld>
             <a:endParaRPr lang="nl-NL"/>
           </a:p>
@@ -1506,7 +1506,7 @@
           <a:p>
             <a:fld id="{02A6C647-4F39-4E22-BFA0-7A057A8C404A}" type="datetimeFigureOut">
               <a:rPr lang="nl-NL" smtClean="0"/>
-              <a:t>9-11-2020</a:t>
+              <a:t>10-11-2020</a:t>
             </a:fld>
             <a:endParaRPr lang="nl-NL"/>
           </a:p>
@@ -1918,7 +1918,7 @@
           <a:p>
             <a:fld id="{02A6C647-4F39-4E22-BFA0-7A057A8C404A}" type="datetimeFigureOut">
               <a:rPr lang="nl-NL" smtClean="0"/>
-              <a:t>9-11-2020</a:t>
+              <a:t>10-11-2020</a:t>
             </a:fld>
             <a:endParaRPr lang="nl-NL"/>
           </a:p>
@@ -2059,7 +2059,7 @@
           <a:p>
             <a:fld id="{02A6C647-4F39-4E22-BFA0-7A057A8C404A}" type="datetimeFigureOut">
               <a:rPr lang="nl-NL" smtClean="0"/>
-              <a:t>9-11-2020</a:t>
+              <a:t>10-11-2020</a:t>
             </a:fld>
             <a:endParaRPr lang="nl-NL"/>
           </a:p>
@@ -2172,7 +2172,7 @@
           <a:p>
             <a:fld id="{02A6C647-4F39-4E22-BFA0-7A057A8C404A}" type="datetimeFigureOut">
               <a:rPr lang="nl-NL" smtClean="0"/>
-              <a:t>9-11-2020</a:t>
+              <a:t>10-11-2020</a:t>
             </a:fld>
             <a:endParaRPr lang="nl-NL"/>
           </a:p>
@@ -2483,7 +2483,7 @@
           <a:p>
             <a:fld id="{02A6C647-4F39-4E22-BFA0-7A057A8C404A}" type="datetimeFigureOut">
               <a:rPr lang="nl-NL" smtClean="0"/>
-              <a:t>9-11-2020</a:t>
+              <a:t>10-11-2020</a:t>
             </a:fld>
             <a:endParaRPr lang="nl-NL"/>
           </a:p>
@@ -2771,7 +2771,7 @@
           <a:p>
             <a:fld id="{02A6C647-4F39-4E22-BFA0-7A057A8C404A}" type="datetimeFigureOut">
               <a:rPr lang="nl-NL" smtClean="0"/>
-              <a:t>9-11-2020</a:t>
+              <a:t>10-11-2020</a:t>
             </a:fld>
             <a:endParaRPr lang="nl-NL"/>
           </a:p>
@@ -3012,7 +3012,7 @@
           <a:p>
             <a:fld id="{02A6C647-4F39-4E22-BFA0-7A057A8C404A}" type="datetimeFigureOut">
               <a:rPr lang="nl-NL" smtClean="0"/>
-              <a:t>9-11-2020</a:t>
+              <a:t>10-11-2020</a:t>
             </a:fld>
             <a:endParaRPr lang="nl-NL"/>
           </a:p>
@@ -5159,7 +5159,7 @@
                   <a:schemeClr val="accent1"/>
                 </a:solidFill>
               </a:rPr>
-              <a:t>van huidige GIO (</a:t>
+              <a:t>van huidige GIO ‘Centrumgebied’ (</a:t>
             </a:r>
             <a:r>
               <a:rPr lang="nl-NL" i="1" dirty="0" err="1">
@@ -5186,7 +5186,23 @@
                   <a:schemeClr val="accent1"/>
                 </a:solidFill>
               </a:rPr>
-              <a:t>Toevoegen nieuwe GIO (</a:t>
+              <a:t>Toevoegen nieuwe GIO ‘</a:t>
+            </a:r>
+            <a:r>
+              <a:rPr lang="nl-NL">
+                <a:solidFill>
+                  <a:schemeClr val="accent1"/>
+                </a:solidFill>
+              </a:rPr>
+              <a:t>Nieuw centrumgebied’ </a:t>
+            </a:r>
+            <a:r>
+              <a:rPr lang="nl-NL" dirty="0">
+                <a:solidFill>
+                  <a:schemeClr val="accent1"/>
+                </a:solidFill>
+              </a:rPr>
+              <a:t>(</a:t>
             </a:r>
             <a:r>
               <a:rPr lang="nl-NL" i="1" dirty="0" err="1">
@@ -9608,6 +9624,12 @@
 </file>
 
 <file path=customXml/item1.xml><?xml version="1.0" encoding="utf-8"?>
+<p:properties xmlns:p="http://schemas.microsoft.com/office/2006/metadata/properties" xmlns:xsi="http://www.w3.org/2001/XMLSchema-instance" xmlns:pc="http://schemas.microsoft.com/office/infopath/2007/PartnerControls">
+  <documentManagement/>
+</p:properties>
+</file>
+
+<file path=customXml/item2.xml><?xml version="1.0" encoding="utf-8"?>
 <ct:contentTypeSchema xmlns:ct="http://schemas.microsoft.com/office/2006/metadata/contentType" xmlns:ma="http://schemas.microsoft.com/office/2006/metadata/properties/metaAttributes" ct:_="" ma:_="" ma:contentTypeName="Document" ma:contentTypeID="0x0101003ADD3040E3157B4E913BCA65F34844D7" ma:contentTypeVersion="10" ma:contentTypeDescription="Een nieuw document maken." ma:contentTypeScope="" ma:versionID="c1765059aa1475931adc12138fdcfd8c">
   <xsd:schema xmlns:xsd="http://www.w3.org/2001/XMLSchema" xmlns:xs="http://www.w3.org/2001/XMLSchema" xmlns:p="http://schemas.microsoft.com/office/2006/metadata/properties" xmlns:ns2="aafb19fa-82be-411d-a6df-c75e9235a4ea" xmlns:ns3="3dfebdfe-2b22-40ba-8672-9fbc9b4066c4" targetNamespace="http://schemas.microsoft.com/office/2006/metadata/properties" ma:root="true" ma:fieldsID="42d79c55539af1f9f274032ce6041302" ns2:_="" ns3:_="">
     <xsd:import namespace="aafb19fa-82be-411d-a6df-c75e9235a4ea"/>
@@ -9810,12 +9832,6 @@
 </ct:contentTypeSchema>
 </file>
 
-<file path=customXml/item2.xml><?xml version="1.0" encoding="utf-8"?>
-<p:properties xmlns:p="http://schemas.microsoft.com/office/2006/metadata/properties" xmlns:xsi="http://www.w3.org/2001/XMLSchema-instance" xmlns:pc="http://schemas.microsoft.com/office/infopath/2007/PartnerControls">
-  <documentManagement/>
-</p:properties>
-</file>
-
 <file path=customXml/item3.xml><?xml version="1.0" encoding="utf-8"?>
 <?mso-contentType ?>
 <FormTemplates xmlns="http://schemas.microsoft.com/sharepoint/v3/contenttype/forms">
@@ -9826,6 +9842,23 @@
 </file>
 
 <file path=customXml/itemProps1.xml><?xml version="1.0" encoding="utf-8"?>
+<ds:datastoreItem xmlns:ds="http://schemas.openxmlformats.org/officeDocument/2006/customXml" ds:itemID="{44F744C1-7216-4F24-AF2B-C028C1AC510B}">
+  <ds:schemaRefs>
+    <ds:schemaRef ds:uri="http://purl.org/dc/elements/1.1/"/>
+    <ds:schemaRef ds:uri="http://purl.org/dc/terms/"/>
+    <ds:schemaRef ds:uri="3dfebdfe-2b22-40ba-8672-9fbc9b4066c4"/>
+    <ds:schemaRef ds:uri="http://www.w3.org/XML/1998/namespace"/>
+    <ds:schemaRef ds:uri="http://schemas.microsoft.com/office/2006/documentManagement/types"/>
+    <ds:schemaRef ds:uri="http://schemas.microsoft.com/office/2006/metadata/properties"/>
+    <ds:schemaRef ds:uri="http://purl.org/dc/dcmitype/"/>
+    <ds:schemaRef ds:uri="http://schemas.microsoft.com/office/infopath/2007/PartnerControls"/>
+    <ds:schemaRef ds:uri="http://schemas.openxmlformats.org/package/2006/metadata/core-properties"/>
+    <ds:schemaRef ds:uri="aafb19fa-82be-411d-a6df-c75e9235a4ea"/>
+  </ds:schemaRefs>
+</ds:datastoreItem>
+</file>
+
+<file path=customXml/itemProps2.xml><?xml version="1.0" encoding="utf-8"?>
 <ds:datastoreItem xmlns:ds="http://schemas.openxmlformats.org/officeDocument/2006/customXml" ds:itemID="{86B9146A-7E8D-43BD-BCDA-EAF916D7BF88}">
   <ds:schemaRefs>
     <ds:schemaRef ds:uri="http://schemas.microsoft.com/office/2006/metadata/contentType"/>
@@ -9844,23 +9877,6 @@
 </ds:datastoreItem>
 </file>
 
-<file path=customXml/itemProps2.xml><?xml version="1.0" encoding="utf-8"?>
-<ds:datastoreItem xmlns:ds="http://schemas.openxmlformats.org/officeDocument/2006/customXml" ds:itemID="{44F744C1-7216-4F24-AF2B-C028C1AC510B}">
-  <ds:schemaRefs>
-    <ds:schemaRef ds:uri="http://purl.org/dc/elements/1.1/"/>
-    <ds:schemaRef ds:uri="http://purl.org/dc/terms/"/>
-    <ds:schemaRef ds:uri="3dfebdfe-2b22-40ba-8672-9fbc9b4066c4"/>
-    <ds:schemaRef ds:uri="http://www.w3.org/XML/1998/namespace"/>
-    <ds:schemaRef ds:uri="http://schemas.microsoft.com/office/2006/documentManagement/types"/>
-    <ds:schemaRef ds:uri="http://schemas.microsoft.com/office/2006/metadata/properties"/>
-    <ds:schemaRef ds:uri="http://purl.org/dc/dcmitype/"/>
-    <ds:schemaRef ds:uri="http://schemas.microsoft.com/office/infopath/2007/PartnerControls"/>
-    <ds:schemaRef ds:uri="http://schemas.openxmlformats.org/package/2006/metadata/core-properties"/>
-    <ds:schemaRef ds:uri="aafb19fa-82be-411d-a6df-c75e9235a4ea"/>
-  </ds:schemaRefs>
-</ds:datastoreItem>
-</file>
-
 <file path=customXml/itemProps3.xml><?xml version="1.0" encoding="utf-8"?>
 <ds:datastoreItem xmlns:ds="http://schemas.openxmlformats.org/officeDocument/2006/customXml" ds:itemID="{F8CFDD08-2AF3-45C0-9BFB-55C0CB45D846}">
   <ds:schemaRefs>

</xml_diff>

<commit_message>
Initiele versie mutatie 4c
</commit_message>
<xml_diff>
--- a/Submutatiescenario_s.pptx
+++ b/Submutatiescenario_s.pptx
@@ -362,7 +362,7 @@
           <a:p>
             <a:fld id="{02A6C647-4F39-4E22-BFA0-7A057A8C404A}" type="datetimeFigureOut">
               <a:rPr lang="nl-NL" smtClean="0"/>
-              <a:t>10-11-2020</a:t>
+              <a:t>11-11-2020</a:t>
             </a:fld>
             <a:endParaRPr lang="nl-NL"/>
           </a:p>
@@ -560,7 +560,7 @@
           <a:p>
             <a:fld id="{02A6C647-4F39-4E22-BFA0-7A057A8C404A}" type="datetimeFigureOut">
               <a:rPr lang="nl-NL" smtClean="0"/>
-              <a:t>10-11-2020</a:t>
+              <a:t>11-11-2020</a:t>
             </a:fld>
             <a:endParaRPr lang="nl-NL"/>
           </a:p>
@@ -768,7 +768,7 @@
           <a:p>
             <a:fld id="{02A6C647-4F39-4E22-BFA0-7A057A8C404A}" type="datetimeFigureOut">
               <a:rPr lang="nl-NL" smtClean="0"/>
-              <a:t>10-11-2020</a:t>
+              <a:t>11-11-2020</a:t>
             </a:fld>
             <a:endParaRPr lang="nl-NL"/>
           </a:p>
@@ -966,7 +966,7 @@
           <a:p>
             <a:fld id="{02A6C647-4F39-4E22-BFA0-7A057A8C404A}" type="datetimeFigureOut">
               <a:rPr lang="nl-NL" smtClean="0"/>
-              <a:t>10-11-2020</a:t>
+              <a:t>11-11-2020</a:t>
             </a:fld>
             <a:endParaRPr lang="nl-NL"/>
           </a:p>
@@ -1241,7 +1241,7 @@
           <a:p>
             <a:fld id="{02A6C647-4F39-4E22-BFA0-7A057A8C404A}" type="datetimeFigureOut">
               <a:rPr lang="nl-NL" smtClean="0"/>
-              <a:t>10-11-2020</a:t>
+              <a:t>11-11-2020</a:t>
             </a:fld>
             <a:endParaRPr lang="nl-NL"/>
           </a:p>
@@ -1506,7 +1506,7 @@
           <a:p>
             <a:fld id="{02A6C647-4F39-4E22-BFA0-7A057A8C404A}" type="datetimeFigureOut">
               <a:rPr lang="nl-NL" smtClean="0"/>
-              <a:t>10-11-2020</a:t>
+              <a:t>11-11-2020</a:t>
             </a:fld>
             <a:endParaRPr lang="nl-NL"/>
           </a:p>
@@ -1918,7 +1918,7 @@
           <a:p>
             <a:fld id="{02A6C647-4F39-4E22-BFA0-7A057A8C404A}" type="datetimeFigureOut">
               <a:rPr lang="nl-NL" smtClean="0"/>
-              <a:t>10-11-2020</a:t>
+              <a:t>11-11-2020</a:t>
             </a:fld>
             <a:endParaRPr lang="nl-NL"/>
           </a:p>
@@ -2059,7 +2059,7 @@
           <a:p>
             <a:fld id="{02A6C647-4F39-4E22-BFA0-7A057A8C404A}" type="datetimeFigureOut">
               <a:rPr lang="nl-NL" smtClean="0"/>
-              <a:t>10-11-2020</a:t>
+              <a:t>11-11-2020</a:t>
             </a:fld>
             <a:endParaRPr lang="nl-NL"/>
           </a:p>
@@ -2172,7 +2172,7 @@
           <a:p>
             <a:fld id="{02A6C647-4F39-4E22-BFA0-7A057A8C404A}" type="datetimeFigureOut">
               <a:rPr lang="nl-NL" smtClean="0"/>
-              <a:t>10-11-2020</a:t>
+              <a:t>11-11-2020</a:t>
             </a:fld>
             <a:endParaRPr lang="nl-NL"/>
           </a:p>
@@ -2483,7 +2483,7 @@
           <a:p>
             <a:fld id="{02A6C647-4F39-4E22-BFA0-7A057A8C404A}" type="datetimeFigureOut">
               <a:rPr lang="nl-NL" smtClean="0"/>
-              <a:t>10-11-2020</a:t>
+              <a:t>11-11-2020</a:t>
             </a:fld>
             <a:endParaRPr lang="nl-NL"/>
           </a:p>
@@ -2771,7 +2771,7 @@
           <a:p>
             <a:fld id="{02A6C647-4F39-4E22-BFA0-7A057A8C404A}" type="datetimeFigureOut">
               <a:rPr lang="nl-NL" smtClean="0"/>
-              <a:t>10-11-2020</a:t>
+              <a:t>11-11-2020</a:t>
             </a:fld>
             <a:endParaRPr lang="nl-NL"/>
           </a:p>
@@ -3012,7 +3012,7 @@
           <a:p>
             <a:fld id="{02A6C647-4F39-4E22-BFA0-7A057A8C404A}" type="datetimeFigureOut">
               <a:rPr lang="nl-NL" smtClean="0"/>
-              <a:t>10-11-2020</a:t>
+              <a:t>11-11-2020</a:t>
             </a:fld>
             <a:endParaRPr lang="nl-NL"/>
           </a:p>
@@ -5186,23 +5186,7 @@
                   <a:schemeClr val="accent1"/>
                 </a:solidFill>
               </a:rPr>
-              <a:t>Toevoegen nieuwe GIO ‘</a:t>
-            </a:r>
-            <a:r>
-              <a:rPr lang="nl-NL">
-                <a:solidFill>
-                  <a:schemeClr val="accent1"/>
-                </a:solidFill>
-              </a:rPr>
-              <a:t>Nieuw centrumgebied’ </a:t>
-            </a:r>
-            <a:r>
-              <a:rPr lang="nl-NL" dirty="0">
-                <a:solidFill>
-                  <a:schemeClr val="accent1"/>
-                </a:solidFill>
-              </a:rPr>
-              <a:t>(</a:t>
+              <a:t>Toevoegen nieuwe GIO ‘Nieuw centrumgebied’ (</a:t>
             </a:r>
             <a:r>
               <a:rPr lang="nl-NL" i="1" dirty="0" err="1">
@@ -5274,6 +5258,78 @@
           </a:p>
         </p:txBody>
       </p:sp>
+      <p:pic>
+        <p:nvPicPr>
+          <p:cNvPr id="5" name="Afbeelding 4">
+            <a:extLst>
+              <a:ext uri="{FF2B5EF4-FFF2-40B4-BE49-F238E27FC236}">
+                <a16:creationId xmlns:a16="http://schemas.microsoft.com/office/drawing/2014/main" id="{E3D3F353-3F50-4D44-B564-CDADEE1E1295}"/>
+              </a:ext>
+            </a:extLst>
+          </p:cNvPr>
+          <p:cNvPicPr>
+            <a:picLocks noChangeAspect="1"/>
+          </p:cNvPicPr>
+          <p:nvPr/>
+        </p:nvPicPr>
+        <p:blipFill>
+          <a:blip r:embed="rId2">
+            <a:extLst>
+              <a:ext uri="{28A0092B-C50C-407E-A947-70E740481C1C}">
+                <a14:useLocalDpi xmlns:a14="http://schemas.microsoft.com/office/drawing/2010/main" val="0"/>
+              </a:ext>
+            </a:extLst>
+          </a:blip>
+          <a:stretch>
+            <a:fillRect/>
+          </a:stretch>
+        </p:blipFill>
+        <p:spPr>
+          <a:xfrm>
+            <a:off x="9990020" y="169462"/>
+            <a:ext cx="1863726" cy="1232324"/>
+          </a:xfrm>
+          <a:prstGeom prst="rect">
+            <a:avLst/>
+          </a:prstGeom>
+        </p:spPr>
+      </p:pic>
+      <p:pic>
+        <p:nvPicPr>
+          <p:cNvPr id="7" name="Afbeelding 6">
+            <a:extLst>
+              <a:ext uri="{FF2B5EF4-FFF2-40B4-BE49-F238E27FC236}">
+                <a16:creationId xmlns:a16="http://schemas.microsoft.com/office/drawing/2014/main" id="{9E4B932A-E8BA-4402-8760-7F4E0B10D871}"/>
+              </a:ext>
+            </a:extLst>
+          </p:cNvPr>
+          <p:cNvPicPr>
+            <a:picLocks noChangeAspect="1"/>
+          </p:cNvPicPr>
+          <p:nvPr/>
+        </p:nvPicPr>
+        <p:blipFill>
+          <a:blip r:embed="rId3">
+            <a:extLst>
+              <a:ext uri="{28A0092B-C50C-407E-A947-70E740481C1C}">
+                <a14:useLocalDpi xmlns:a14="http://schemas.microsoft.com/office/drawing/2010/main" val="0"/>
+              </a:ext>
+            </a:extLst>
+          </a:blip>
+          <a:stretch>
+            <a:fillRect/>
+          </a:stretch>
+        </p:blipFill>
+        <p:spPr>
+          <a:xfrm>
+            <a:off x="9990016" y="1401786"/>
+            <a:ext cx="1863728" cy="1232325"/>
+          </a:xfrm>
+          <a:prstGeom prst="rect">
+            <a:avLst/>
+          </a:prstGeom>
+        </p:spPr>
+      </p:pic>
     </p:spTree>
     <p:extLst>
       <p:ext uri="{BB962C8B-B14F-4D97-AF65-F5344CB8AC3E}">
@@ -9624,12 +9680,6 @@
 </file>
 
 <file path=customXml/item1.xml><?xml version="1.0" encoding="utf-8"?>
-<p:properties xmlns:p="http://schemas.microsoft.com/office/2006/metadata/properties" xmlns:xsi="http://www.w3.org/2001/XMLSchema-instance" xmlns:pc="http://schemas.microsoft.com/office/infopath/2007/PartnerControls">
-  <documentManagement/>
-</p:properties>
-</file>
-
-<file path=customXml/item2.xml><?xml version="1.0" encoding="utf-8"?>
 <ct:contentTypeSchema xmlns:ct="http://schemas.microsoft.com/office/2006/metadata/contentType" xmlns:ma="http://schemas.microsoft.com/office/2006/metadata/properties/metaAttributes" ct:_="" ma:_="" ma:contentTypeName="Document" ma:contentTypeID="0x0101003ADD3040E3157B4E913BCA65F34844D7" ma:contentTypeVersion="10" ma:contentTypeDescription="Een nieuw document maken." ma:contentTypeScope="" ma:versionID="c1765059aa1475931adc12138fdcfd8c">
   <xsd:schema xmlns:xsd="http://www.w3.org/2001/XMLSchema" xmlns:xs="http://www.w3.org/2001/XMLSchema" xmlns:p="http://schemas.microsoft.com/office/2006/metadata/properties" xmlns:ns2="aafb19fa-82be-411d-a6df-c75e9235a4ea" xmlns:ns3="3dfebdfe-2b22-40ba-8672-9fbc9b4066c4" targetNamespace="http://schemas.microsoft.com/office/2006/metadata/properties" ma:root="true" ma:fieldsID="42d79c55539af1f9f274032ce6041302" ns2:_="" ns3:_="">
     <xsd:import namespace="aafb19fa-82be-411d-a6df-c75e9235a4ea"/>
@@ -9832,6 +9882,12 @@
 </ct:contentTypeSchema>
 </file>
 
+<file path=customXml/item2.xml><?xml version="1.0" encoding="utf-8"?>
+<p:properties xmlns:p="http://schemas.microsoft.com/office/2006/metadata/properties" xmlns:xsi="http://www.w3.org/2001/XMLSchema-instance" xmlns:pc="http://schemas.microsoft.com/office/infopath/2007/PartnerControls">
+  <documentManagement/>
+</p:properties>
+</file>
+
 <file path=customXml/item3.xml><?xml version="1.0" encoding="utf-8"?>
 <?mso-contentType ?>
 <FormTemplates xmlns="http://schemas.microsoft.com/sharepoint/v3/contenttype/forms">
@@ -9842,23 +9898,6 @@
 </file>
 
 <file path=customXml/itemProps1.xml><?xml version="1.0" encoding="utf-8"?>
-<ds:datastoreItem xmlns:ds="http://schemas.openxmlformats.org/officeDocument/2006/customXml" ds:itemID="{44F744C1-7216-4F24-AF2B-C028C1AC510B}">
-  <ds:schemaRefs>
-    <ds:schemaRef ds:uri="http://purl.org/dc/elements/1.1/"/>
-    <ds:schemaRef ds:uri="http://purl.org/dc/terms/"/>
-    <ds:schemaRef ds:uri="3dfebdfe-2b22-40ba-8672-9fbc9b4066c4"/>
-    <ds:schemaRef ds:uri="http://www.w3.org/XML/1998/namespace"/>
-    <ds:schemaRef ds:uri="http://schemas.microsoft.com/office/2006/documentManagement/types"/>
-    <ds:schemaRef ds:uri="http://schemas.microsoft.com/office/2006/metadata/properties"/>
-    <ds:schemaRef ds:uri="http://purl.org/dc/dcmitype/"/>
-    <ds:schemaRef ds:uri="http://schemas.microsoft.com/office/infopath/2007/PartnerControls"/>
-    <ds:schemaRef ds:uri="http://schemas.openxmlformats.org/package/2006/metadata/core-properties"/>
-    <ds:schemaRef ds:uri="aafb19fa-82be-411d-a6df-c75e9235a4ea"/>
-  </ds:schemaRefs>
-</ds:datastoreItem>
-</file>
-
-<file path=customXml/itemProps2.xml><?xml version="1.0" encoding="utf-8"?>
 <ds:datastoreItem xmlns:ds="http://schemas.openxmlformats.org/officeDocument/2006/customXml" ds:itemID="{86B9146A-7E8D-43BD-BCDA-EAF916D7BF88}">
   <ds:schemaRefs>
     <ds:schemaRef ds:uri="http://schemas.microsoft.com/office/2006/metadata/contentType"/>
@@ -9877,6 +9916,23 @@
 </ds:datastoreItem>
 </file>
 
+<file path=customXml/itemProps2.xml><?xml version="1.0" encoding="utf-8"?>
+<ds:datastoreItem xmlns:ds="http://schemas.openxmlformats.org/officeDocument/2006/customXml" ds:itemID="{44F744C1-7216-4F24-AF2B-C028C1AC510B}">
+  <ds:schemaRefs>
+    <ds:schemaRef ds:uri="http://purl.org/dc/elements/1.1/"/>
+    <ds:schemaRef ds:uri="http://purl.org/dc/terms/"/>
+    <ds:schemaRef ds:uri="3dfebdfe-2b22-40ba-8672-9fbc9b4066c4"/>
+    <ds:schemaRef ds:uri="http://www.w3.org/XML/1998/namespace"/>
+    <ds:schemaRef ds:uri="http://schemas.microsoft.com/office/2006/documentManagement/types"/>
+    <ds:schemaRef ds:uri="http://schemas.microsoft.com/office/2006/metadata/properties"/>
+    <ds:schemaRef ds:uri="http://purl.org/dc/dcmitype/"/>
+    <ds:schemaRef ds:uri="http://schemas.microsoft.com/office/infopath/2007/PartnerControls"/>
+    <ds:schemaRef ds:uri="http://schemas.openxmlformats.org/package/2006/metadata/core-properties"/>
+    <ds:schemaRef ds:uri="aafb19fa-82be-411d-a6df-c75e9235a4ea"/>
+  </ds:schemaRefs>
+</ds:datastoreItem>
+</file>
+
 <file path=customXml/itemProps3.xml><?xml version="1.0" encoding="utf-8"?>
 <ds:datastoreItem xmlns:ds="http://schemas.openxmlformats.org/officeDocument/2006/customXml" ds:itemID="{F8CFDD08-2AF3-45C0-9BFB-55C0CB45D846}">
   <ds:schemaRefs>

</xml_diff>

<commit_message>
3a2 weggegooid en powerpoint aangepast
</commit_message>
<xml_diff>
--- a/Submutatiescenario_s.pptx
+++ b/Submutatiescenario_s.pptx
@@ -5,39 +5,40 @@
     <p:sldMasterId id="2147483648" r:id="rId4"/>
   </p:sldMasterIdLst>
   <p:notesMasterIdLst>
-    <p:notesMasterId r:id="rId35"/>
+    <p:notesMasterId r:id="rId36"/>
   </p:notesMasterIdLst>
   <p:sldIdLst>
     <p:sldId id="256" r:id="rId5"/>
     <p:sldId id="257" r:id="rId6"/>
     <p:sldId id="297" r:id="rId7"/>
     <p:sldId id="263" r:id="rId8"/>
-    <p:sldId id="264" r:id="rId9"/>
-    <p:sldId id="278" r:id="rId10"/>
-    <p:sldId id="295" r:id="rId11"/>
-    <p:sldId id="296" r:id="rId12"/>
-    <p:sldId id="294" r:id="rId13"/>
-    <p:sldId id="290" r:id="rId14"/>
-    <p:sldId id="289" r:id="rId15"/>
-    <p:sldId id="293" r:id="rId16"/>
-    <p:sldId id="266" r:id="rId17"/>
-    <p:sldId id="265" r:id="rId18"/>
-    <p:sldId id="282" r:id="rId19"/>
-    <p:sldId id="268" r:id="rId20"/>
-    <p:sldId id="269" r:id="rId21"/>
-    <p:sldId id="270" r:id="rId22"/>
-    <p:sldId id="271" r:id="rId23"/>
-    <p:sldId id="273" r:id="rId24"/>
-    <p:sldId id="274" r:id="rId25"/>
-    <p:sldId id="272" r:id="rId26"/>
-    <p:sldId id="291" r:id="rId27"/>
-    <p:sldId id="285" r:id="rId28"/>
-    <p:sldId id="286" r:id="rId29"/>
-    <p:sldId id="287" r:id="rId30"/>
-    <p:sldId id="288" r:id="rId31"/>
-    <p:sldId id="284" r:id="rId32"/>
-    <p:sldId id="292" r:id="rId33"/>
-    <p:sldId id="280" r:id="rId34"/>
+    <p:sldId id="298" r:id="rId9"/>
+    <p:sldId id="264" r:id="rId10"/>
+    <p:sldId id="278" r:id="rId11"/>
+    <p:sldId id="295" r:id="rId12"/>
+    <p:sldId id="296" r:id="rId13"/>
+    <p:sldId id="294" r:id="rId14"/>
+    <p:sldId id="290" r:id="rId15"/>
+    <p:sldId id="289" r:id="rId16"/>
+    <p:sldId id="293" r:id="rId17"/>
+    <p:sldId id="266" r:id="rId18"/>
+    <p:sldId id="265" r:id="rId19"/>
+    <p:sldId id="282" r:id="rId20"/>
+    <p:sldId id="268" r:id="rId21"/>
+    <p:sldId id="269" r:id="rId22"/>
+    <p:sldId id="270" r:id="rId23"/>
+    <p:sldId id="271" r:id="rId24"/>
+    <p:sldId id="273" r:id="rId25"/>
+    <p:sldId id="274" r:id="rId26"/>
+    <p:sldId id="272" r:id="rId27"/>
+    <p:sldId id="291" r:id="rId28"/>
+    <p:sldId id="285" r:id="rId29"/>
+    <p:sldId id="286" r:id="rId30"/>
+    <p:sldId id="287" r:id="rId31"/>
+    <p:sldId id="288" r:id="rId32"/>
+    <p:sldId id="284" r:id="rId33"/>
+    <p:sldId id="292" r:id="rId34"/>
+    <p:sldId id="280" r:id="rId35"/>
   </p:sldIdLst>
   <p:sldSz cx="12192000" cy="6858000"/>
   <p:notesSz cx="6858000" cy="9144000"/>
@@ -311,7 +312,7 @@
           <a:p>
             <a:fld id="{2888003D-D75C-40B0-9BFD-C77ECDD13631}" type="datetimeFigureOut">
               <a:rPr lang="nl-NL" smtClean="0"/>
-              <a:t>25-2-2021</a:t>
+              <a:t>8-3-2021</a:t>
             </a:fld>
             <a:endParaRPr lang="nl-NL"/>
           </a:p>
@@ -643,7 +644,7 @@
           <a:p>
             <a:fld id="{6F87DBD9-0F19-45C0-B651-F6A6168026C7}" type="slidenum">
               <a:rPr lang="nl-NL" smtClean="0"/>
-              <a:t>9</a:t>
+              <a:t>10</a:t>
             </a:fld>
             <a:endParaRPr lang="nl-NL"/>
           </a:p>
@@ -809,7 +810,7 @@
           <a:p>
             <a:fld id="{02A6C647-4F39-4E22-BFA0-7A057A8C404A}" type="datetimeFigureOut">
               <a:rPr lang="nl-NL" smtClean="0"/>
-              <a:t>25-2-2021</a:t>
+              <a:t>8-3-2021</a:t>
             </a:fld>
             <a:endParaRPr lang="nl-NL"/>
           </a:p>
@@ -1007,7 +1008,7 @@
           <a:p>
             <a:fld id="{02A6C647-4F39-4E22-BFA0-7A057A8C404A}" type="datetimeFigureOut">
               <a:rPr lang="nl-NL" smtClean="0"/>
-              <a:t>25-2-2021</a:t>
+              <a:t>8-3-2021</a:t>
             </a:fld>
             <a:endParaRPr lang="nl-NL"/>
           </a:p>
@@ -1215,7 +1216,7 @@
           <a:p>
             <a:fld id="{02A6C647-4F39-4E22-BFA0-7A057A8C404A}" type="datetimeFigureOut">
               <a:rPr lang="nl-NL" smtClean="0"/>
-              <a:t>25-2-2021</a:t>
+              <a:t>8-3-2021</a:t>
             </a:fld>
             <a:endParaRPr lang="nl-NL"/>
           </a:p>
@@ -1413,7 +1414,7 @@
           <a:p>
             <a:fld id="{02A6C647-4F39-4E22-BFA0-7A057A8C404A}" type="datetimeFigureOut">
               <a:rPr lang="nl-NL" smtClean="0"/>
-              <a:t>25-2-2021</a:t>
+              <a:t>8-3-2021</a:t>
             </a:fld>
             <a:endParaRPr lang="nl-NL"/>
           </a:p>
@@ -1688,7 +1689,7 @@
           <a:p>
             <a:fld id="{02A6C647-4F39-4E22-BFA0-7A057A8C404A}" type="datetimeFigureOut">
               <a:rPr lang="nl-NL" smtClean="0"/>
-              <a:t>25-2-2021</a:t>
+              <a:t>8-3-2021</a:t>
             </a:fld>
             <a:endParaRPr lang="nl-NL"/>
           </a:p>
@@ -1953,7 +1954,7 @@
           <a:p>
             <a:fld id="{02A6C647-4F39-4E22-BFA0-7A057A8C404A}" type="datetimeFigureOut">
               <a:rPr lang="nl-NL" smtClean="0"/>
-              <a:t>25-2-2021</a:t>
+              <a:t>8-3-2021</a:t>
             </a:fld>
             <a:endParaRPr lang="nl-NL"/>
           </a:p>
@@ -2365,7 +2366,7 @@
           <a:p>
             <a:fld id="{02A6C647-4F39-4E22-BFA0-7A057A8C404A}" type="datetimeFigureOut">
               <a:rPr lang="nl-NL" smtClean="0"/>
-              <a:t>25-2-2021</a:t>
+              <a:t>8-3-2021</a:t>
             </a:fld>
             <a:endParaRPr lang="nl-NL"/>
           </a:p>
@@ -2506,7 +2507,7 @@
           <a:p>
             <a:fld id="{02A6C647-4F39-4E22-BFA0-7A057A8C404A}" type="datetimeFigureOut">
               <a:rPr lang="nl-NL" smtClean="0"/>
-              <a:t>25-2-2021</a:t>
+              <a:t>8-3-2021</a:t>
             </a:fld>
             <a:endParaRPr lang="nl-NL"/>
           </a:p>
@@ -2619,7 +2620,7 @@
           <a:p>
             <a:fld id="{02A6C647-4F39-4E22-BFA0-7A057A8C404A}" type="datetimeFigureOut">
               <a:rPr lang="nl-NL" smtClean="0"/>
-              <a:t>25-2-2021</a:t>
+              <a:t>8-3-2021</a:t>
             </a:fld>
             <a:endParaRPr lang="nl-NL"/>
           </a:p>
@@ -2930,7 +2931,7 @@
           <a:p>
             <a:fld id="{02A6C647-4F39-4E22-BFA0-7A057A8C404A}" type="datetimeFigureOut">
               <a:rPr lang="nl-NL" smtClean="0"/>
-              <a:t>25-2-2021</a:t>
+              <a:t>8-3-2021</a:t>
             </a:fld>
             <a:endParaRPr lang="nl-NL"/>
           </a:p>
@@ -3218,7 +3219,7 @@
           <a:p>
             <a:fld id="{02A6C647-4F39-4E22-BFA0-7A057A8C404A}" type="datetimeFigureOut">
               <a:rPr lang="nl-NL" smtClean="0"/>
-              <a:t>25-2-2021</a:t>
+              <a:t>8-3-2021</a:t>
             </a:fld>
             <a:endParaRPr lang="nl-NL"/>
           </a:p>
@@ -3459,7 +3460,7 @@
           <a:p>
             <a:fld id="{02A6C647-4F39-4E22-BFA0-7A057A8C404A}" type="datetimeFigureOut">
               <a:rPr lang="nl-NL" smtClean="0"/>
-              <a:t>25-2-2021</a:t>
+              <a:t>8-3-2021</a:t>
             </a:fld>
             <a:endParaRPr lang="nl-NL"/>
           </a:p>
@@ -3951,6 +3952,64 @@
           <p:cNvPr id="2" name="Titel 1">
             <a:extLst>
               <a:ext uri="{FF2B5EF4-FFF2-40B4-BE49-F238E27FC236}">
+                <a16:creationId xmlns:a16="http://schemas.microsoft.com/office/drawing/2014/main" id="{7DAAB73D-5E6F-4868-B66D-AC2B7FA78951}"/>
+              </a:ext>
+            </a:extLst>
+          </p:cNvPr>
+          <p:cNvSpPr>
+            <a:spLocks noGrp="1"/>
+          </p:cNvSpPr>
+          <p:nvPr>
+            <p:ph type="title"/>
+          </p:nvPr>
+        </p:nvSpPr>
+        <p:spPr/>
+        <p:txBody>
+          <a:bodyPr/>
+          <a:lstStyle/>
+          <a:p>
+            <a:r>
+              <a:rPr lang="nl-NL" dirty="0"/>
+              <a:t>Beschrijving per scenario</a:t>
+            </a:r>
+          </a:p>
+        </p:txBody>
+      </p:sp>
+    </p:spTree>
+    <p:extLst>
+      <p:ext uri="{BB962C8B-B14F-4D97-AF65-F5344CB8AC3E}">
+        <p14:creationId xmlns:p14="http://schemas.microsoft.com/office/powerpoint/2010/main" val="875504885"/>
+      </p:ext>
+    </p:extLst>
+  </p:cSld>
+  <p:clrMapOvr>
+    <a:masterClrMapping/>
+  </p:clrMapOvr>
+</p:sld>
+</file>
+
+<file path=ppt/slides/slide11.xml><?xml version="1.0" encoding="utf-8"?>
+<p:sld xmlns:a="http://schemas.openxmlformats.org/drawingml/2006/main" xmlns:r="http://schemas.openxmlformats.org/officeDocument/2006/relationships" xmlns:p="http://schemas.openxmlformats.org/presentationml/2006/main">
+  <p:cSld>
+    <p:spTree>
+      <p:nvGrpSpPr>
+        <p:cNvPr id="1" name=""/>
+        <p:cNvGrpSpPr/>
+        <p:nvPr/>
+      </p:nvGrpSpPr>
+      <p:grpSpPr>
+        <a:xfrm>
+          <a:off x="0" y="0"/>
+          <a:ext cx="0" cy="0"/>
+          <a:chOff x="0" y="0"/>
+          <a:chExt cx="0" cy="0"/>
+        </a:xfrm>
+      </p:grpSpPr>
+      <p:sp>
+        <p:nvSpPr>
+          <p:cNvPr id="2" name="Titel 1">
+            <a:extLst>
+              <a:ext uri="{FF2B5EF4-FFF2-40B4-BE49-F238E27FC236}">
                 <a16:creationId xmlns:a16="http://schemas.microsoft.com/office/drawing/2014/main" id="{768FB16B-6690-4D0F-9A4F-8EB04CD6C7FE}"/>
               </a:ext>
             </a:extLst>
@@ -4208,7 +4267,7 @@
 </p:sld>
 </file>
 
-<file path=ppt/slides/slide11.xml><?xml version="1.0" encoding="utf-8"?>
+<file path=ppt/slides/slide12.xml><?xml version="1.0" encoding="utf-8"?>
 <p:sld xmlns:a="http://schemas.openxmlformats.org/drawingml/2006/main" xmlns:r="http://schemas.openxmlformats.org/officeDocument/2006/relationships" xmlns:p="http://schemas.openxmlformats.org/presentationml/2006/main">
   <p:cSld>
     <p:spTree>
@@ -4406,7 +4465,7 @@
 </p:sld>
 </file>
 
-<file path=ppt/slides/slide12.xml><?xml version="1.0" encoding="utf-8"?>
+<file path=ppt/slides/slide13.xml><?xml version="1.0" encoding="utf-8"?>
 <p:sld xmlns:a="http://schemas.openxmlformats.org/drawingml/2006/main" xmlns:r="http://schemas.openxmlformats.org/officeDocument/2006/relationships" xmlns:p="http://schemas.openxmlformats.org/presentationml/2006/main">
   <p:cSld>
     <p:spTree>
@@ -4505,7 +4564,7 @@
 </p:sld>
 </file>
 
-<file path=ppt/slides/slide13.xml><?xml version="1.0" encoding="utf-8"?>
+<file path=ppt/slides/slide14.xml><?xml version="1.0" encoding="utf-8"?>
 <p:sld xmlns:a="http://schemas.openxmlformats.org/drawingml/2006/main" xmlns:r="http://schemas.openxmlformats.org/officeDocument/2006/relationships" xmlns:p="http://schemas.openxmlformats.org/presentationml/2006/main">
   <p:cSld>
     <p:spTree>
@@ -4604,7 +4663,7 @@
 </p:sld>
 </file>
 
-<file path=ppt/slides/slide14.xml><?xml version="1.0" encoding="utf-8"?>
+<file path=ppt/slides/slide15.xml><?xml version="1.0" encoding="utf-8"?>
 <p:sld xmlns:a="http://schemas.openxmlformats.org/drawingml/2006/main" xmlns:r="http://schemas.openxmlformats.org/officeDocument/2006/relationships" xmlns:p="http://schemas.openxmlformats.org/presentationml/2006/main">
   <p:cSld>
     <p:spTree>
@@ -4698,7 +4757,7 @@
 </p:sld>
 </file>
 
-<file path=ppt/slides/slide15.xml><?xml version="1.0" encoding="utf-8"?>
+<file path=ppt/slides/slide16.xml><?xml version="1.0" encoding="utf-8"?>
 <p:sld xmlns:a="http://schemas.openxmlformats.org/drawingml/2006/main" xmlns:r="http://schemas.openxmlformats.org/officeDocument/2006/relationships" xmlns:p="http://schemas.openxmlformats.org/presentationml/2006/main">
   <p:cSld>
     <p:spTree>
@@ -4825,7 +4884,7 @@
 </p:sld>
 </file>
 
-<file path=ppt/slides/slide16.xml><?xml version="1.0" encoding="utf-8"?>
+<file path=ppt/slides/slide17.xml><?xml version="1.0" encoding="utf-8"?>
 <p:sld xmlns:a="http://schemas.openxmlformats.org/drawingml/2006/main" xmlns:r="http://schemas.openxmlformats.org/officeDocument/2006/relationships" xmlns:p="http://schemas.openxmlformats.org/presentationml/2006/main">
   <p:cSld>
     <p:spTree>
@@ -4928,7 +4987,7 @@
 </p:sld>
 </file>
 
-<file path=ppt/slides/slide17.xml><?xml version="1.0" encoding="utf-8"?>
+<file path=ppt/slides/slide18.xml><?xml version="1.0" encoding="utf-8"?>
 <p:sld xmlns:a="http://schemas.openxmlformats.org/drawingml/2006/main" xmlns:r="http://schemas.openxmlformats.org/officeDocument/2006/relationships" xmlns:p="http://schemas.openxmlformats.org/presentationml/2006/main">
   <p:cSld>
     <p:spTree>
@@ -5045,7 +5104,7 @@
 </p:sld>
 </file>
 
-<file path=ppt/slides/slide18.xml><?xml version="1.0" encoding="utf-8"?>
+<file path=ppt/slides/slide19.xml><?xml version="1.0" encoding="utf-8"?>
 <p:sld xmlns:a="http://schemas.openxmlformats.org/drawingml/2006/main" xmlns:r="http://schemas.openxmlformats.org/officeDocument/2006/relationships" xmlns:p="http://schemas.openxmlformats.org/presentationml/2006/main">
   <p:cSld>
     <p:spTree>
@@ -5396,315 +5455,6 @@
     <p:extLst>
       <p:ext uri="{BB962C8B-B14F-4D97-AF65-F5344CB8AC3E}">
         <p14:creationId xmlns:p14="http://schemas.microsoft.com/office/powerpoint/2010/main" val="1142416558"/>
-      </p:ext>
-    </p:extLst>
-  </p:cSld>
-  <p:clrMapOvr>
-    <a:masterClrMapping/>
-  </p:clrMapOvr>
-</p:sld>
-</file>
-
-<file path=ppt/slides/slide19.xml><?xml version="1.0" encoding="utf-8"?>
-<p:sld xmlns:a="http://schemas.openxmlformats.org/drawingml/2006/main" xmlns:r="http://schemas.openxmlformats.org/officeDocument/2006/relationships" xmlns:p="http://schemas.openxmlformats.org/presentationml/2006/main">
-  <p:cSld>
-    <p:spTree>
-      <p:nvGrpSpPr>
-        <p:cNvPr id="1" name=""/>
-        <p:cNvGrpSpPr/>
-        <p:nvPr/>
-      </p:nvGrpSpPr>
-      <p:grpSpPr>
-        <a:xfrm>
-          <a:off x="0" y="0"/>
-          <a:ext cx="0" cy="0"/>
-          <a:chOff x="0" y="0"/>
-          <a:chExt cx="0" cy="0"/>
-        </a:xfrm>
-      </p:grpSpPr>
-      <p:sp>
-        <p:nvSpPr>
-          <p:cNvPr id="2" name="Titel 1">
-            <a:extLst>
-              <a:ext uri="{FF2B5EF4-FFF2-40B4-BE49-F238E27FC236}">
-                <a16:creationId xmlns:a16="http://schemas.microsoft.com/office/drawing/2014/main" id="{31829385-1F91-4EEE-9659-6CA14A8584CD}"/>
-              </a:ext>
-            </a:extLst>
-          </p:cNvPr>
-          <p:cNvSpPr>
-            <a:spLocks noGrp="1"/>
-          </p:cNvSpPr>
-          <p:nvPr>
-            <p:ph type="title"/>
-          </p:nvPr>
-        </p:nvSpPr>
-        <p:spPr/>
-        <p:txBody>
-          <a:bodyPr/>
-          <a:lstStyle/>
-          <a:p>
-            <a:r>
-              <a:rPr lang="nl-NL" b="1" dirty="0"/>
-              <a:t>3d</a:t>
-            </a:r>
-            <a:r>
-              <a:rPr lang="nl-NL" dirty="0"/>
-              <a:t>) verwijderen van het artikel, inclusief het verwijderen van een GIO</a:t>
-            </a:r>
-          </a:p>
-        </p:txBody>
-      </p:sp>
-      <p:sp>
-        <p:nvSpPr>
-          <p:cNvPr id="3" name="Tijdelijke aanduiding voor inhoud 2">
-            <a:extLst>
-              <a:ext uri="{FF2B5EF4-FFF2-40B4-BE49-F238E27FC236}">
-                <a16:creationId xmlns:a16="http://schemas.microsoft.com/office/drawing/2014/main" id="{D61C3116-85D5-4FED-B9E6-8BC2BEED0216}"/>
-              </a:ext>
-            </a:extLst>
-          </p:cNvPr>
-          <p:cNvSpPr>
-            <a:spLocks noGrp="1"/>
-          </p:cNvSpPr>
-          <p:nvPr>
-            <p:ph idx="1"/>
-          </p:nvPr>
-        </p:nvSpPr>
-        <p:spPr/>
-        <p:txBody>
-          <a:bodyPr>
-            <a:normAutofit fontScale="70000" lnSpcReduction="20000"/>
-          </a:bodyPr>
-          <a:lstStyle/>
-          <a:p>
-            <a:r>
-              <a:rPr lang="nl-NL" dirty="0"/>
-              <a:t>In dit mutatiescenario </a:t>
-            </a:r>
-            <a:r>
-              <a:rPr lang="nl-NL" sz="1200" dirty="0"/>
-              <a:t>(#</a:t>
-            </a:r>
-            <a:r>
-              <a:rPr lang="nl-NL" sz="1200" dirty="0" err="1"/>
-              <a:t>doeiStikstofCrisis</a:t>
-            </a:r>
-            <a:r>
-              <a:rPr lang="nl-NL" sz="1200" dirty="0"/>
-              <a:t>)</a:t>
-            </a:r>
-          </a:p>
-          <a:p>
-            <a:pPr lvl="1"/>
-            <a:r>
-              <a:rPr lang="nl-NL" dirty="0"/>
-              <a:t>Hoofdstuk 2</a:t>
-            </a:r>
-          </a:p>
-          <a:p>
-            <a:pPr lvl="2"/>
-            <a:r>
-              <a:rPr lang="nl-NL" dirty="0"/>
-              <a:t>Afdeling 2.4</a:t>
-            </a:r>
-          </a:p>
-          <a:p>
-            <a:pPr lvl="3"/>
-            <a:r>
-              <a:rPr lang="nl-NL" dirty="0"/>
-              <a:t>(</a:t>
-            </a:r>
-            <a:r>
-              <a:rPr lang="nl-NL" b="1" dirty="0">
-                <a:solidFill>
-                  <a:srgbClr val="FF0000"/>
-                </a:solidFill>
-              </a:rPr>
-              <a:t>VERVALLEN</a:t>
-            </a:r>
-            <a:r>
-              <a:rPr lang="nl-NL" dirty="0"/>
-              <a:t>) Artikel 2.12 Omgevingswaarde stikstofdioxide </a:t>
-            </a:r>
-            <a:r>
-              <a:rPr lang="nl-NL" dirty="0">
-                <a:solidFill>
-                  <a:srgbClr val="FF0000"/>
-                </a:solidFill>
-              </a:rPr>
-              <a:t>Einddatum </a:t>
-            </a:r>
-          </a:p>
-          <a:p>
-            <a:pPr lvl="2"/>
-            <a:r>
-              <a:rPr lang="nl-NL" dirty="0"/>
-              <a:t>Afdeling 2.5 </a:t>
-            </a:r>
-          </a:p>
-          <a:p>
-            <a:pPr lvl="3"/>
-            <a:r>
-              <a:rPr lang="nl-NL" dirty="0"/>
-              <a:t>Artikel 2.13: Omgevingsplanactiviteiten bouwen </a:t>
-            </a:r>
-          </a:p>
-          <a:p>
-            <a:pPr lvl="3"/>
-            <a:r>
-              <a:rPr lang="nl-NL" dirty="0"/>
-              <a:t>Artikel 2.14: Bouwregels geluidsgevoelige gebouwen</a:t>
-            </a:r>
-          </a:p>
-          <a:p>
-            <a:pPr lvl="3"/>
-            <a:r>
-              <a:rPr lang="nl-NL" dirty="0"/>
-              <a:t>Artikel 2.15: Bouwregels bedrijfsgebouwen</a:t>
-            </a:r>
-          </a:p>
-          <a:p>
-            <a:r>
-              <a:rPr lang="nl-NL" dirty="0">
-                <a:solidFill>
-                  <a:schemeClr val="accent1"/>
-                </a:solidFill>
-              </a:rPr>
-              <a:t>Beëindigen (</a:t>
-            </a:r>
-            <a:r>
-              <a:rPr lang="nl-NL" i="1" dirty="0">
-                <a:solidFill>
-                  <a:schemeClr val="accent1"/>
-                </a:solidFill>
-              </a:rPr>
-              <a:t>uitzetten/deactiveren) </a:t>
-            </a:r>
-            <a:r>
-              <a:rPr lang="nl-NL" dirty="0">
-                <a:solidFill>
-                  <a:schemeClr val="accent1"/>
-                </a:solidFill>
-              </a:rPr>
-              <a:t>van GIO ‘Zuilichem’(begrippenlijst aanpassen) </a:t>
-            </a:r>
-          </a:p>
-          <a:p>
-            <a:r>
-              <a:rPr lang="nl-NL" dirty="0">
-                <a:solidFill>
-                  <a:schemeClr val="accent6"/>
-                </a:solidFill>
-              </a:rPr>
-              <a:t>Beëindigen van regeltekst (nl.imow-gm0297.regeltekst.2019000009) </a:t>
-            </a:r>
-            <a:r>
-              <a:rPr lang="nl-NL" i="1" dirty="0">
-                <a:solidFill>
-                  <a:schemeClr val="accent6"/>
-                </a:solidFill>
-              </a:rPr>
-              <a:t>(OP-status ‘B’ = beëindigd)</a:t>
-            </a:r>
-          </a:p>
-          <a:p>
-            <a:r>
-              <a:rPr lang="nl-NL" dirty="0">
-                <a:solidFill>
-                  <a:schemeClr val="accent6"/>
-                </a:solidFill>
-              </a:rPr>
-              <a:t>Beëindigen van Juridische regel (Omgevingswaarderegel nl.imow-gm0297.juridischeregel.2019000015) </a:t>
-            </a:r>
-            <a:r>
-              <a:rPr lang="nl-NL" i="1" dirty="0">
-                <a:solidFill>
-                  <a:schemeClr val="accent6"/>
-                </a:solidFill>
-              </a:rPr>
-              <a:t>(OW-status ‘B’ = beëindigd)</a:t>
-            </a:r>
-            <a:endParaRPr lang="nl-NL" dirty="0">
-              <a:solidFill>
-                <a:schemeClr val="accent6"/>
-              </a:solidFill>
-            </a:endParaRPr>
-          </a:p>
-          <a:p>
-            <a:r>
-              <a:rPr lang="nl-NL" strike="sngStrike" dirty="0">
-                <a:solidFill>
-                  <a:schemeClr val="accent6"/>
-                </a:solidFill>
-              </a:rPr>
-              <a:t>Beëindigen van normwaarde (nl.imow-gm0037.normwaarde.20190001). </a:t>
-            </a:r>
-            <a:r>
-              <a:rPr lang="nl-NL" i="1" strike="sngStrike" dirty="0">
-                <a:solidFill>
-                  <a:schemeClr val="accent6"/>
-                </a:solidFill>
-              </a:rPr>
-              <a:t>(status ‘Beëindigd’)</a:t>
-            </a:r>
-            <a:endParaRPr lang="nl-NL" strike="sngStrike" dirty="0">
-              <a:solidFill>
-                <a:schemeClr val="accent6"/>
-              </a:solidFill>
-            </a:endParaRPr>
-          </a:p>
-          <a:p>
-            <a:r>
-              <a:rPr lang="nl-NL" dirty="0">
-                <a:solidFill>
-                  <a:schemeClr val="accent6"/>
-                </a:solidFill>
-              </a:rPr>
-              <a:t>Beëindigen van omgevingswaarde (nl.imow-gm0297.omgevingswaarde.2019000001) </a:t>
-            </a:r>
-            <a:r>
-              <a:rPr lang="nl-NL" i="1" dirty="0">
-                <a:solidFill>
-                  <a:schemeClr val="accent6"/>
-                </a:solidFill>
-              </a:rPr>
-              <a:t>(status ‘B’ = beëindigd)</a:t>
-            </a:r>
-            <a:endParaRPr lang="nl-NL" dirty="0">
-              <a:solidFill>
-                <a:schemeClr val="accent6"/>
-              </a:solidFill>
-            </a:endParaRPr>
-          </a:p>
-          <a:p>
-            <a:r>
-              <a:rPr lang="nl-NL" strike="sngStrike" dirty="0">
-                <a:solidFill>
-                  <a:schemeClr val="accent6"/>
-                </a:solidFill>
-              </a:rPr>
-              <a:t>Beëindigen van locatie (nl.imow-gm0297.gebied.2019000011) </a:t>
-            </a:r>
-            <a:r>
-              <a:rPr lang="nl-NL" i="1" strike="sngStrike" dirty="0">
-                <a:solidFill>
-                  <a:schemeClr val="accent6"/>
-                </a:solidFill>
-              </a:rPr>
-              <a:t>(status ‘Beëindigd’ )</a:t>
-            </a:r>
-            <a:endParaRPr lang="nl-NL" strike="sngStrike" dirty="0">
-              <a:solidFill>
-                <a:schemeClr val="accent6"/>
-              </a:solidFill>
-            </a:endParaRPr>
-          </a:p>
-        </p:txBody>
-      </p:sp>
-    </p:spTree>
-    <p:extLst>
-      <p:ext uri="{BB962C8B-B14F-4D97-AF65-F5344CB8AC3E}">
-        <p14:creationId xmlns:p14="http://schemas.microsoft.com/office/powerpoint/2010/main" val="4201062499"/>
       </p:ext>
     </p:extLst>
   </p:cSld>
@@ -6436,6 +6186,315 @@
           <p:cNvPr id="2" name="Titel 1">
             <a:extLst>
               <a:ext uri="{FF2B5EF4-FFF2-40B4-BE49-F238E27FC236}">
+                <a16:creationId xmlns:a16="http://schemas.microsoft.com/office/drawing/2014/main" id="{31829385-1F91-4EEE-9659-6CA14A8584CD}"/>
+              </a:ext>
+            </a:extLst>
+          </p:cNvPr>
+          <p:cNvSpPr>
+            <a:spLocks noGrp="1"/>
+          </p:cNvSpPr>
+          <p:nvPr>
+            <p:ph type="title"/>
+          </p:nvPr>
+        </p:nvSpPr>
+        <p:spPr/>
+        <p:txBody>
+          <a:bodyPr/>
+          <a:lstStyle/>
+          <a:p>
+            <a:r>
+              <a:rPr lang="nl-NL" b="1" dirty="0"/>
+              <a:t>3d</a:t>
+            </a:r>
+            <a:r>
+              <a:rPr lang="nl-NL" dirty="0"/>
+              <a:t>) verwijderen van het artikel, inclusief het verwijderen van een GIO</a:t>
+            </a:r>
+          </a:p>
+        </p:txBody>
+      </p:sp>
+      <p:sp>
+        <p:nvSpPr>
+          <p:cNvPr id="3" name="Tijdelijke aanduiding voor inhoud 2">
+            <a:extLst>
+              <a:ext uri="{FF2B5EF4-FFF2-40B4-BE49-F238E27FC236}">
+                <a16:creationId xmlns:a16="http://schemas.microsoft.com/office/drawing/2014/main" id="{D61C3116-85D5-4FED-B9E6-8BC2BEED0216}"/>
+              </a:ext>
+            </a:extLst>
+          </p:cNvPr>
+          <p:cNvSpPr>
+            <a:spLocks noGrp="1"/>
+          </p:cNvSpPr>
+          <p:nvPr>
+            <p:ph idx="1"/>
+          </p:nvPr>
+        </p:nvSpPr>
+        <p:spPr/>
+        <p:txBody>
+          <a:bodyPr>
+            <a:normAutofit fontScale="70000" lnSpcReduction="20000"/>
+          </a:bodyPr>
+          <a:lstStyle/>
+          <a:p>
+            <a:r>
+              <a:rPr lang="nl-NL" dirty="0"/>
+              <a:t>In dit mutatiescenario </a:t>
+            </a:r>
+            <a:r>
+              <a:rPr lang="nl-NL" sz="1200" dirty="0"/>
+              <a:t>(#</a:t>
+            </a:r>
+            <a:r>
+              <a:rPr lang="nl-NL" sz="1200" dirty="0" err="1"/>
+              <a:t>doeiStikstofCrisis</a:t>
+            </a:r>
+            <a:r>
+              <a:rPr lang="nl-NL" sz="1200" dirty="0"/>
+              <a:t>)</a:t>
+            </a:r>
+          </a:p>
+          <a:p>
+            <a:pPr lvl="1"/>
+            <a:r>
+              <a:rPr lang="nl-NL" dirty="0"/>
+              <a:t>Hoofdstuk 2</a:t>
+            </a:r>
+          </a:p>
+          <a:p>
+            <a:pPr lvl="2"/>
+            <a:r>
+              <a:rPr lang="nl-NL" dirty="0"/>
+              <a:t>Afdeling 2.4</a:t>
+            </a:r>
+          </a:p>
+          <a:p>
+            <a:pPr lvl="3"/>
+            <a:r>
+              <a:rPr lang="nl-NL" dirty="0"/>
+              <a:t>(</a:t>
+            </a:r>
+            <a:r>
+              <a:rPr lang="nl-NL" b="1" dirty="0">
+                <a:solidFill>
+                  <a:srgbClr val="FF0000"/>
+                </a:solidFill>
+              </a:rPr>
+              <a:t>VERVALLEN</a:t>
+            </a:r>
+            <a:r>
+              <a:rPr lang="nl-NL" dirty="0"/>
+              <a:t>) Artikel 2.12 Omgevingswaarde stikstofdioxide </a:t>
+            </a:r>
+            <a:r>
+              <a:rPr lang="nl-NL" dirty="0">
+                <a:solidFill>
+                  <a:srgbClr val="FF0000"/>
+                </a:solidFill>
+              </a:rPr>
+              <a:t>Einddatum </a:t>
+            </a:r>
+          </a:p>
+          <a:p>
+            <a:pPr lvl="2"/>
+            <a:r>
+              <a:rPr lang="nl-NL" dirty="0"/>
+              <a:t>Afdeling 2.5 </a:t>
+            </a:r>
+          </a:p>
+          <a:p>
+            <a:pPr lvl="3"/>
+            <a:r>
+              <a:rPr lang="nl-NL" dirty="0"/>
+              <a:t>Artikel 2.13: Omgevingsplanactiviteiten bouwen </a:t>
+            </a:r>
+          </a:p>
+          <a:p>
+            <a:pPr lvl="3"/>
+            <a:r>
+              <a:rPr lang="nl-NL" dirty="0"/>
+              <a:t>Artikel 2.14: Bouwregels geluidsgevoelige gebouwen</a:t>
+            </a:r>
+          </a:p>
+          <a:p>
+            <a:pPr lvl="3"/>
+            <a:r>
+              <a:rPr lang="nl-NL" dirty="0"/>
+              <a:t>Artikel 2.15: Bouwregels bedrijfsgebouwen</a:t>
+            </a:r>
+          </a:p>
+          <a:p>
+            <a:r>
+              <a:rPr lang="nl-NL" dirty="0">
+                <a:solidFill>
+                  <a:schemeClr val="accent1"/>
+                </a:solidFill>
+              </a:rPr>
+              <a:t>Beëindigen (</a:t>
+            </a:r>
+            <a:r>
+              <a:rPr lang="nl-NL" i="1" dirty="0">
+                <a:solidFill>
+                  <a:schemeClr val="accent1"/>
+                </a:solidFill>
+              </a:rPr>
+              <a:t>uitzetten/deactiveren) </a:t>
+            </a:r>
+            <a:r>
+              <a:rPr lang="nl-NL" dirty="0">
+                <a:solidFill>
+                  <a:schemeClr val="accent1"/>
+                </a:solidFill>
+              </a:rPr>
+              <a:t>van GIO ‘Zuilichem’(begrippenlijst aanpassen) </a:t>
+            </a:r>
+          </a:p>
+          <a:p>
+            <a:r>
+              <a:rPr lang="nl-NL" dirty="0">
+                <a:solidFill>
+                  <a:schemeClr val="accent6"/>
+                </a:solidFill>
+              </a:rPr>
+              <a:t>Beëindigen van regeltekst (nl.imow-gm0297.regeltekst.2019000009) </a:t>
+            </a:r>
+            <a:r>
+              <a:rPr lang="nl-NL" i="1" dirty="0">
+                <a:solidFill>
+                  <a:schemeClr val="accent6"/>
+                </a:solidFill>
+              </a:rPr>
+              <a:t>(OP-status ‘B’ = beëindigd)</a:t>
+            </a:r>
+          </a:p>
+          <a:p>
+            <a:r>
+              <a:rPr lang="nl-NL" dirty="0">
+                <a:solidFill>
+                  <a:schemeClr val="accent6"/>
+                </a:solidFill>
+              </a:rPr>
+              <a:t>Beëindigen van Juridische regel (Omgevingswaarderegel nl.imow-gm0297.juridischeregel.2019000015) </a:t>
+            </a:r>
+            <a:r>
+              <a:rPr lang="nl-NL" i="1" dirty="0">
+                <a:solidFill>
+                  <a:schemeClr val="accent6"/>
+                </a:solidFill>
+              </a:rPr>
+              <a:t>(OW-status ‘B’ = beëindigd)</a:t>
+            </a:r>
+            <a:endParaRPr lang="nl-NL" dirty="0">
+              <a:solidFill>
+                <a:schemeClr val="accent6"/>
+              </a:solidFill>
+            </a:endParaRPr>
+          </a:p>
+          <a:p>
+            <a:r>
+              <a:rPr lang="nl-NL" strike="sngStrike" dirty="0">
+                <a:solidFill>
+                  <a:schemeClr val="accent6"/>
+                </a:solidFill>
+              </a:rPr>
+              <a:t>Beëindigen van normwaarde (nl.imow-gm0037.normwaarde.20190001). </a:t>
+            </a:r>
+            <a:r>
+              <a:rPr lang="nl-NL" i="1" strike="sngStrike" dirty="0">
+                <a:solidFill>
+                  <a:schemeClr val="accent6"/>
+                </a:solidFill>
+              </a:rPr>
+              <a:t>(status ‘Beëindigd’)</a:t>
+            </a:r>
+            <a:endParaRPr lang="nl-NL" strike="sngStrike" dirty="0">
+              <a:solidFill>
+                <a:schemeClr val="accent6"/>
+              </a:solidFill>
+            </a:endParaRPr>
+          </a:p>
+          <a:p>
+            <a:r>
+              <a:rPr lang="nl-NL" dirty="0">
+                <a:solidFill>
+                  <a:schemeClr val="accent6"/>
+                </a:solidFill>
+              </a:rPr>
+              <a:t>Beëindigen van omgevingswaarde (nl.imow-gm0297.omgevingswaarde.2019000001) </a:t>
+            </a:r>
+            <a:r>
+              <a:rPr lang="nl-NL" i="1" dirty="0">
+                <a:solidFill>
+                  <a:schemeClr val="accent6"/>
+                </a:solidFill>
+              </a:rPr>
+              <a:t>(status ‘B’ = beëindigd)</a:t>
+            </a:r>
+            <a:endParaRPr lang="nl-NL" dirty="0">
+              <a:solidFill>
+                <a:schemeClr val="accent6"/>
+              </a:solidFill>
+            </a:endParaRPr>
+          </a:p>
+          <a:p>
+            <a:r>
+              <a:rPr lang="nl-NL" strike="sngStrike" dirty="0">
+                <a:solidFill>
+                  <a:schemeClr val="accent6"/>
+                </a:solidFill>
+              </a:rPr>
+              <a:t>Beëindigen van locatie (nl.imow-gm0297.gebied.2019000011) </a:t>
+            </a:r>
+            <a:r>
+              <a:rPr lang="nl-NL" i="1" strike="sngStrike" dirty="0">
+                <a:solidFill>
+                  <a:schemeClr val="accent6"/>
+                </a:solidFill>
+              </a:rPr>
+              <a:t>(status ‘Beëindigd’ )</a:t>
+            </a:r>
+            <a:endParaRPr lang="nl-NL" strike="sngStrike" dirty="0">
+              <a:solidFill>
+                <a:schemeClr val="accent6"/>
+              </a:solidFill>
+            </a:endParaRPr>
+          </a:p>
+        </p:txBody>
+      </p:sp>
+    </p:spTree>
+    <p:extLst>
+      <p:ext uri="{BB962C8B-B14F-4D97-AF65-F5344CB8AC3E}">
+        <p14:creationId xmlns:p14="http://schemas.microsoft.com/office/powerpoint/2010/main" val="4201062499"/>
+      </p:ext>
+    </p:extLst>
+  </p:cSld>
+  <p:clrMapOvr>
+    <a:masterClrMapping/>
+  </p:clrMapOvr>
+</p:sld>
+</file>
+
+<file path=ppt/slides/slide21.xml><?xml version="1.0" encoding="utf-8"?>
+<p:sld xmlns:a="http://schemas.openxmlformats.org/drawingml/2006/main" xmlns:r="http://schemas.openxmlformats.org/officeDocument/2006/relationships" xmlns:p="http://schemas.openxmlformats.org/presentationml/2006/main">
+  <p:cSld>
+    <p:spTree>
+      <p:nvGrpSpPr>
+        <p:cNvPr id="1" name=""/>
+        <p:cNvGrpSpPr/>
+        <p:nvPr/>
+      </p:nvGrpSpPr>
+      <p:grpSpPr>
+        <a:xfrm>
+          <a:off x="0" y="0"/>
+          <a:ext cx="0" cy="0"/>
+          <a:chOff x="0" y="0"/>
+          <a:chExt cx="0" cy="0"/>
+        </a:xfrm>
+      </p:grpSpPr>
+      <p:sp>
+        <p:nvSpPr>
+          <p:cNvPr id="2" name="Titel 1">
+            <a:extLst>
+              <a:ext uri="{FF2B5EF4-FFF2-40B4-BE49-F238E27FC236}">
                 <a16:creationId xmlns:a16="http://schemas.microsoft.com/office/drawing/2014/main" id="{4E1D0F46-FFF8-4853-91B8-8EDD77A1FB5E}"/>
               </a:ext>
             </a:extLst>
@@ -6596,7 +6655,7 @@
 </p:sld>
 </file>
 
-<file path=ppt/slides/slide21.xml><?xml version="1.0" encoding="utf-8"?>
+<file path=ppt/slides/slide22.xml><?xml version="1.0" encoding="utf-8"?>
 <p:sld xmlns:a="http://schemas.openxmlformats.org/drawingml/2006/main" xmlns:r="http://schemas.openxmlformats.org/officeDocument/2006/relationships" xmlns:p="http://schemas.openxmlformats.org/presentationml/2006/main">
   <p:cSld>
     <p:spTree>
@@ -6756,7 +6815,7 @@
 </p:sld>
 </file>
 
-<file path=ppt/slides/slide22.xml><?xml version="1.0" encoding="utf-8"?>
+<file path=ppt/slides/slide23.xml><?xml version="1.0" encoding="utf-8"?>
 <p:sld xmlns:a="http://schemas.openxmlformats.org/drawingml/2006/main" xmlns:r="http://schemas.openxmlformats.org/officeDocument/2006/relationships" xmlns:p="http://schemas.openxmlformats.org/presentationml/2006/main">
   <p:cSld>
     <p:spTree>
@@ -7169,7 +7228,7 @@
 </p:sld>
 </file>
 
-<file path=ppt/slides/slide23.xml><?xml version="1.0" encoding="utf-8"?>
+<file path=ppt/slides/slide24.xml><?xml version="1.0" encoding="utf-8"?>
 <p:sld xmlns:a="http://schemas.openxmlformats.org/drawingml/2006/main" xmlns:r="http://schemas.openxmlformats.org/officeDocument/2006/relationships" xmlns:p="http://schemas.openxmlformats.org/presentationml/2006/main">
   <p:cSld>
     <p:spTree>
@@ -7481,7 +7540,7 @@
 </p:sld>
 </file>
 
-<file path=ppt/slides/slide24.xml><?xml version="1.0" encoding="utf-8"?>
+<file path=ppt/slides/slide25.xml><?xml version="1.0" encoding="utf-8"?>
 <p:sld xmlns:a="http://schemas.openxmlformats.org/drawingml/2006/main" xmlns:r="http://schemas.openxmlformats.org/officeDocument/2006/relationships" xmlns:p="http://schemas.openxmlformats.org/presentationml/2006/main">
   <p:cSld>
     <p:spTree>
@@ -7579,7 +7638,7 @@
 </p:sld>
 </file>
 
-<file path=ppt/slides/slide25.xml><?xml version="1.0" encoding="utf-8"?>
+<file path=ppt/slides/slide26.xml><?xml version="1.0" encoding="utf-8"?>
 <p:sld xmlns:a="http://schemas.openxmlformats.org/drawingml/2006/main" xmlns:r="http://schemas.openxmlformats.org/officeDocument/2006/relationships" xmlns:p="http://schemas.openxmlformats.org/presentationml/2006/main">
   <p:cSld>
     <p:spTree>
@@ -7671,7 +7730,7 @@
 </p:sld>
 </file>
 
-<file path=ppt/slides/slide26.xml><?xml version="1.0" encoding="utf-8"?>
+<file path=ppt/slides/slide27.xml><?xml version="1.0" encoding="utf-8"?>
 <p:sld xmlns:a="http://schemas.openxmlformats.org/drawingml/2006/main" xmlns:r="http://schemas.openxmlformats.org/officeDocument/2006/relationships" xmlns:p="http://schemas.openxmlformats.org/presentationml/2006/main">
   <p:cSld>
     <p:spTree>
@@ -7782,7 +7841,7 @@
 </p:sld>
 </file>
 
-<file path=ppt/slides/slide27.xml><?xml version="1.0" encoding="utf-8"?>
+<file path=ppt/slides/slide28.xml><?xml version="1.0" encoding="utf-8"?>
 <p:sld xmlns:a="http://schemas.openxmlformats.org/drawingml/2006/main" xmlns:r="http://schemas.openxmlformats.org/officeDocument/2006/relationships" xmlns:p="http://schemas.openxmlformats.org/presentationml/2006/main">
   <p:cSld>
     <p:spTree>
@@ -7874,449 +7933,6 @@
     <p:extLst>
       <p:ext uri="{BB962C8B-B14F-4D97-AF65-F5344CB8AC3E}">
         <p14:creationId xmlns:p14="http://schemas.microsoft.com/office/powerpoint/2010/main" val="170492483"/>
-      </p:ext>
-    </p:extLst>
-  </p:cSld>
-  <p:clrMapOvr>
-    <a:masterClrMapping/>
-  </p:clrMapOvr>
-</p:sld>
-</file>
-
-<file path=ppt/slides/slide28.xml><?xml version="1.0" encoding="utf-8"?>
-<p:sld xmlns:a="http://schemas.openxmlformats.org/drawingml/2006/main" xmlns:r="http://schemas.openxmlformats.org/officeDocument/2006/relationships" xmlns:p="http://schemas.openxmlformats.org/presentationml/2006/main">
-  <p:cSld>
-    <p:spTree>
-      <p:nvGrpSpPr>
-        <p:cNvPr id="1" name=""/>
-        <p:cNvGrpSpPr/>
-        <p:nvPr/>
-      </p:nvGrpSpPr>
-      <p:grpSpPr>
-        <a:xfrm>
-          <a:off x="0" y="0"/>
-          <a:ext cx="0" cy="0"/>
-          <a:chOff x="0" y="0"/>
-          <a:chExt cx="0" cy="0"/>
-        </a:xfrm>
-      </p:grpSpPr>
-      <p:sp>
-        <p:nvSpPr>
-          <p:cNvPr id="2" name="Titel 1">
-            <a:extLst>
-              <a:ext uri="{FF2B5EF4-FFF2-40B4-BE49-F238E27FC236}">
-                <a16:creationId xmlns:a16="http://schemas.microsoft.com/office/drawing/2014/main" id="{C2A956C4-5E44-4751-B273-9E73A48D4496}"/>
-              </a:ext>
-            </a:extLst>
-          </p:cNvPr>
-          <p:cNvSpPr>
-            <a:spLocks noGrp="1"/>
-          </p:cNvSpPr>
-          <p:nvPr>
-            <p:ph type="title"/>
-          </p:nvPr>
-        </p:nvSpPr>
-        <p:spPr/>
-        <p:txBody>
-          <a:bodyPr/>
-          <a:lstStyle/>
-          <a:p>
-            <a:r>
-              <a:rPr lang="nl-NL" dirty="0"/>
-              <a:t>10e) toevoegen van activiteiten</a:t>
-            </a:r>
-          </a:p>
-        </p:txBody>
-      </p:sp>
-      <p:sp>
-        <p:nvSpPr>
-          <p:cNvPr id="6" name="Tijdelijke aanduiding voor inhoud 2">
-            <a:extLst>
-              <a:ext uri="{FF2B5EF4-FFF2-40B4-BE49-F238E27FC236}">
-                <a16:creationId xmlns:a16="http://schemas.microsoft.com/office/drawing/2014/main" id="{B22DD6BB-B5E9-46E5-B458-1F56FA4F59FD}"/>
-              </a:ext>
-            </a:extLst>
-          </p:cNvPr>
-          <p:cNvSpPr txBox="1">
-            <a:spLocks/>
-          </p:cNvSpPr>
-          <p:nvPr/>
-        </p:nvSpPr>
-        <p:spPr>
-          <a:xfrm>
-            <a:off x="838200" y="1690688"/>
-            <a:ext cx="10515600" cy="4351338"/>
-          </a:xfrm>
-          <a:prstGeom prst="rect">
-            <a:avLst/>
-          </a:prstGeom>
-        </p:spPr>
-        <p:txBody>
-          <a:bodyPr vert="horz" lIns="91440" tIns="45720" rIns="91440" bIns="45720" rtlCol="0">
-            <a:normAutofit/>
-          </a:bodyPr>
-          <a:lstStyle>
-            <a:lvl1pPr marL="228600" indent="-228600" algn="l" defTabSz="914400" rtl="0" eaLnBrk="1" latinLnBrk="0" hangingPunct="1">
-              <a:lnSpc>
-                <a:spcPct val="90000"/>
-              </a:lnSpc>
-              <a:spcBef>
-                <a:spcPts val="1000"/>
-              </a:spcBef>
-              <a:buFont typeface="Arial" panose="020B0604020202020204" pitchFamily="34" charset="0"/>
-              <a:buChar char="•"/>
-              <a:defRPr sz="2800" kern="1200">
-                <a:solidFill>
-                  <a:schemeClr val="tx1"/>
-                </a:solidFill>
-                <a:latin typeface="+mn-lt"/>
-                <a:ea typeface="+mn-ea"/>
-                <a:cs typeface="+mn-cs"/>
-              </a:defRPr>
-            </a:lvl1pPr>
-            <a:lvl2pPr marL="685800" indent="-228600" algn="l" defTabSz="914400" rtl="0" eaLnBrk="1" latinLnBrk="0" hangingPunct="1">
-              <a:lnSpc>
-                <a:spcPct val="90000"/>
-              </a:lnSpc>
-              <a:spcBef>
-                <a:spcPts val="500"/>
-              </a:spcBef>
-              <a:buFont typeface="Arial" panose="020B0604020202020204" pitchFamily="34" charset="0"/>
-              <a:buChar char="•"/>
-              <a:defRPr sz="2400" kern="1200">
-                <a:solidFill>
-                  <a:schemeClr val="tx1"/>
-                </a:solidFill>
-                <a:latin typeface="+mn-lt"/>
-                <a:ea typeface="+mn-ea"/>
-                <a:cs typeface="+mn-cs"/>
-              </a:defRPr>
-            </a:lvl2pPr>
-            <a:lvl3pPr marL="1143000" indent="-228600" algn="l" defTabSz="914400" rtl="0" eaLnBrk="1" latinLnBrk="0" hangingPunct="1">
-              <a:lnSpc>
-                <a:spcPct val="90000"/>
-              </a:lnSpc>
-              <a:spcBef>
-                <a:spcPts val="500"/>
-              </a:spcBef>
-              <a:buFont typeface="Arial" panose="020B0604020202020204" pitchFamily="34" charset="0"/>
-              <a:buChar char="•"/>
-              <a:defRPr sz="2000" kern="1200">
-                <a:solidFill>
-                  <a:schemeClr val="tx1"/>
-                </a:solidFill>
-                <a:latin typeface="+mn-lt"/>
-                <a:ea typeface="+mn-ea"/>
-                <a:cs typeface="+mn-cs"/>
-              </a:defRPr>
-            </a:lvl3pPr>
-            <a:lvl4pPr marL="1600200" indent="-228600" algn="l" defTabSz="914400" rtl="0" eaLnBrk="1" latinLnBrk="0" hangingPunct="1">
-              <a:lnSpc>
-                <a:spcPct val="90000"/>
-              </a:lnSpc>
-              <a:spcBef>
-                <a:spcPts val="500"/>
-              </a:spcBef>
-              <a:buFont typeface="Arial" panose="020B0604020202020204" pitchFamily="34" charset="0"/>
-              <a:buChar char="•"/>
-              <a:defRPr sz="1800" kern="1200">
-                <a:solidFill>
-                  <a:schemeClr val="tx1"/>
-                </a:solidFill>
-                <a:latin typeface="+mn-lt"/>
-                <a:ea typeface="+mn-ea"/>
-                <a:cs typeface="+mn-cs"/>
-              </a:defRPr>
-            </a:lvl4pPr>
-            <a:lvl5pPr marL="2057400" indent="-228600" algn="l" defTabSz="914400" rtl="0" eaLnBrk="1" latinLnBrk="0" hangingPunct="1">
-              <a:lnSpc>
-                <a:spcPct val="90000"/>
-              </a:lnSpc>
-              <a:spcBef>
-                <a:spcPts val="500"/>
-              </a:spcBef>
-              <a:buFont typeface="Arial" panose="020B0604020202020204" pitchFamily="34" charset="0"/>
-              <a:buChar char="•"/>
-              <a:defRPr sz="1800" kern="1200">
-                <a:solidFill>
-                  <a:schemeClr val="tx1"/>
-                </a:solidFill>
-                <a:latin typeface="+mn-lt"/>
-                <a:ea typeface="+mn-ea"/>
-                <a:cs typeface="+mn-cs"/>
-              </a:defRPr>
-            </a:lvl5pPr>
-            <a:lvl6pPr marL="2514600" indent="-228600" algn="l" defTabSz="914400" rtl="0" eaLnBrk="1" latinLnBrk="0" hangingPunct="1">
-              <a:lnSpc>
-                <a:spcPct val="90000"/>
-              </a:lnSpc>
-              <a:spcBef>
-                <a:spcPts val="500"/>
-              </a:spcBef>
-              <a:buFont typeface="Arial" panose="020B0604020202020204" pitchFamily="34" charset="0"/>
-              <a:buChar char="•"/>
-              <a:defRPr sz="1800" kern="1200">
-                <a:solidFill>
-                  <a:schemeClr val="tx1"/>
-                </a:solidFill>
-                <a:latin typeface="+mn-lt"/>
-                <a:ea typeface="+mn-ea"/>
-                <a:cs typeface="+mn-cs"/>
-              </a:defRPr>
-            </a:lvl6pPr>
-            <a:lvl7pPr marL="2971800" indent="-228600" algn="l" defTabSz="914400" rtl="0" eaLnBrk="1" latinLnBrk="0" hangingPunct="1">
-              <a:lnSpc>
-                <a:spcPct val="90000"/>
-              </a:lnSpc>
-              <a:spcBef>
-                <a:spcPts val="500"/>
-              </a:spcBef>
-              <a:buFont typeface="Arial" panose="020B0604020202020204" pitchFamily="34" charset="0"/>
-              <a:buChar char="•"/>
-              <a:defRPr sz="1800" kern="1200">
-                <a:solidFill>
-                  <a:schemeClr val="tx1"/>
-                </a:solidFill>
-                <a:latin typeface="+mn-lt"/>
-                <a:ea typeface="+mn-ea"/>
-                <a:cs typeface="+mn-cs"/>
-              </a:defRPr>
-            </a:lvl7pPr>
-            <a:lvl8pPr marL="3429000" indent="-228600" algn="l" defTabSz="914400" rtl="0" eaLnBrk="1" latinLnBrk="0" hangingPunct="1">
-              <a:lnSpc>
-                <a:spcPct val="90000"/>
-              </a:lnSpc>
-              <a:spcBef>
-                <a:spcPts val="500"/>
-              </a:spcBef>
-              <a:buFont typeface="Arial" panose="020B0604020202020204" pitchFamily="34" charset="0"/>
-              <a:buChar char="•"/>
-              <a:defRPr sz="1800" kern="1200">
-                <a:solidFill>
-                  <a:schemeClr val="tx1"/>
-                </a:solidFill>
-                <a:latin typeface="+mn-lt"/>
-                <a:ea typeface="+mn-ea"/>
-                <a:cs typeface="+mn-cs"/>
-              </a:defRPr>
-            </a:lvl8pPr>
-            <a:lvl9pPr marL="3886200" indent="-228600" algn="l" defTabSz="914400" rtl="0" eaLnBrk="1" latinLnBrk="0" hangingPunct="1">
-              <a:lnSpc>
-                <a:spcPct val="90000"/>
-              </a:lnSpc>
-              <a:spcBef>
-                <a:spcPts val="500"/>
-              </a:spcBef>
-              <a:buFont typeface="Arial" panose="020B0604020202020204" pitchFamily="34" charset="0"/>
-              <a:buChar char="•"/>
-              <a:defRPr sz="1800" kern="1200">
-                <a:solidFill>
-                  <a:schemeClr val="tx1"/>
-                </a:solidFill>
-                <a:latin typeface="+mn-lt"/>
-                <a:ea typeface="+mn-ea"/>
-                <a:cs typeface="+mn-cs"/>
-              </a:defRPr>
-            </a:lvl9pPr>
-          </a:lstStyle>
-          <a:p>
-            <a:endParaRPr lang="nl-NL" dirty="0"/>
-          </a:p>
-          <a:p>
-            <a:endParaRPr lang="nl-NL" i="1" dirty="0"/>
-          </a:p>
-        </p:txBody>
-      </p:sp>
-      <p:sp>
-        <p:nvSpPr>
-          <p:cNvPr id="7" name="Rechthoek 6">
-            <a:extLst>
-              <a:ext uri="{FF2B5EF4-FFF2-40B4-BE49-F238E27FC236}">
-                <a16:creationId xmlns:a16="http://schemas.microsoft.com/office/drawing/2014/main" id="{565ECE05-7E51-45EC-A3BA-409DC2F62804}"/>
-              </a:ext>
-            </a:extLst>
-          </p:cNvPr>
-          <p:cNvSpPr/>
-          <p:nvPr/>
-        </p:nvSpPr>
-        <p:spPr>
-          <a:xfrm>
-            <a:off x="838200" y="1690688"/>
-            <a:ext cx="6096000" cy="3863558"/>
-          </a:xfrm>
-          <a:prstGeom prst="rect">
-            <a:avLst/>
-          </a:prstGeom>
-        </p:spPr>
-        <p:txBody>
-          <a:bodyPr>
-            <a:spAutoFit/>
-          </a:bodyPr>
-          <a:lstStyle/>
-          <a:p>
-            <a:pPr>
-              <a:lnSpc>
-                <a:spcPct val="107000"/>
-              </a:lnSpc>
-              <a:spcAft>
-                <a:spcPts val="800"/>
-              </a:spcAft>
-            </a:pPr>
-            <a:r>
-              <a:rPr lang="nl-NL" dirty="0">
-                <a:latin typeface="Calibri" panose="020F0502020204030204" pitchFamily="34" charset="0"/>
-                <a:ea typeface="Calibri" panose="020F0502020204030204" pitchFamily="34" charset="0"/>
-                <a:cs typeface="Times New Roman" panose="02020603050405020304" pitchFamily="18" charset="0"/>
-              </a:rPr>
-              <a:t>In de artikeltekst staat onder artikel 2.10:</a:t>
-            </a:r>
-          </a:p>
-          <a:p>
-            <a:pPr>
-              <a:lnSpc>
-                <a:spcPct val="107000"/>
-              </a:lnSpc>
-              <a:spcAft>
-                <a:spcPts val="800"/>
-              </a:spcAft>
-            </a:pPr>
-            <a:r>
-              <a:rPr lang="nl-NL" dirty="0">
-                <a:latin typeface="Calibri" panose="020F0502020204030204" pitchFamily="34" charset="0"/>
-                <a:ea typeface="Calibri" panose="020F0502020204030204" pitchFamily="34" charset="0"/>
-                <a:cs typeface="Times New Roman" panose="02020603050405020304" pitchFamily="18" charset="0"/>
-              </a:rPr>
-              <a:t>l. het sporten;</a:t>
-            </a:r>
-          </a:p>
-          <a:p>
-            <a:pPr>
-              <a:lnSpc>
-                <a:spcPct val="107000"/>
-              </a:lnSpc>
-              <a:spcAft>
-                <a:spcPts val="800"/>
-              </a:spcAft>
-            </a:pPr>
-            <a:r>
-              <a:rPr lang="nl-NL" dirty="0">
-                <a:latin typeface="Calibri" panose="020F0502020204030204" pitchFamily="34" charset="0"/>
-                <a:ea typeface="Calibri" panose="020F0502020204030204" pitchFamily="34" charset="0"/>
-                <a:cs typeface="Times New Roman" panose="02020603050405020304" pitchFamily="18" charset="0"/>
-              </a:rPr>
-              <a:t>m. het wonen;</a:t>
-            </a:r>
-          </a:p>
-          <a:p>
-            <a:pPr>
-              <a:lnSpc>
-                <a:spcPct val="107000"/>
-              </a:lnSpc>
-              <a:spcAft>
-                <a:spcPts val="800"/>
-              </a:spcAft>
-            </a:pPr>
-            <a:r>
-              <a:rPr lang="nl-NL" dirty="0">
-                <a:latin typeface="Calibri" panose="020F0502020204030204" pitchFamily="34" charset="0"/>
-                <a:ea typeface="Calibri" panose="020F0502020204030204" pitchFamily="34" charset="0"/>
-                <a:cs typeface="Times New Roman" panose="02020603050405020304" pitchFamily="18" charset="0"/>
-              </a:rPr>
-              <a:t>n. het uitoefenen van een beroep aan huis;</a:t>
-            </a:r>
-          </a:p>
-          <a:p>
-            <a:pPr>
-              <a:lnSpc>
-                <a:spcPct val="107000"/>
-              </a:lnSpc>
-              <a:spcAft>
-                <a:spcPts val="800"/>
-              </a:spcAft>
-            </a:pPr>
-            <a:r>
-              <a:rPr lang="nl-NL" dirty="0">
-                <a:latin typeface="Calibri" panose="020F0502020204030204" pitchFamily="34" charset="0"/>
-                <a:ea typeface="Calibri" panose="020F0502020204030204" pitchFamily="34" charset="0"/>
-                <a:cs typeface="Times New Roman" panose="02020603050405020304" pitchFamily="18" charset="0"/>
-              </a:rPr>
-              <a:t>o. het exploiteren van een aan de woonfunctie ondergeschikt bedrijf aan huis;</a:t>
-            </a:r>
-          </a:p>
-          <a:p>
-            <a:pPr>
-              <a:lnSpc>
-                <a:spcPct val="107000"/>
-              </a:lnSpc>
-              <a:spcAft>
-                <a:spcPts val="800"/>
-              </a:spcAft>
-            </a:pPr>
-            <a:endParaRPr lang="nl-NL" dirty="0">
-              <a:latin typeface="Calibri" panose="020F0502020204030204" pitchFamily="34" charset="0"/>
-              <a:ea typeface="Calibri" panose="020F0502020204030204" pitchFamily="34" charset="0"/>
-              <a:cs typeface="Times New Roman" panose="02020603050405020304" pitchFamily="18" charset="0"/>
-            </a:endParaRPr>
-          </a:p>
-          <a:p>
-            <a:pPr>
-              <a:lnSpc>
-                <a:spcPct val="107000"/>
-              </a:lnSpc>
-              <a:spcAft>
-                <a:spcPts val="800"/>
-              </a:spcAft>
-            </a:pPr>
-            <a:r>
-              <a:rPr lang="nl-NL" dirty="0">
-                <a:latin typeface="Calibri" panose="020F0502020204030204" pitchFamily="34" charset="0"/>
-                <a:ea typeface="Calibri" panose="020F0502020204030204" pitchFamily="34" charset="0"/>
-                <a:cs typeface="Times New Roman" panose="02020603050405020304" pitchFamily="18" charset="0"/>
-              </a:rPr>
-              <a:t>Dit moet vertaald worden naar: </a:t>
-            </a:r>
-          </a:p>
-          <a:p>
-            <a:pPr marL="285750" indent="-285750">
-              <a:lnSpc>
-                <a:spcPct val="107000"/>
-              </a:lnSpc>
-              <a:spcAft>
-                <a:spcPts val="800"/>
-              </a:spcAft>
-              <a:buFont typeface="Arial" panose="020B0604020202020204" pitchFamily="34" charset="0"/>
-              <a:buChar char="•"/>
-            </a:pPr>
-            <a:r>
-              <a:rPr lang="nl-NL" dirty="0">
-                <a:latin typeface="Calibri" panose="020F0502020204030204" pitchFamily="34" charset="0"/>
-                <a:ea typeface="Calibri" panose="020F0502020204030204" pitchFamily="34" charset="0"/>
-                <a:cs typeface="Times New Roman" panose="02020603050405020304" pitchFamily="18" charset="0"/>
-              </a:rPr>
-              <a:t>vier activiteiten </a:t>
-            </a:r>
-          </a:p>
-          <a:p>
-            <a:pPr>
-              <a:lnSpc>
-                <a:spcPct val="107000"/>
-              </a:lnSpc>
-              <a:spcAft>
-                <a:spcPts val="800"/>
-              </a:spcAft>
-            </a:pPr>
-            <a:endParaRPr lang="nl-NL" dirty="0">
-              <a:latin typeface="Calibri" panose="020F0502020204030204" pitchFamily="34" charset="0"/>
-              <a:ea typeface="Calibri" panose="020F0502020204030204" pitchFamily="34" charset="0"/>
-              <a:cs typeface="Times New Roman" panose="02020603050405020304" pitchFamily="18" charset="0"/>
-            </a:endParaRPr>
-          </a:p>
-        </p:txBody>
-      </p:sp>
-    </p:spTree>
-    <p:extLst>
-      <p:ext uri="{BB962C8B-B14F-4D97-AF65-F5344CB8AC3E}">
-        <p14:creationId xmlns:p14="http://schemas.microsoft.com/office/powerpoint/2010/main" val="1663178534"/>
       </p:ext>
     </p:extLst>
   </p:cSld>
@@ -8366,7 +7982,7 @@
           <a:p>
             <a:r>
               <a:rPr lang="nl-NL" dirty="0"/>
-              <a:t>10f) aanpassen van activiteitengroep</a:t>
+              <a:t>10e) toevoegen van activiteiten</a:t>
             </a:r>
           </a:p>
         </p:txBody>
@@ -8585,7 +8201,7 @@
         <p:spPr>
           <a:xfrm>
             <a:off x="838200" y="1690688"/>
-            <a:ext cx="6096000" cy="5049011"/>
+            <a:ext cx="6096000" cy="3863558"/>
           </a:xfrm>
           <a:prstGeom prst="rect">
             <a:avLst/>
@@ -8606,8 +8222,12 @@
               </a:spcAft>
             </a:pPr>
             <a:r>
-              <a:rPr lang="nl-NL" dirty="0"/>
-              <a:t>Bij activiteit: nl.imow-gm0037.activiteit.2019000246</a:t>
+              <a:rPr lang="nl-NL" dirty="0">
+                <a:latin typeface="Calibri" panose="020F0502020204030204" pitchFamily="34" charset="0"/>
+                <a:ea typeface="Calibri" panose="020F0502020204030204" pitchFamily="34" charset="0"/>
+                <a:cs typeface="Times New Roman" panose="02020603050405020304" pitchFamily="18" charset="0"/>
+              </a:rPr>
+              <a:t>In de artikeltekst staat onder artikel 2.10:</a:t>
             </a:r>
           </a:p>
           <a:p>
@@ -8620,8 +8240,12 @@
               </a:spcAft>
             </a:pPr>
             <a:r>
-              <a:rPr lang="nl-NL" dirty="0"/>
-              <a:t>Met de naam: uitoefenen van detailhandel in ter plaatse vervaardigde goederen</a:t>
+              <a:rPr lang="nl-NL" dirty="0">
+                <a:latin typeface="Calibri" panose="020F0502020204030204" pitchFamily="34" charset="0"/>
+                <a:ea typeface="Calibri" panose="020F0502020204030204" pitchFamily="34" charset="0"/>
+                <a:cs typeface="Times New Roman" panose="02020603050405020304" pitchFamily="18" charset="0"/>
+              </a:rPr>
+              <a:t>l. het sporten;</a:t>
             </a:r>
           </a:p>
           <a:p>
@@ -8633,7 +8257,14 @@
                 <a:spcPts val="800"/>
               </a:spcAft>
             </a:pPr>
-            <a:endParaRPr lang="nl-NL" dirty="0"/>
+            <a:r>
+              <a:rPr lang="nl-NL" dirty="0">
+                <a:latin typeface="Calibri" panose="020F0502020204030204" pitchFamily="34" charset="0"/>
+                <a:ea typeface="Calibri" panose="020F0502020204030204" pitchFamily="34" charset="0"/>
+                <a:cs typeface="Times New Roman" panose="02020603050405020304" pitchFamily="18" charset="0"/>
+              </a:rPr>
+              <a:t>m. het wonen;</a:t>
+            </a:r>
           </a:p>
           <a:p>
             <a:pPr>
@@ -8645,8 +8276,12 @@
               </a:spcAft>
             </a:pPr>
             <a:r>
-              <a:rPr lang="nl-NL" dirty="0"/>
-              <a:t>De activiteitengroep: standplaatsactiviteit</a:t>
+              <a:rPr lang="nl-NL" dirty="0">
+                <a:latin typeface="Calibri" panose="020F0502020204030204" pitchFamily="34" charset="0"/>
+                <a:ea typeface="Calibri" panose="020F0502020204030204" pitchFamily="34" charset="0"/>
+                <a:cs typeface="Times New Roman" panose="02020603050405020304" pitchFamily="18" charset="0"/>
+              </a:rPr>
+              <a:t>n. het uitoefenen van een beroep aan huis;</a:t>
             </a:r>
           </a:p>
           <a:p>
@@ -8659,8 +8294,12 @@
               </a:spcAft>
             </a:pPr>
             <a:r>
-              <a:rPr lang="nl-NL" dirty="0"/>
-              <a:t>Aanpassen naar: exploitatieactiviteit detailhandel </a:t>
+              <a:rPr lang="nl-NL" dirty="0">
+                <a:latin typeface="Calibri" panose="020F0502020204030204" pitchFamily="34" charset="0"/>
+                <a:ea typeface="Calibri" panose="020F0502020204030204" pitchFamily="34" charset="0"/>
+                <a:cs typeface="Times New Roman" panose="02020603050405020304" pitchFamily="18" charset="0"/>
+              </a:rPr>
+              <a:t>o. het exploiteren van een aan de woonfunctie ondergeschikt bedrijf aan huis;</a:t>
             </a:r>
           </a:p>
           <a:p>
@@ -8693,27 +8332,27 @@
                 <a:ea typeface="Calibri" panose="020F0502020204030204" pitchFamily="34" charset="0"/>
                 <a:cs typeface="Times New Roman" panose="02020603050405020304" pitchFamily="18" charset="0"/>
               </a:rPr>
-              <a:t>20200611 – initieel is gewijzigd bij het invoegen van de </a:t>
-            </a:r>
-            <a:r>
-              <a:rPr lang="nl-NL" dirty="0" err="1">
-                <a:latin typeface="Calibri" panose="020F0502020204030204" pitchFamily="34" charset="0"/>
-                <a:ea typeface="Calibri" panose="020F0502020204030204" pitchFamily="34" charset="0"/>
-                <a:cs typeface="Times New Roman" panose="02020603050405020304" pitchFamily="18" charset="0"/>
-              </a:rPr>
-              <a:t>uri’s</a:t>
-            </a:r>
+              <a:t>Dit moet vertaald worden naar: </a:t>
+            </a:r>
+          </a:p>
+          <a:p>
+            <a:pPr marL="285750" indent="-285750">
+              <a:lnSpc>
+                <a:spcPct val="107000"/>
+              </a:lnSpc>
+              <a:spcAft>
+                <a:spcPts val="800"/>
+              </a:spcAft>
+              <a:buFont typeface="Arial" panose="020B0604020202020204" pitchFamily="34" charset="0"/>
+              <a:buChar char="•"/>
+            </a:pPr>
             <a:r>
               <a:rPr lang="nl-NL" dirty="0">
                 <a:latin typeface="Calibri" panose="020F0502020204030204" pitchFamily="34" charset="0"/>
                 <a:ea typeface="Calibri" panose="020F0502020204030204" pitchFamily="34" charset="0"/>
                 <a:cs typeface="Times New Roman" panose="02020603050405020304" pitchFamily="18" charset="0"/>
               </a:rPr>
-              <a:t>, was: </a:t>
-            </a:r>
-            <a:r>
-              <a:rPr lang="nl-NL" dirty="0"/>
-              <a:t>http://standaarden.omgevingswet.overheid.nl/activiteit/id/concept/ExploitatieactiviteitDetailhandel</a:t>
+              <a:t>vier activiteiten </a:t>
             </a:r>
           </a:p>
           <a:p>
@@ -8725,32 +8364,6 @@
                 <a:spcPts val="800"/>
               </a:spcAft>
             </a:pPr>
-            <a:r>
-              <a:rPr lang="nl-NL" dirty="0">
-                <a:latin typeface="Calibri" panose="020F0502020204030204" pitchFamily="34" charset="0"/>
-                <a:ea typeface="Calibri" panose="020F0502020204030204" pitchFamily="34" charset="0"/>
-                <a:cs typeface="Times New Roman" panose="02020603050405020304" pitchFamily="18" charset="0"/>
-              </a:rPr>
-              <a:t>Word: </a:t>
-            </a:r>
-          </a:p>
-          <a:p>
-            <a:pPr>
-              <a:lnSpc>
-                <a:spcPct val="107000"/>
-              </a:lnSpc>
-              <a:spcAft>
-                <a:spcPts val="800"/>
-              </a:spcAft>
-            </a:pPr>
-            <a:r>
-              <a:rPr lang="nl-NL" dirty="0"/>
-              <a:t>http://standaarden.omgevingswet.overheid.nl/activiteit/id/concept</a:t>
-            </a:r>
-            <a:r>
-              <a:rPr lang="nl-NL"/>
-              <a:t>/Standplaatsactiviteit</a:t>
-            </a:r>
             <a:endParaRPr lang="nl-NL" dirty="0">
               <a:latin typeface="Calibri" panose="020F0502020204030204" pitchFamily="34" charset="0"/>
               <a:ea typeface="Calibri" panose="020F0502020204030204" pitchFamily="34" charset="0"/>
@@ -8762,7 +8375,7 @@
     </p:spTree>
     <p:extLst>
       <p:ext uri="{BB962C8B-B14F-4D97-AF65-F5344CB8AC3E}">
-        <p14:creationId xmlns:p14="http://schemas.microsoft.com/office/powerpoint/2010/main" val="1655388816"/>
+        <p14:creationId xmlns:p14="http://schemas.microsoft.com/office/powerpoint/2010/main" val="1663178534"/>
       </p:ext>
     </p:extLst>
   </p:cSld>
@@ -8866,6 +8479,452 @@
 </file>
 
 <file path=ppt/slides/slide30.xml><?xml version="1.0" encoding="utf-8"?>
+<p:sld xmlns:a="http://schemas.openxmlformats.org/drawingml/2006/main" xmlns:r="http://schemas.openxmlformats.org/officeDocument/2006/relationships" xmlns:p="http://schemas.openxmlformats.org/presentationml/2006/main">
+  <p:cSld>
+    <p:spTree>
+      <p:nvGrpSpPr>
+        <p:cNvPr id="1" name=""/>
+        <p:cNvGrpSpPr/>
+        <p:nvPr/>
+      </p:nvGrpSpPr>
+      <p:grpSpPr>
+        <a:xfrm>
+          <a:off x="0" y="0"/>
+          <a:ext cx="0" cy="0"/>
+          <a:chOff x="0" y="0"/>
+          <a:chExt cx="0" cy="0"/>
+        </a:xfrm>
+      </p:grpSpPr>
+      <p:sp>
+        <p:nvSpPr>
+          <p:cNvPr id="2" name="Titel 1">
+            <a:extLst>
+              <a:ext uri="{FF2B5EF4-FFF2-40B4-BE49-F238E27FC236}">
+                <a16:creationId xmlns:a16="http://schemas.microsoft.com/office/drawing/2014/main" id="{C2A956C4-5E44-4751-B273-9E73A48D4496}"/>
+              </a:ext>
+            </a:extLst>
+          </p:cNvPr>
+          <p:cNvSpPr>
+            <a:spLocks noGrp="1"/>
+          </p:cNvSpPr>
+          <p:nvPr>
+            <p:ph type="title"/>
+          </p:nvPr>
+        </p:nvSpPr>
+        <p:spPr/>
+        <p:txBody>
+          <a:bodyPr/>
+          <a:lstStyle/>
+          <a:p>
+            <a:r>
+              <a:rPr lang="nl-NL" dirty="0"/>
+              <a:t>10f) aanpassen van activiteitengroep</a:t>
+            </a:r>
+          </a:p>
+        </p:txBody>
+      </p:sp>
+      <p:sp>
+        <p:nvSpPr>
+          <p:cNvPr id="6" name="Tijdelijke aanduiding voor inhoud 2">
+            <a:extLst>
+              <a:ext uri="{FF2B5EF4-FFF2-40B4-BE49-F238E27FC236}">
+                <a16:creationId xmlns:a16="http://schemas.microsoft.com/office/drawing/2014/main" id="{B22DD6BB-B5E9-46E5-B458-1F56FA4F59FD}"/>
+              </a:ext>
+            </a:extLst>
+          </p:cNvPr>
+          <p:cNvSpPr txBox="1">
+            <a:spLocks/>
+          </p:cNvSpPr>
+          <p:nvPr/>
+        </p:nvSpPr>
+        <p:spPr>
+          <a:xfrm>
+            <a:off x="838200" y="1690688"/>
+            <a:ext cx="10515600" cy="4351338"/>
+          </a:xfrm>
+          <a:prstGeom prst="rect">
+            <a:avLst/>
+          </a:prstGeom>
+        </p:spPr>
+        <p:txBody>
+          <a:bodyPr vert="horz" lIns="91440" tIns="45720" rIns="91440" bIns="45720" rtlCol="0">
+            <a:normAutofit/>
+          </a:bodyPr>
+          <a:lstStyle>
+            <a:lvl1pPr marL="228600" indent="-228600" algn="l" defTabSz="914400" rtl="0" eaLnBrk="1" latinLnBrk="0" hangingPunct="1">
+              <a:lnSpc>
+                <a:spcPct val="90000"/>
+              </a:lnSpc>
+              <a:spcBef>
+                <a:spcPts val="1000"/>
+              </a:spcBef>
+              <a:buFont typeface="Arial" panose="020B0604020202020204" pitchFamily="34" charset="0"/>
+              <a:buChar char="•"/>
+              <a:defRPr sz="2800" kern="1200">
+                <a:solidFill>
+                  <a:schemeClr val="tx1"/>
+                </a:solidFill>
+                <a:latin typeface="+mn-lt"/>
+                <a:ea typeface="+mn-ea"/>
+                <a:cs typeface="+mn-cs"/>
+              </a:defRPr>
+            </a:lvl1pPr>
+            <a:lvl2pPr marL="685800" indent="-228600" algn="l" defTabSz="914400" rtl="0" eaLnBrk="1" latinLnBrk="0" hangingPunct="1">
+              <a:lnSpc>
+                <a:spcPct val="90000"/>
+              </a:lnSpc>
+              <a:spcBef>
+                <a:spcPts val="500"/>
+              </a:spcBef>
+              <a:buFont typeface="Arial" panose="020B0604020202020204" pitchFamily="34" charset="0"/>
+              <a:buChar char="•"/>
+              <a:defRPr sz="2400" kern="1200">
+                <a:solidFill>
+                  <a:schemeClr val="tx1"/>
+                </a:solidFill>
+                <a:latin typeface="+mn-lt"/>
+                <a:ea typeface="+mn-ea"/>
+                <a:cs typeface="+mn-cs"/>
+              </a:defRPr>
+            </a:lvl2pPr>
+            <a:lvl3pPr marL="1143000" indent="-228600" algn="l" defTabSz="914400" rtl="0" eaLnBrk="1" latinLnBrk="0" hangingPunct="1">
+              <a:lnSpc>
+                <a:spcPct val="90000"/>
+              </a:lnSpc>
+              <a:spcBef>
+                <a:spcPts val="500"/>
+              </a:spcBef>
+              <a:buFont typeface="Arial" panose="020B0604020202020204" pitchFamily="34" charset="0"/>
+              <a:buChar char="•"/>
+              <a:defRPr sz="2000" kern="1200">
+                <a:solidFill>
+                  <a:schemeClr val="tx1"/>
+                </a:solidFill>
+                <a:latin typeface="+mn-lt"/>
+                <a:ea typeface="+mn-ea"/>
+                <a:cs typeface="+mn-cs"/>
+              </a:defRPr>
+            </a:lvl3pPr>
+            <a:lvl4pPr marL="1600200" indent="-228600" algn="l" defTabSz="914400" rtl="0" eaLnBrk="1" latinLnBrk="0" hangingPunct="1">
+              <a:lnSpc>
+                <a:spcPct val="90000"/>
+              </a:lnSpc>
+              <a:spcBef>
+                <a:spcPts val="500"/>
+              </a:spcBef>
+              <a:buFont typeface="Arial" panose="020B0604020202020204" pitchFamily="34" charset="0"/>
+              <a:buChar char="•"/>
+              <a:defRPr sz="1800" kern="1200">
+                <a:solidFill>
+                  <a:schemeClr val="tx1"/>
+                </a:solidFill>
+                <a:latin typeface="+mn-lt"/>
+                <a:ea typeface="+mn-ea"/>
+                <a:cs typeface="+mn-cs"/>
+              </a:defRPr>
+            </a:lvl4pPr>
+            <a:lvl5pPr marL="2057400" indent="-228600" algn="l" defTabSz="914400" rtl="0" eaLnBrk="1" latinLnBrk="0" hangingPunct="1">
+              <a:lnSpc>
+                <a:spcPct val="90000"/>
+              </a:lnSpc>
+              <a:spcBef>
+                <a:spcPts val="500"/>
+              </a:spcBef>
+              <a:buFont typeface="Arial" panose="020B0604020202020204" pitchFamily="34" charset="0"/>
+              <a:buChar char="•"/>
+              <a:defRPr sz="1800" kern="1200">
+                <a:solidFill>
+                  <a:schemeClr val="tx1"/>
+                </a:solidFill>
+                <a:latin typeface="+mn-lt"/>
+                <a:ea typeface="+mn-ea"/>
+                <a:cs typeface="+mn-cs"/>
+              </a:defRPr>
+            </a:lvl5pPr>
+            <a:lvl6pPr marL="2514600" indent="-228600" algn="l" defTabSz="914400" rtl="0" eaLnBrk="1" latinLnBrk="0" hangingPunct="1">
+              <a:lnSpc>
+                <a:spcPct val="90000"/>
+              </a:lnSpc>
+              <a:spcBef>
+                <a:spcPts val="500"/>
+              </a:spcBef>
+              <a:buFont typeface="Arial" panose="020B0604020202020204" pitchFamily="34" charset="0"/>
+              <a:buChar char="•"/>
+              <a:defRPr sz="1800" kern="1200">
+                <a:solidFill>
+                  <a:schemeClr val="tx1"/>
+                </a:solidFill>
+                <a:latin typeface="+mn-lt"/>
+                <a:ea typeface="+mn-ea"/>
+                <a:cs typeface="+mn-cs"/>
+              </a:defRPr>
+            </a:lvl6pPr>
+            <a:lvl7pPr marL="2971800" indent="-228600" algn="l" defTabSz="914400" rtl="0" eaLnBrk="1" latinLnBrk="0" hangingPunct="1">
+              <a:lnSpc>
+                <a:spcPct val="90000"/>
+              </a:lnSpc>
+              <a:spcBef>
+                <a:spcPts val="500"/>
+              </a:spcBef>
+              <a:buFont typeface="Arial" panose="020B0604020202020204" pitchFamily="34" charset="0"/>
+              <a:buChar char="•"/>
+              <a:defRPr sz="1800" kern="1200">
+                <a:solidFill>
+                  <a:schemeClr val="tx1"/>
+                </a:solidFill>
+                <a:latin typeface="+mn-lt"/>
+                <a:ea typeface="+mn-ea"/>
+                <a:cs typeface="+mn-cs"/>
+              </a:defRPr>
+            </a:lvl7pPr>
+            <a:lvl8pPr marL="3429000" indent="-228600" algn="l" defTabSz="914400" rtl="0" eaLnBrk="1" latinLnBrk="0" hangingPunct="1">
+              <a:lnSpc>
+                <a:spcPct val="90000"/>
+              </a:lnSpc>
+              <a:spcBef>
+                <a:spcPts val="500"/>
+              </a:spcBef>
+              <a:buFont typeface="Arial" panose="020B0604020202020204" pitchFamily="34" charset="0"/>
+              <a:buChar char="•"/>
+              <a:defRPr sz="1800" kern="1200">
+                <a:solidFill>
+                  <a:schemeClr val="tx1"/>
+                </a:solidFill>
+                <a:latin typeface="+mn-lt"/>
+                <a:ea typeface="+mn-ea"/>
+                <a:cs typeface="+mn-cs"/>
+              </a:defRPr>
+            </a:lvl8pPr>
+            <a:lvl9pPr marL="3886200" indent="-228600" algn="l" defTabSz="914400" rtl="0" eaLnBrk="1" latinLnBrk="0" hangingPunct="1">
+              <a:lnSpc>
+                <a:spcPct val="90000"/>
+              </a:lnSpc>
+              <a:spcBef>
+                <a:spcPts val="500"/>
+              </a:spcBef>
+              <a:buFont typeface="Arial" panose="020B0604020202020204" pitchFamily="34" charset="0"/>
+              <a:buChar char="•"/>
+              <a:defRPr sz="1800" kern="1200">
+                <a:solidFill>
+                  <a:schemeClr val="tx1"/>
+                </a:solidFill>
+                <a:latin typeface="+mn-lt"/>
+                <a:ea typeface="+mn-ea"/>
+                <a:cs typeface="+mn-cs"/>
+              </a:defRPr>
+            </a:lvl9pPr>
+          </a:lstStyle>
+          <a:p>
+            <a:endParaRPr lang="nl-NL" dirty="0"/>
+          </a:p>
+          <a:p>
+            <a:endParaRPr lang="nl-NL" i="1" dirty="0"/>
+          </a:p>
+        </p:txBody>
+      </p:sp>
+      <p:sp>
+        <p:nvSpPr>
+          <p:cNvPr id="7" name="Rechthoek 6">
+            <a:extLst>
+              <a:ext uri="{FF2B5EF4-FFF2-40B4-BE49-F238E27FC236}">
+                <a16:creationId xmlns:a16="http://schemas.microsoft.com/office/drawing/2014/main" id="{565ECE05-7E51-45EC-A3BA-409DC2F62804}"/>
+              </a:ext>
+            </a:extLst>
+          </p:cNvPr>
+          <p:cNvSpPr/>
+          <p:nvPr/>
+        </p:nvSpPr>
+        <p:spPr>
+          <a:xfrm>
+            <a:off x="838200" y="1690688"/>
+            <a:ext cx="6096000" cy="5049011"/>
+          </a:xfrm>
+          <a:prstGeom prst="rect">
+            <a:avLst/>
+          </a:prstGeom>
+        </p:spPr>
+        <p:txBody>
+          <a:bodyPr>
+            <a:spAutoFit/>
+          </a:bodyPr>
+          <a:lstStyle/>
+          <a:p>
+            <a:pPr>
+              <a:lnSpc>
+                <a:spcPct val="107000"/>
+              </a:lnSpc>
+              <a:spcAft>
+                <a:spcPts val="800"/>
+              </a:spcAft>
+            </a:pPr>
+            <a:r>
+              <a:rPr lang="nl-NL" dirty="0"/>
+              <a:t>Bij activiteit: nl.imow-gm0037.activiteit.2019000246</a:t>
+            </a:r>
+          </a:p>
+          <a:p>
+            <a:pPr>
+              <a:lnSpc>
+                <a:spcPct val="107000"/>
+              </a:lnSpc>
+              <a:spcAft>
+                <a:spcPts val="800"/>
+              </a:spcAft>
+            </a:pPr>
+            <a:r>
+              <a:rPr lang="nl-NL" dirty="0"/>
+              <a:t>Met de naam: uitoefenen van detailhandel in ter plaatse vervaardigde goederen</a:t>
+            </a:r>
+          </a:p>
+          <a:p>
+            <a:pPr>
+              <a:lnSpc>
+                <a:spcPct val="107000"/>
+              </a:lnSpc>
+              <a:spcAft>
+                <a:spcPts val="800"/>
+              </a:spcAft>
+            </a:pPr>
+            <a:endParaRPr lang="nl-NL" dirty="0"/>
+          </a:p>
+          <a:p>
+            <a:pPr>
+              <a:lnSpc>
+                <a:spcPct val="107000"/>
+              </a:lnSpc>
+              <a:spcAft>
+                <a:spcPts val="800"/>
+              </a:spcAft>
+            </a:pPr>
+            <a:r>
+              <a:rPr lang="nl-NL" dirty="0"/>
+              <a:t>De activiteitengroep: standplaatsactiviteit</a:t>
+            </a:r>
+          </a:p>
+          <a:p>
+            <a:pPr>
+              <a:lnSpc>
+                <a:spcPct val="107000"/>
+              </a:lnSpc>
+              <a:spcAft>
+                <a:spcPts val="800"/>
+              </a:spcAft>
+            </a:pPr>
+            <a:r>
+              <a:rPr lang="nl-NL" dirty="0"/>
+              <a:t>Aanpassen naar: exploitatieactiviteit detailhandel </a:t>
+            </a:r>
+          </a:p>
+          <a:p>
+            <a:pPr>
+              <a:lnSpc>
+                <a:spcPct val="107000"/>
+              </a:lnSpc>
+              <a:spcAft>
+                <a:spcPts val="800"/>
+              </a:spcAft>
+            </a:pPr>
+            <a:endParaRPr lang="nl-NL" dirty="0">
+              <a:latin typeface="Calibri" panose="020F0502020204030204" pitchFamily="34" charset="0"/>
+              <a:ea typeface="Calibri" panose="020F0502020204030204" pitchFamily="34" charset="0"/>
+              <a:cs typeface="Times New Roman" panose="02020603050405020304" pitchFamily="18" charset="0"/>
+            </a:endParaRPr>
+          </a:p>
+          <a:p>
+            <a:pPr>
+              <a:lnSpc>
+                <a:spcPct val="107000"/>
+              </a:lnSpc>
+              <a:spcAft>
+                <a:spcPts val="800"/>
+              </a:spcAft>
+            </a:pPr>
+            <a:r>
+              <a:rPr lang="nl-NL" dirty="0">
+                <a:latin typeface="Calibri" panose="020F0502020204030204" pitchFamily="34" charset="0"/>
+                <a:ea typeface="Calibri" panose="020F0502020204030204" pitchFamily="34" charset="0"/>
+                <a:cs typeface="Times New Roman" panose="02020603050405020304" pitchFamily="18" charset="0"/>
+              </a:rPr>
+              <a:t>20200611 – initieel is gewijzigd bij het invoegen van de </a:t>
+            </a:r>
+            <a:r>
+              <a:rPr lang="nl-NL" dirty="0" err="1">
+                <a:latin typeface="Calibri" panose="020F0502020204030204" pitchFamily="34" charset="0"/>
+                <a:ea typeface="Calibri" panose="020F0502020204030204" pitchFamily="34" charset="0"/>
+                <a:cs typeface="Times New Roman" panose="02020603050405020304" pitchFamily="18" charset="0"/>
+              </a:rPr>
+              <a:t>uri’s</a:t>
+            </a:r>
+            <a:r>
+              <a:rPr lang="nl-NL" dirty="0">
+                <a:latin typeface="Calibri" panose="020F0502020204030204" pitchFamily="34" charset="0"/>
+                <a:ea typeface="Calibri" panose="020F0502020204030204" pitchFamily="34" charset="0"/>
+                <a:cs typeface="Times New Roman" panose="02020603050405020304" pitchFamily="18" charset="0"/>
+              </a:rPr>
+              <a:t>, was: </a:t>
+            </a:r>
+            <a:r>
+              <a:rPr lang="nl-NL" dirty="0"/>
+              <a:t>http://standaarden.omgevingswet.overheid.nl/activiteit/id/concept/ExploitatieactiviteitDetailhandel</a:t>
+            </a:r>
+          </a:p>
+          <a:p>
+            <a:pPr>
+              <a:lnSpc>
+                <a:spcPct val="107000"/>
+              </a:lnSpc>
+              <a:spcAft>
+                <a:spcPts val="800"/>
+              </a:spcAft>
+            </a:pPr>
+            <a:r>
+              <a:rPr lang="nl-NL" dirty="0">
+                <a:latin typeface="Calibri" panose="020F0502020204030204" pitchFamily="34" charset="0"/>
+                <a:ea typeface="Calibri" panose="020F0502020204030204" pitchFamily="34" charset="0"/>
+                <a:cs typeface="Times New Roman" panose="02020603050405020304" pitchFamily="18" charset="0"/>
+              </a:rPr>
+              <a:t>Word: </a:t>
+            </a:r>
+          </a:p>
+          <a:p>
+            <a:pPr>
+              <a:lnSpc>
+                <a:spcPct val="107000"/>
+              </a:lnSpc>
+              <a:spcAft>
+                <a:spcPts val="800"/>
+              </a:spcAft>
+            </a:pPr>
+            <a:r>
+              <a:rPr lang="nl-NL" dirty="0"/>
+              <a:t>http://standaarden.omgevingswet.overheid.nl/activiteit/id/concept</a:t>
+            </a:r>
+            <a:r>
+              <a:rPr lang="nl-NL"/>
+              <a:t>/Standplaatsactiviteit</a:t>
+            </a:r>
+            <a:endParaRPr lang="nl-NL" dirty="0">
+              <a:latin typeface="Calibri" panose="020F0502020204030204" pitchFamily="34" charset="0"/>
+              <a:ea typeface="Calibri" panose="020F0502020204030204" pitchFamily="34" charset="0"/>
+              <a:cs typeface="Times New Roman" panose="02020603050405020304" pitchFamily="18" charset="0"/>
+            </a:endParaRPr>
+          </a:p>
+        </p:txBody>
+      </p:sp>
+    </p:spTree>
+    <p:extLst>
+      <p:ext uri="{BB962C8B-B14F-4D97-AF65-F5344CB8AC3E}">
+        <p14:creationId xmlns:p14="http://schemas.microsoft.com/office/powerpoint/2010/main" val="1655388816"/>
+      </p:ext>
+    </p:extLst>
+  </p:cSld>
+  <p:clrMapOvr>
+    <a:masterClrMapping/>
+  </p:clrMapOvr>
+</p:sld>
+</file>
+
+<file path=ppt/slides/slide31.xml><?xml version="1.0" encoding="utf-8"?>
 <p:sld xmlns:a="http://schemas.openxmlformats.org/drawingml/2006/main" xmlns:r="http://schemas.openxmlformats.org/officeDocument/2006/relationships" xmlns:p="http://schemas.openxmlformats.org/presentationml/2006/main">
   <p:cSld>
     <p:spTree>
@@ -10079,6 +10138,894 @@
           <p:cNvPr id="2" name="Titel 1">
             <a:extLst>
               <a:ext uri="{FF2B5EF4-FFF2-40B4-BE49-F238E27FC236}">
+                <a16:creationId xmlns:a16="http://schemas.microsoft.com/office/drawing/2014/main" id="{3FD3CBF0-BB74-4A2D-AFE3-A0243C0130EE}"/>
+              </a:ext>
+            </a:extLst>
+          </p:cNvPr>
+          <p:cNvSpPr>
+            <a:spLocks noGrp="1"/>
+          </p:cNvSpPr>
+          <p:nvPr>
+            <p:ph type="title"/>
+          </p:nvPr>
+        </p:nvSpPr>
+        <p:spPr/>
+        <p:txBody>
+          <a:bodyPr/>
+          <a:lstStyle/>
+          <a:p>
+            <a:r>
+              <a:rPr lang="nl-NL" dirty="0" err="1"/>
+              <a:t>Submutatiescenario’s</a:t>
+            </a:r>
+            <a:r>
+              <a:rPr lang="nl-NL" dirty="0"/>
+              <a:t> voor vandaag</a:t>
+            </a:r>
+          </a:p>
+        </p:txBody>
+      </p:sp>
+      <p:sp>
+        <p:nvSpPr>
+          <p:cNvPr id="5" name="Tekstvak 4">
+            <a:extLst>
+              <a:ext uri="{FF2B5EF4-FFF2-40B4-BE49-F238E27FC236}">
+                <a16:creationId xmlns:a16="http://schemas.microsoft.com/office/drawing/2014/main" id="{5B7F51E9-53AA-4353-AB2F-7A2F8FCE25F4}"/>
+              </a:ext>
+            </a:extLst>
+          </p:cNvPr>
+          <p:cNvSpPr txBox="1"/>
+          <p:nvPr/>
+        </p:nvSpPr>
+        <p:spPr>
+          <a:xfrm>
+            <a:off x="1173017" y="1825625"/>
+            <a:ext cx="9227127" cy="3970318"/>
+          </a:xfrm>
+          <a:prstGeom prst="rect">
+            <a:avLst/>
+          </a:prstGeom>
+          <a:noFill/>
+        </p:spPr>
+        <p:txBody>
+          <a:bodyPr wrap="square">
+            <a:spAutoFit/>
+          </a:bodyPr>
+          <a:lstStyle/>
+          <a:p>
+            <a:r>
+              <a:rPr lang="nl-NL" dirty="0"/>
+              <a:t>2. Wijziging artikelstructuur </a:t>
+            </a:r>
+            <a:br>
+              <a:rPr lang="nl-NL" dirty="0"/>
+            </a:br>
+            <a:r>
+              <a:rPr lang="nl-NL" dirty="0"/>
+              <a:t>(omwisselen, toevoegen, verwijderen)</a:t>
+            </a:r>
+          </a:p>
+          <a:p>
+            <a:pPr lvl="1"/>
+            <a:r>
+              <a:rPr lang="nl-NL" sz="2000" b="1" dirty="0">
+                <a:solidFill>
+                  <a:srgbClr val="00B050"/>
+                </a:solidFill>
+              </a:rPr>
+              <a:t>2a</a:t>
+            </a:r>
+            <a:r>
+              <a:rPr lang="nl-NL" sz="2000" b="1" dirty="0"/>
+              <a:t>) </a:t>
+            </a:r>
+            <a:r>
+              <a:rPr lang="nl-NL" sz="2000" dirty="0"/>
+              <a:t>verplaatsen van Artikel (2.5 naar 2.6).</a:t>
+            </a:r>
+          </a:p>
+          <a:p>
+            <a:pPr lvl="1"/>
+            <a:r>
+              <a:rPr lang="nl-NL" sz="2000" b="1" dirty="0">
+                <a:solidFill>
+                  <a:srgbClr val="00B050"/>
+                </a:solidFill>
+              </a:rPr>
+              <a:t>2b</a:t>
+            </a:r>
+            <a:r>
+              <a:rPr lang="nl-NL" sz="2000" b="1" dirty="0"/>
+              <a:t>) </a:t>
+            </a:r>
+            <a:r>
+              <a:rPr lang="nl-NL" sz="2000" dirty="0"/>
+              <a:t>verplaatsen van Artikel (2.6 naar 2.5). </a:t>
+            </a:r>
+          </a:p>
+          <a:p>
+            <a:pPr lvl="1"/>
+            <a:r>
+              <a:rPr lang="nl-NL" sz="2000" b="1" dirty="0">
+                <a:solidFill>
+                  <a:srgbClr val="00B050"/>
+                </a:solidFill>
+              </a:rPr>
+              <a:t>2c</a:t>
+            </a:r>
+            <a:r>
+              <a:rPr lang="nl-NL" sz="2000" b="1" dirty="0"/>
+              <a:t>) </a:t>
+            </a:r>
+            <a:r>
+              <a:rPr lang="nl-NL" sz="2000" dirty="0"/>
+              <a:t>verwijderen van Artikel 2.7 Lid 2</a:t>
+            </a:r>
+          </a:p>
+          <a:p>
+            <a:pPr lvl="1"/>
+            <a:r>
+              <a:rPr lang="nl-NL" sz="2000" b="1" dirty="0">
+                <a:solidFill>
+                  <a:srgbClr val="00B050"/>
+                </a:solidFill>
+              </a:rPr>
+              <a:t>2d</a:t>
+            </a:r>
+            <a:r>
+              <a:rPr lang="nl-NL" sz="2000" b="1" dirty="0"/>
+              <a:t>) </a:t>
+            </a:r>
+            <a:r>
+              <a:rPr lang="nl-NL" sz="2000" dirty="0"/>
+              <a:t>verwijderen  van Artikel 10.1</a:t>
+            </a:r>
+          </a:p>
+          <a:p>
+            <a:pPr lvl="1"/>
+            <a:r>
+              <a:rPr lang="nl-NL" sz="2000" b="1" dirty="0">
+                <a:solidFill>
+                  <a:srgbClr val="00B050"/>
+                </a:solidFill>
+              </a:rPr>
+              <a:t>2e</a:t>
+            </a:r>
+            <a:r>
+              <a:rPr lang="nl-NL" sz="2000" b="1" dirty="0"/>
+              <a:t>) </a:t>
+            </a:r>
+            <a:r>
+              <a:rPr lang="nl-NL" sz="2000" dirty="0"/>
+              <a:t>nieuw Artikel (10.1) toevoegen</a:t>
+            </a:r>
+            <a:br>
+              <a:rPr lang="nl-NL" sz="2000" dirty="0"/>
+            </a:br>
+            <a:endParaRPr lang="nl-NL" sz="2000" dirty="0"/>
+          </a:p>
+          <a:p>
+            <a:r>
+              <a:rPr lang="nl-NL" dirty="0"/>
+              <a:t>3. Wijziging regeltekst </a:t>
+            </a:r>
+            <a:br>
+              <a:rPr lang="nl-NL" dirty="0"/>
+            </a:br>
+            <a:r>
+              <a:rPr lang="nl-NL" dirty="0"/>
+              <a:t>(inhoudelijk artikelen wijzigen, incl. OW-impact)</a:t>
+            </a:r>
+          </a:p>
+          <a:p>
+            <a:pPr lvl="1"/>
+            <a:r>
+              <a:rPr lang="nl-NL" sz="2000" b="1" dirty="0">
+                <a:solidFill>
+                  <a:srgbClr val="00B050"/>
+                </a:solidFill>
+              </a:rPr>
+              <a:t>3a</a:t>
+            </a:r>
+            <a:r>
+              <a:rPr lang="nl-NL" sz="2000" dirty="0"/>
+              <a:t>) wijziging van de tekst van het artikel, zonder OW-implicaties</a:t>
+            </a:r>
+          </a:p>
+          <a:p>
+            <a:pPr lvl="1"/>
+            <a:r>
+              <a:rPr lang="nl-NL" sz="2000" b="1" dirty="0">
+                <a:solidFill>
+                  <a:srgbClr val="00B050"/>
+                </a:solidFill>
+              </a:rPr>
+              <a:t>3b</a:t>
+            </a:r>
+            <a:r>
+              <a:rPr lang="nl-NL" sz="2000" dirty="0"/>
+              <a:t>)</a:t>
+            </a:r>
+            <a:r>
+              <a:rPr lang="nl-NL" sz="2000" b="1" dirty="0"/>
+              <a:t> </a:t>
+            </a:r>
+            <a:r>
+              <a:rPr lang="nl-NL" sz="2000" dirty="0"/>
+              <a:t>wijziging van de tekst van het artikel, waarbij de activiteit wordt aangepast</a:t>
+            </a:r>
+          </a:p>
+          <a:p>
+            <a:pPr lvl="1"/>
+            <a:r>
+              <a:rPr lang="nl-NL" sz="2000" b="1" dirty="0">
+                <a:solidFill>
+                  <a:srgbClr val="00B050"/>
+                </a:solidFill>
+              </a:rPr>
+              <a:t>3c</a:t>
+            </a:r>
+            <a:r>
+              <a:rPr lang="nl-NL" sz="2000" dirty="0"/>
+              <a:t>)</a:t>
+            </a:r>
+            <a:r>
+              <a:rPr lang="nl-NL" sz="2000" b="1" dirty="0"/>
+              <a:t> </a:t>
+            </a:r>
+            <a:r>
+              <a:rPr lang="nl-NL" sz="2000" dirty="0"/>
+              <a:t>wijziging van de tekst van het artikel, inclusief het toevoegen van een GIO</a:t>
+            </a:r>
+          </a:p>
+        </p:txBody>
+      </p:sp>
+      <p:sp>
+        <p:nvSpPr>
+          <p:cNvPr id="6" name="Tekstvak 5">
+            <a:extLst>
+              <a:ext uri="{FF2B5EF4-FFF2-40B4-BE49-F238E27FC236}">
+                <a16:creationId xmlns:a16="http://schemas.microsoft.com/office/drawing/2014/main" id="{004A6D36-C3E9-4055-B449-D6E5105D7E5B}"/>
+              </a:ext>
+            </a:extLst>
+          </p:cNvPr>
+          <p:cNvSpPr txBox="1"/>
+          <p:nvPr/>
+        </p:nvSpPr>
+        <p:spPr>
+          <a:xfrm>
+            <a:off x="8709891" y="2022764"/>
+            <a:ext cx="3066472" cy="1477328"/>
+          </a:xfrm>
+          <a:prstGeom prst="rect">
+            <a:avLst/>
+          </a:prstGeom>
+        </p:spPr>
+        <p:style>
+          <a:lnRef idx="2">
+            <a:schemeClr val="dk1"/>
+          </a:lnRef>
+          <a:fillRef idx="1">
+            <a:schemeClr val="lt1"/>
+          </a:fillRef>
+          <a:effectRef idx="0">
+            <a:schemeClr val="dk1"/>
+          </a:effectRef>
+          <a:fontRef idx="minor">
+            <a:schemeClr val="dk1"/>
+          </a:fontRef>
+        </p:style>
+        <p:txBody>
+          <a:bodyPr wrap="square" rtlCol="0">
+            <a:spAutoFit/>
+          </a:bodyPr>
+          <a:lstStyle/>
+          <a:p>
+            <a:r>
+              <a:rPr lang="nl-NL" b="1" dirty="0"/>
+              <a:t>Legenda</a:t>
+            </a:r>
+          </a:p>
+          <a:p>
+            <a:r>
+              <a:rPr lang="nl-NL" b="1" dirty="0">
+                <a:solidFill>
+                  <a:schemeClr val="accent2"/>
+                </a:solidFill>
+              </a:rPr>
+              <a:t>Oranje</a:t>
+            </a:r>
+            <a:r>
+              <a:rPr lang="nl-NL" dirty="0"/>
+              <a:t> – voorbeeld klaar, nog niet gelukt in de keten</a:t>
+            </a:r>
+          </a:p>
+          <a:p>
+            <a:r>
+              <a:rPr lang="nl-NL" b="1" dirty="0">
+                <a:solidFill>
+                  <a:srgbClr val="00B050"/>
+                </a:solidFill>
+              </a:rPr>
+              <a:t>Groen</a:t>
+            </a:r>
+            <a:r>
+              <a:rPr lang="nl-NL" dirty="0"/>
+              <a:t> – gelukt in de keten</a:t>
+            </a:r>
+          </a:p>
+          <a:p>
+            <a:r>
+              <a:rPr lang="nl-NL" b="1" dirty="0">
+                <a:solidFill>
+                  <a:schemeClr val="accent3">
+                    <a:lumMod val="75000"/>
+                  </a:schemeClr>
+                </a:solidFill>
+              </a:rPr>
+              <a:t>Grijs</a:t>
+            </a:r>
+            <a:r>
+              <a:rPr lang="nl-NL" dirty="0"/>
+              <a:t> – voorbeeld niet klaar</a:t>
+            </a:r>
+          </a:p>
+        </p:txBody>
+      </p:sp>
+    </p:spTree>
+    <p:extLst>
+      <p:ext uri="{BB962C8B-B14F-4D97-AF65-F5344CB8AC3E}">
+        <p14:creationId xmlns:p14="http://schemas.microsoft.com/office/powerpoint/2010/main" val="2185472105"/>
+      </p:ext>
+    </p:extLst>
+  </p:cSld>
+  <p:clrMapOvr>
+    <a:masterClrMapping/>
+  </p:clrMapOvr>
+  <p:timing>
+    <p:tnLst>
+      <p:par>
+        <p:cTn id="1" dur="indefinite" restart="never" nodeType="tmRoot">
+          <p:childTnLst>
+            <p:seq concurrent="1" nextAc="seek">
+              <p:cTn id="2" dur="indefinite" nodeType="mainSeq">
+                <p:childTnLst>
+                  <p:par>
+                    <p:cTn id="3" fill="hold">
+                      <p:stCondLst>
+                        <p:cond delay="indefinite"/>
+                      </p:stCondLst>
+                      <p:childTnLst>
+                        <p:par>
+                          <p:cTn id="4" fill="hold">
+                            <p:stCondLst>
+                              <p:cond delay="0"/>
+                            </p:stCondLst>
+                            <p:childTnLst>
+                              <p:par>
+                                <p:cTn id="5" presetID="1" presetClass="entr" presetSubtype="0" fill="hold" grpId="0" nodeType="clickEffect">
+                                  <p:stCondLst>
+                                    <p:cond delay="0"/>
+                                  </p:stCondLst>
+                                  <p:childTnLst>
+                                    <p:set>
+                                      <p:cBhvr>
+                                        <p:cTn id="6" dur="1" fill="hold">
+                                          <p:stCondLst>
+                                            <p:cond delay="0"/>
+                                          </p:stCondLst>
+                                        </p:cTn>
+                                        <p:tgtEl>
+                                          <p:spTgt spid="6"/>
+                                        </p:tgtEl>
+                                        <p:attrNameLst>
+                                          <p:attrName>style.visibility</p:attrName>
+                                        </p:attrNameLst>
+                                      </p:cBhvr>
+                                      <p:to>
+                                        <p:strVal val="visible"/>
+                                      </p:to>
+                                    </p:set>
+                                  </p:childTnLst>
+                                </p:cTn>
+                              </p:par>
+                            </p:childTnLst>
+                          </p:cTn>
+                        </p:par>
+                      </p:childTnLst>
+                    </p:cTn>
+                  </p:par>
+                  <p:par>
+                    <p:cTn id="7" fill="hold">
+                      <p:stCondLst>
+                        <p:cond delay="indefinite"/>
+                      </p:stCondLst>
+                      <p:childTnLst>
+                        <p:par>
+                          <p:cTn id="8" fill="hold">
+                            <p:stCondLst>
+                              <p:cond delay="0"/>
+                            </p:stCondLst>
+                            <p:childTnLst>
+                              <p:par>
+                                <p:cTn id="9" presetID="1" presetClass="entr" presetSubtype="0" fill="hold" nodeType="clickEffect">
+                                  <p:stCondLst>
+                                    <p:cond delay="0"/>
+                                  </p:stCondLst>
+                                  <p:childTnLst>
+                                    <p:set>
+                                      <p:cBhvr>
+                                        <p:cTn id="10" dur="1" fill="hold">
+                                          <p:stCondLst>
+                                            <p:cond delay="0"/>
+                                          </p:stCondLst>
+                                        </p:cTn>
+                                        <p:tgtEl>
+                                          <p:spTgt spid="5">
+                                            <p:txEl>
+                                              <p:pRg st="1" end="1"/>
+                                            </p:txEl>
+                                          </p:spTgt>
+                                        </p:tgtEl>
+                                        <p:attrNameLst>
+                                          <p:attrName>style.visibility</p:attrName>
+                                        </p:attrNameLst>
+                                      </p:cBhvr>
+                                      <p:to>
+                                        <p:strVal val="visible"/>
+                                      </p:to>
+                                    </p:set>
+                                  </p:childTnLst>
+                                </p:cTn>
+                              </p:par>
+                            </p:childTnLst>
+                          </p:cTn>
+                        </p:par>
+                      </p:childTnLst>
+                    </p:cTn>
+                  </p:par>
+                  <p:par>
+                    <p:cTn id="11" fill="hold">
+                      <p:stCondLst>
+                        <p:cond delay="indefinite"/>
+                      </p:stCondLst>
+                      <p:childTnLst>
+                        <p:par>
+                          <p:cTn id="12" fill="hold">
+                            <p:stCondLst>
+                              <p:cond delay="0"/>
+                            </p:stCondLst>
+                            <p:childTnLst>
+                              <p:par>
+                                <p:cTn id="13" presetID="1" presetClass="entr" presetSubtype="0" fill="hold" nodeType="clickEffect">
+                                  <p:stCondLst>
+                                    <p:cond delay="0"/>
+                                  </p:stCondLst>
+                                  <p:childTnLst>
+                                    <p:set>
+                                      <p:cBhvr>
+                                        <p:cTn id="14" dur="1" fill="hold">
+                                          <p:stCondLst>
+                                            <p:cond delay="0"/>
+                                          </p:stCondLst>
+                                        </p:cTn>
+                                        <p:tgtEl>
+                                          <p:spTgt spid="5">
+                                            <p:txEl>
+                                              <p:pRg st="2" end="2"/>
+                                            </p:txEl>
+                                          </p:spTgt>
+                                        </p:tgtEl>
+                                        <p:attrNameLst>
+                                          <p:attrName>style.visibility</p:attrName>
+                                        </p:attrNameLst>
+                                      </p:cBhvr>
+                                      <p:to>
+                                        <p:strVal val="visible"/>
+                                      </p:to>
+                                    </p:set>
+                                  </p:childTnLst>
+                                </p:cTn>
+                              </p:par>
+                            </p:childTnLst>
+                          </p:cTn>
+                        </p:par>
+                      </p:childTnLst>
+                    </p:cTn>
+                  </p:par>
+                  <p:par>
+                    <p:cTn id="15" fill="hold">
+                      <p:stCondLst>
+                        <p:cond delay="indefinite"/>
+                      </p:stCondLst>
+                      <p:childTnLst>
+                        <p:par>
+                          <p:cTn id="16" fill="hold">
+                            <p:stCondLst>
+                              <p:cond delay="0"/>
+                            </p:stCondLst>
+                            <p:childTnLst>
+                              <p:par>
+                                <p:cTn id="17" presetID="1" presetClass="entr" presetSubtype="0" fill="hold" nodeType="clickEffect">
+                                  <p:stCondLst>
+                                    <p:cond delay="0"/>
+                                  </p:stCondLst>
+                                  <p:childTnLst>
+                                    <p:set>
+                                      <p:cBhvr>
+                                        <p:cTn id="18" dur="1" fill="hold">
+                                          <p:stCondLst>
+                                            <p:cond delay="0"/>
+                                          </p:stCondLst>
+                                        </p:cTn>
+                                        <p:tgtEl>
+                                          <p:spTgt spid="5">
+                                            <p:txEl>
+                                              <p:pRg st="3" end="3"/>
+                                            </p:txEl>
+                                          </p:spTgt>
+                                        </p:tgtEl>
+                                        <p:attrNameLst>
+                                          <p:attrName>style.visibility</p:attrName>
+                                        </p:attrNameLst>
+                                      </p:cBhvr>
+                                      <p:to>
+                                        <p:strVal val="visible"/>
+                                      </p:to>
+                                    </p:set>
+                                  </p:childTnLst>
+                                </p:cTn>
+                              </p:par>
+                            </p:childTnLst>
+                          </p:cTn>
+                        </p:par>
+                      </p:childTnLst>
+                    </p:cTn>
+                  </p:par>
+                  <p:par>
+                    <p:cTn id="19" fill="hold">
+                      <p:stCondLst>
+                        <p:cond delay="indefinite"/>
+                      </p:stCondLst>
+                      <p:childTnLst>
+                        <p:par>
+                          <p:cTn id="20" fill="hold">
+                            <p:stCondLst>
+                              <p:cond delay="0"/>
+                            </p:stCondLst>
+                            <p:childTnLst>
+                              <p:par>
+                                <p:cTn id="21" presetID="1" presetClass="entr" presetSubtype="0" fill="hold" nodeType="clickEffect">
+                                  <p:stCondLst>
+                                    <p:cond delay="0"/>
+                                  </p:stCondLst>
+                                  <p:childTnLst>
+                                    <p:set>
+                                      <p:cBhvr>
+                                        <p:cTn id="22" dur="1" fill="hold">
+                                          <p:stCondLst>
+                                            <p:cond delay="0"/>
+                                          </p:stCondLst>
+                                        </p:cTn>
+                                        <p:tgtEl>
+                                          <p:spTgt spid="5">
+                                            <p:txEl>
+                                              <p:pRg st="4" end="4"/>
+                                            </p:txEl>
+                                          </p:spTgt>
+                                        </p:tgtEl>
+                                        <p:attrNameLst>
+                                          <p:attrName>style.visibility</p:attrName>
+                                        </p:attrNameLst>
+                                      </p:cBhvr>
+                                      <p:to>
+                                        <p:strVal val="visible"/>
+                                      </p:to>
+                                    </p:set>
+                                  </p:childTnLst>
+                                </p:cTn>
+                              </p:par>
+                            </p:childTnLst>
+                          </p:cTn>
+                        </p:par>
+                      </p:childTnLst>
+                    </p:cTn>
+                  </p:par>
+                  <p:par>
+                    <p:cTn id="23" fill="hold">
+                      <p:stCondLst>
+                        <p:cond delay="indefinite"/>
+                      </p:stCondLst>
+                      <p:childTnLst>
+                        <p:par>
+                          <p:cTn id="24" fill="hold">
+                            <p:stCondLst>
+                              <p:cond delay="0"/>
+                            </p:stCondLst>
+                            <p:childTnLst>
+                              <p:par>
+                                <p:cTn id="25" presetID="1" presetClass="entr" presetSubtype="0" fill="hold" nodeType="clickEffect">
+                                  <p:stCondLst>
+                                    <p:cond delay="0"/>
+                                  </p:stCondLst>
+                                  <p:childTnLst>
+                                    <p:set>
+                                      <p:cBhvr>
+                                        <p:cTn id="26" dur="1" fill="hold">
+                                          <p:stCondLst>
+                                            <p:cond delay="0"/>
+                                          </p:stCondLst>
+                                        </p:cTn>
+                                        <p:tgtEl>
+                                          <p:spTgt spid="5">
+                                            <p:txEl>
+                                              <p:pRg st="5" end="5"/>
+                                            </p:txEl>
+                                          </p:spTgt>
+                                        </p:tgtEl>
+                                        <p:attrNameLst>
+                                          <p:attrName>style.visibility</p:attrName>
+                                        </p:attrNameLst>
+                                      </p:cBhvr>
+                                      <p:to>
+                                        <p:strVal val="visible"/>
+                                      </p:to>
+                                    </p:set>
+                                  </p:childTnLst>
+                                </p:cTn>
+                              </p:par>
+                            </p:childTnLst>
+                          </p:cTn>
+                        </p:par>
+                      </p:childTnLst>
+                    </p:cTn>
+                  </p:par>
+                  <p:par>
+                    <p:cTn id="27" fill="hold">
+                      <p:stCondLst>
+                        <p:cond delay="indefinite"/>
+                      </p:stCondLst>
+                      <p:childTnLst>
+                        <p:par>
+                          <p:cTn id="28" fill="hold">
+                            <p:stCondLst>
+                              <p:cond delay="0"/>
+                            </p:stCondLst>
+                            <p:childTnLst>
+                              <p:par>
+                                <p:cTn id="29" presetID="1" presetClass="entr" presetSubtype="0" fill="hold" nodeType="clickEffect">
+                                  <p:stCondLst>
+                                    <p:cond delay="0"/>
+                                  </p:stCondLst>
+                                  <p:childTnLst>
+                                    <p:set>
+                                      <p:cBhvr>
+                                        <p:cTn id="30" dur="1" fill="hold">
+                                          <p:stCondLst>
+                                            <p:cond delay="0"/>
+                                          </p:stCondLst>
+                                        </p:cTn>
+                                        <p:tgtEl>
+                                          <p:spTgt spid="5">
+                                            <p:txEl>
+                                              <p:pRg st="6" end="6"/>
+                                            </p:txEl>
+                                          </p:spTgt>
+                                        </p:tgtEl>
+                                        <p:attrNameLst>
+                                          <p:attrName>style.visibility</p:attrName>
+                                        </p:attrNameLst>
+                                      </p:cBhvr>
+                                      <p:to>
+                                        <p:strVal val="visible"/>
+                                      </p:to>
+                                    </p:set>
+                                  </p:childTnLst>
+                                </p:cTn>
+                              </p:par>
+                            </p:childTnLst>
+                          </p:cTn>
+                        </p:par>
+                      </p:childTnLst>
+                    </p:cTn>
+                  </p:par>
+                  <p:par>
+                    <p:cTn id="31" fill="hold">
+                      <p:stCondLst>
+                        <p:cond delay="indefinite"/>
+                      </p:stCondLst>
+                      <p:childTnLst>
+                        <p:par>
+                          <p:cTn id="32" fill="hold">
+                            <p:stCondLst>
+                              <p:cond delay="0"/>
+                            </p:stCondLst>
+                            <p:childTnLst>
+                              <p:par>
+                                <p:cTn id="33" presetID="1" presetClass="entr" presetSubtype="0" fill="hold" nodeType="clickEffect">
+                                  <p:stCondLst>
+                                    <p:cond delay="0"/>
+                                  </p:stCondLst>
+                                  <p:childTnLst>
+                                    <p:set>
+                                      <p:cBhvr>
+                                        <p:cTn id="34" dur="1" fill="hold">
+                                          <p:stCondLst>
+                                            <p:cond delay="0"/>
+                                          </p:stCondLst>
+                                        </p:cTn>
+                                        <p:tgtEl>
+                                          <p:spTgt spid="5">
+                                            <p:txEl>
+                                              <p:pRg st="7" end="7"/>
+                                            </p:txEl>
+                                          </p:spTgt>
+                                        </p:tgtEl>
+                                        <p:attrNameLst>
+                                          <p:attrName>style.visibility</p:attrName>
+                                        </p:attrNameLst>
+                                      </p:cBhvr>
+                                      <p:to>
+                                        <p:strVal val="visible"/>
+                                      </p:to>
+                                    </p:set>
+                                  </p:childTnLst>
+                                </p:cTn>
+                              </p:par>
+                            </p:childTnLst>
+                          </p:cTn>
+                        </p:par>
+                      </p:childTnLst>
+                    </p:cTn>
+                  </p:par>
+                  <p:par>
+                    <p:cTn id="35" fill="hold">
+                      <p:stCondLst>
+                        <p:cond delay="indefinite"/>
+                      </p:stCondLst>
+                      <p:childTnLst>
+                        <p:par>
+                          <p:cTn id="36" fill="hold">
+                            <p:stCondLst>
+                              <p:cond delay="0"/>
+                            </p:stCondLst>
+                            <p:childTnLst>
+                              <p:par>
+                                <p:cTn id="37" presetID="1" presetClass="entr" presetSubtype="0" fill="hold" nodeType="clickEffect">
+                                  <p:stCondLst>
+                                    <p:cond delay="0"/>
+                                  </p:stCondLst>
+                                  <p:childTnLst>
+                                    <p:set>
+                                      <p:cBhvr>
+                                        <p:cTn id="38" dur="1" fill="hold">
+                                          <p:stCondLst>
+                                            <p:cond delay="0"/>
+                                          </p:stCondLst>
+                                        </p:cTn>
+                                        <p:tgtEl>
+                                          <p:spTgt spid="5">
+                                            <p:txEl>
+                                              <p:pRg st="8" end="8"/>
+                                            </p:txEl>
+                                          </p:spTgt>
+                                        </p:tgtEl>
+                                        <p:attrNameLst>
+                                          <p:attrName>style.visibility</p:attrName>
+                                        </p:attrNameLst>
+                                      </p:cBhvr>
+                                      <p:to>
+                                        <p:strVal val="visible"/>
+                                      </p:to>
+                                    </p:set>
+                                  </p:childTnLst>
+                                </p:cTn>
+                              </p:par>
+                            </p:childTnLst>
+                          </p:cTn>
+                        </p:par>
+                      </p:childTnLst>
+                    </p:cTn>
+                  </p:par>
+                  <p:par>
+                    <p:cTn id="39" fill="hold">
+                      <p:stCondLst>
+                        <p:cond delay="indefinite"/>
+                      </p:stCondLst>
+                      <p:childTnLst>
+                        <p:par>
+                          <p:cTn id="40" fill="hold">
+                            <p:stCondLst>
+                              <p:cond delay="0"/>
+                            </p:stCondLst>
+                            <p:childTnLst>
+                              <p:par>
+                                <p:cTn id="41" presetID="1" presetClass="entr" presetSubtype="0" fill="hold" nodeType="clickEffect">
+                                  <p:stCondLst>
+                                    <p:cond delay="0"/>
+                                  </p:stCondLst>
+                                  <p:childTnLst>
+                                    <p:set>
+                                      <p:cBhvr>
+                                        <p:cTn id="42" dur="1" fill="hold">
+                                          <p:stCondLst>
+                                            <p:cond delay="0"/>
+                                          </p:stCondLst>
+                                        </p:cTn>
+                                        <p:tgtEl>
+                                          <p:spTgt spid="5">
+                                            <p:txEl>
+                                              <p:pRg st="9" end="9"/>
+                                            </p:txEl>
+                                          </p:spTgt>
+                                        </p:tgtEl>
+                                        <p:attrNameLst>
+                                          <p:attrName>style.visibility</p:attrName>
+                                        </p:attrNameLst>
+                                      </p:cBhvr>
+                                      <p:to>
+                                        <p:strVal val="visible"/>
+                                      </p:to>
+                                    </p:set>
+                                  </p:childTnLst>
+                                </p:cTn>
+                              </p:par>
+                            </p:childTnLst>
+                          </p:cTn>
+                        </p:par>
+                      </p:childTnLst>
+                    </p:cTn>
+                  </p:par>
+                </p:childTnLst>
+              </p:cTn>
+              <p:prevCondLst>
+                <p:cond evt="onPrev" delay="0">
+                  <p:tgtEl>
+                    <p:sldTgt/>
+                  </p:tgtEl>
+                </p:cond>
+              </p:prevCondLst>
+              <p:nextCondLst>
+                <p:cond evt="onNext" delay="0">
+                  <p:tgtEl>
+                    <p:sldTgt/>
+                  </p:tgtEl>
+                </p:cond>
+              </p:nextCondLst>
+            </p:seq>
+          </p:childTnLst>
+        </p:cTn>
+      </p:par>
+    </p:tnLst>
+    <p:bldLst>
+      <p:bldP spid="6" grpId="0" animBg="1"/>
+    </p:bldLst>
+  </p:timing>
+</p:sld>
+</file>
+
+<file path=ppt/slides/slide6.xml><?xml version="1.0" encoding="utf-8"?>
+<p:sld xmlns:a="http://schemas.openxmlformats.org/drawingml/2006/main" xmlns:r="http://schemas.openxmlformats.org/officeDocument/2006/relationships" xmlns:p="http://schemas.openxmlformats.org/presentationml/2006/main">
+  <p:cSld>
+    <p:spTree>
+      <p:nvGrpSpPr>
+        <p:cNvPr id="1" name=""/>
+        <p:cNvGrpSpPr/>
+        <p:nvPr/>
+      </p:nvGrpSpPr>
+      <p:grpSpPr>
+        <a:xfrm>
+          <a:off x="0" y="0"/>
+          <a:ext cx="0" cy="0"/>
+          <a:chOff x="0" y="0"/>
+          <a:chExt cx="0" cy="0"/>
+        </a:xfrm>
+      </p:grpSpPr>
+      <p:sp>
+        <p:nvSpPr>
+          <p:cNvPr id="2" name="Titel 1">
+            <a:extLst>
+              <a:ext uri="{FF2B5EF4-FFF2-40B4-BE49-F238E27FC236}">
                 <a16:creationId xmlns:a16="http://schemas.microsoft.com/office/drawing/2014/main" id="{27129C89-7845-483B-8CB8-D734B8CACF36}"/>
               </a:ext>
             </a:extLst>
@@ -10127,7 +11074,7 @@
         </p:spPr>
         <p:txBody>
           <a:bodyPr>
-            <a:normAutofit fontScale="62500" lnSpcReduction="20000"/>
+            <a:normAutofit fontScale="70000" lnSpcReduction="20000"/>
           </a:bodyPr>
           <a:lstStyle/>
           <a:p>
@@ -10155,7 +11102,7 @@
             <a:r>
               <a:rPr lang="nl-NL" sz="2000" b="1" dirty="0">
                 <a:solidFill>
-                  <a:schemeClr val="accent2"/>
+                  <a:srgbClr val="00B050"/>
                 </a:solidFill>
               </a:rPr>
               <a:t>2a</a:t>
@@ -10174,7 +11121,7 @@
             <a:r>
               <a:rPr lang="nl-NL" sz="2000" b="1" dirty="0">
                 <a:solidFill>
-                  <a:schemeClr val="accent2"/>
+                  <a:srgbClr val="00B050"/>
                 </a:solidFill>
               </a:rPr>
               <a:t>2b</a:t>
@@ -10193,7 +11140,7 @@
             <a:r>
               <a:rPr lang="nl-NL" sz="2000" b="1" dirty="0">
                 <a:solidFill>
-                  <a:schemeClr val="accent2"/>
+                  <a:srgbClr val="00B050"/>
                 </a:solidFill>
               </a:rPr>
               <a:t>2c</a:t>
@@ -10212,7 +11159,7 @@
             <a:r>
               <a:rPr lang="nl-NL" sz="2000" b="1" dirty="0">
                 <a:solidFill>
-                  <a:schemeClr val="accent2"/>
+                  <a:srgbClr val="00B050"/>
                 </a:solidFill>
               </a:rPr>
               <a:t>2d</a:t>
@@ -10223,7 +11170,7 @@
             </a:r>
             <a:r>
               <a:rPr lang="nl-NL" sz="2000" dirty="0"/>
-              <a:t>verwijderen  van Artikel 2.14</a:t>
+              <a:t>verwijderen  van Artikel 10.1</a:t>
             </a:r>
           </a:p>
           <a:p>
@@ -10231,7 +11178,7 @@
             <a:r>
               <a:rPr lang="nl-NL" sz="2000" b="1" dirty="0">
                 <a:solidFill>
-                  <a:schemeClr val="accent2"/>
+                  <a:srgbClr val="00B050"/>
                 </a:solidFill>
               </a:rPr>
               <a:t>2e</a:t>
@@ -10242,7 +11189,7 @@
             </a:r>
             <a:r>
               <a:rPr lang="nl-NL" sz="2000" dirty="0"/>
-              <a:t>nieuw Artikel (2.14) toevoegen</a:t>
+              <a:t>nieuw Artikel (10.1) toevoegen</a:t>
             </a:r>
           </a:p>
           <a:p>
@@ -10256,7 +11203,7 @@
             <a:r>
               <a:rPr lang="nl-NL" sz="2000" b="1" dirty="0">
                 <a:solidFill>
-                  <a:schemeClr val="accent2"/>
+                  <a:srgbClr val="00B050"/>
                 </a:solidFill>
               </a:rPr>
               <a:t>3a</a:t>
@@ -10274,21 +11221,6 @@
                   <a:srgbClr val="00B050"/>
                 </a:solidFill>
               </a:rPr>
-              <a:t>3a2</a:t>
-            </a:r>
-            <a:r>
-              <a:rPr lang="nl-NL" sz="2000" dirty="0"/>
-              <a:t>) toevoegen van een nieuw artikel, incl. OW-annotatie	</a:t>
-            </a:r>
-          </a:p>
-          <a:p>
-            <a:pPr lvl="1"/>
-            <a:r>
-              <a:rPr lang="nl-NL" sz="2000" b="1" dirty="0">
-                <a:solidFill>
-                  <a:srgbClr val="00B050"/>
-                </a:solidFill>
-              </a:rPr>
               <a:t>3b</a:t>
             </a:r>
             <a:r>
@@ -10428,7 +11360,7 @@
             <a:r>
               <a:rPr lang="nl-NL" sz="2000" b="1" dirty="0">
                 <a:solidFill>
-                  <a:schemeClr val="accent2"/>
+                  <a:srgbClr val="00B050"/>
                 </a:solidFill>
               </a:rPr>
               <a:t>10a</a:t>
@@ -10460,7 +11392,7 @@
             <a:r>
               <a:rPr lang="nl-NL" sz="2000" b="1" dirty="0">
                 <a:solidFill>
-                  <a:schemeClr val="accent2"/>
+                  <a:srgbClr val="00B050"/>
                 </a:solidFill>
               </a:rPr>
               <a:t>10c</a:t>
@@ -10492,7 +11424,7 @@
             <a:r>
               <a:rPr lang="nl-NL" sz="2000" b="1" dirty="0">
                 <a:solidFill>
-                  <a:schemeClr val="accent2"/>
+                  <a:srgbClr val="00B050"/>
                 </a:solidFill>
               </a:rPr>
               <a:t>10e</a:t>
@@ -10507,7 +11439,7 @@
             <a:r>
               <a:rPr lang="nl-NL" sz="2000" b="1" dirty="0">
                 <a:solidFill>
-                  <a:schemeClr val="accent2"/>
+                  <a:srgbClr val="00B050"/>
                 </a:solidFill>
               </a:rPr>
               <a:t>10f</a:t>
@@ -10807,7 +11739,7 @@
                                         <p:tgtEl>
                                           <p:spTgt spid="3">
                                             <p:txEl>
-                                              <p:pRg st="13" end="13"/>
+                                              <p:pRg st="12" end="12"/>
                                             </p:txEl>
                                           </p:spTgt>
                                         </p:tgtEl>
@@ -10856,7 +11788,7 @@
                                         <p:tgtEl>
                                           <p:spTgt spid="3">
                                             <p:txEl>
-                                              <p:pRg st="17" end="17"/>
+                                              <p:pRg st="16" end="16"/>
                                             </p:txEl>
                                           </p:spTgt>
                                         </p:tgtEl>
@@ -11319,7 +12251,7 @@
                                         <p:tgtEl>
                                           <p:spTgt spid="3">
                                             <p:txEl>
-                                              <p:pRg st="12" end="12"/>
+                                              <p:pRg st="13" end="13"/>
                                             </p:txEl>
                                           </p:spTgt>
                                         </p:tgtEl>
@@ -11466,7 +12398,7 @@
                                         <p:tgtEl>
                                           <p:spTgt spid="3">
                                             <p:txEl>
-                                              <p:pRg st="16" end="16"/>
+                                              <p:pRg st="17" end="17"/>
                                             </p:txEl>
                                           </p:spTgt>
                                         </p:tgtEl>
@@ -11481,26 +12413,39 @@
                                   </p:childTnLst>
                                 </p:cTn>
                               </p:par>
-                            </p:childTnLst>
-                          </p:cTn>
-                        </p:par>
-                      </p:childTnLst>
-                    </p:cTn>
-                  </p:par>
-                  <p:par>
-                    <p:cTn id="71" fill="hold">
-                      <p:stCondLst>
-                        <p:cond delay="indefinite"/>
-                      </p:stCondLst>
-                      <p:childTnLst>
-                        <p:par>
-                          <p:cTn id="72" fill="hold">
-                            <p:stCondLst>
-                              <p:cond delay="0"/>
-                            </p:stCondLst>
-                            <p:childTnLst>
                               <p:par>
-                                <p:cTn id="73" presetID="1" presetClass="entr" presetSubtype="0" fill="hold" nodeType="clickEffect">
+                                <p:cTn id="71" presetID="1" presetClass="entr" presetSubtype="0" fill="hold" nodeType="withEffect">
+                                  <p:stCondLst>
+                                    <p:cond delay="0"/>
+                                  </p:stCondLst>
+                                  <p:childTnLst>
+                                    <p:set>
+                                      <p:cBhvr>
+                                        <p:cTn id="72" dur="1" fill="hold">
+                                          <p:stCondLst>
+                                            <p:cond delay="0"/>
+                                          </p:stCondLst>
+                                        </p:cTn>
+                                        <p:tgtEl>
+                                          <p:spTgt spid="3">
+                                            <p:txEl>
+                                              <p:pRg st="18" end="18"/>
+                                            </p:txEl>
+                                          </p:spTgt>
+                                        </p:tgtEl>
+                                        <p:attrNameLst>
+                                          <p:attrName>style.visibility</p:attrName>
+                                        </p:attrNameLst>
+                                      </p:cBhvr>
+                                      <p:to>
+                                        <p:strVal val="visible"/>
+                                      </p:to>
+                                    </p:set>
+                                  </p:childTnLst>
+                                </p:cTn>
+                              </p:par>
+                              <p:par>
+                                <p:cTn id="73" presetID="1" presetClass="entr" presetSubtype="0" fill="hold" nodeType="withEffect">
                                   <p:stCondLst>
                                     <p:cond delay="0"/>
                                   </p:stCondLst>
@@ -11515,7 +12460,7 @@
                                         <p:tgtEl>
                                           <p:spTgt spid="3">
                                             <p:txEl>
-                                              <p:pRg st="18" end="18"/>
+                                              <p:pRg st="19" end="19"/>
                                             </p:txEl>
                                           </p:spTgt>
                                         </p:tgtEl>
@@ -11546,7 +12491,7 @@
                                         <p:tgtEl>
                                           <p:spTgt spid="3">
                                             <p:txEl>
-                                              <p:pRg st="19" end="19"/>
+                                              <p:pRg st="20" end="20"/>
                                             </p:txEl>
                                           </p:spTgt>
                                         </p:tgtEl>
@@ -11577,7 +12522,7 @@
                                         <p:tgtEl>
                                           <p:spTgt spid="3">
                                             <p:txEl>
-                                              <p:pRg st="20" end="20"/>
+                                              <p:pRg st="21" end="21"/>
                                             </p:txEl>
                                           </p:spTgt>
                                         </p:tgtEl>
@@ -11608,69 +12553,7 @@
                                         <p:tgtEl>
                                           <p:spTgt spid="3">
                                             <p:txEl>
-                                              <p:pRg st="21" end="21"/>
-                                            </p:txEl>
-                                          </p:spTgt>
-                                        </p:tgtEl>
-                                        <p:attrNameLst>
-                                          <p:attrName>style.visibility</p:attrName>
-                                        </p:attrNameLst>
-                                      </p:cBhvr>
-                                      <p:to>
-                                        <p:strVal val="visible"/>
-                                      </p:to>
-                                    </p:set>
-                                  </p:childTnLst>
-                                </p:cTn>
-                              </p:par>
-                              <p:par>
-                                <p:cTn id="81" presetID="1" presetClass="entr" presetSubtype="0" fill="hold" nodeType="withEffect">
-                                  <p:stCondLst>
-                                    <p:cond delay="0"/>
-                                  </p:stCondLst>
-                                  <p:childTnLst>
-                                    <p:set>
-                                      <p:cBhvr>
-                                        <p:cTn id="82" dur="1" fill="hold">
-                                          <p:stCondLst>
-                                            <p:cond delay="0"/>
-                                          </p:stCondLst>
-                                        </p:cTn>
-                                        <p:tgtEl>
-                                          <p:spTgt spid="3">
-                                            <p:txEl>
                                               <p:pRg st="22" end="22"/>
-                                            </p:txEl>
-                                          </p:spTgt>
-                                        </p:tgtEl>
-                                        <p:attrNameLst>
-                                          <p:attrName>style.visibility</p:attrName>
-                                        </p:attrNameLst>
-                                      </p:cBhvr>
-                                      <p:to>
-                                        <p:strVal val="visible"/>
-                                      </p:to>
-                                    </p:set>
-                                  </p:childTnLst>
-                                </p:cTn>
-                              </p:par>
-                              <p:par>
-                                <p:cTn id="83" presetID="1" presetClass="entr" presetSubtype="0" fill="hold" nodeType="withEffect">
-                                  <p:stCondLst>
-                                    <p:cond delay="0"/>
-                                  </p:stCondLst>
-                                  <p:childTnLst>
-                                    <p:set>
-                                      <p:cBhvr>
-                                        <p:cTn id="84" dur="1" fill="hold">
-                                          <p:stCondLst>
-                                            <p:cond delay="0"/>
-                                          </p:stCondLst>
-                                        </p:cTn>
-                                        <p:tgtEl>
-                                          <p:spTgt spid="3">
-                                            <p:txEl>
-                                              <p:pRg st="23" end="23"/>
                                             </p:txEl>
                                           </p:spTgt>
                                         </p:tgtEl>
@@ -11719,7 +12602,7 @@
 </p:sld>
 </file>
 
-<file path=ppt/slides/slide6.xml><?xml version="1.0" encoding="utf-8"?>
+<file path=ppt/slides/slide7.xml><?xml version="1.0" encoding="utf-8"?>
 <p:sld xmlns:a="http://schemas.openxmlformats.org/drawingml/2006/main" xmlns:r="http://schemas.openxmlformats.org/officeDocument/2006/relationships" xmlns:p="http://schemas.openxmlformats.org/presentationml/2006/main">
   <p:cSld>
     <p:spTree>
@@ -11816,7 +12699,7 @@
 </p:sld>
 </file>
 
-<file path=ppt/slides/slide7.xml><?xml version="1.0" encoding="utf-8"?>
+<file path=ppt/slides/slide8.xml><?xml version="1.0" encoding="utf-8"?>
 <p:sld xmlns:a="http://schemas.openxmlformats.org/drawingml/2006/main" xmlns:r="http://schemas.openxmlformats.org/officeDocument/2006/relationships" xmlns:p="http://schemas.openxmlformats.org/presentationml/2006/main">
   <p:cSld>
     <p:spTree>
@@ -12345,7 +13228,7 @@
 </p:sld>
 </file>
 
-<file path=ppt/slides/slide8.xml><?xml version="1.0" encoding="utf-8"?>
+<file path=ppt/slides/slide9.xml><?xml version="1.0" encoding="utf-8"?>
 <p:sld xmlns:a="http://schemas.openxmlformats.org/drawingml/2006/main" xmlns:r="http://schemas.openxmlformats.org/officeDocument/2006/relationships" xmlns:p="http://schemas.openxmlformats.org/presentationml/2006/main">
   <p:cSld>
     <p:spTree>
@@ -12933,64 +13816,6 @@
       </p:par>
     </p:tnLst>
   </p:timing>
-</p:sld>
-</file>
-
-<file path=ppt/slides/slide9.xml><?xml version="1.0" encoding="utf-8"?>
-<p:sld xmlns:a="http://schemas.openxmlformats.org/drawingml/2006/main" xmlns:r="http://schemas.openxmlformats.org/officeDocument/2006/relationships" xmlns:p="http://schemas.openxmlformats.org/presentationml/2006/main">
-  <p:cSld>
-    <p:spTree>
-      <p:nvGrpSpPr>
-        <p:cNvPr id="1" name=""/>
-        <p:cNvGrpSpPr/>
-        <p:nvPr/>
-      </p:nvGrpSpPr>
-      <p:grpSpPr>
-        <a:xfrm>
-          <a:off x="0" y="0"/>
-          <a:ext cx="0" cy="0"/>
-          <a:chOff x="0" y="0"/>
-          <a:chExt cx="0" cy="0"/>
-        </a:xfrm>
-      </p:grpSpPr>
-      <p:sp>
-        <p:nvSpPr>
-          <p:cNvPr id="2" name="Titel 1">
-            <a:extLst>
-              <a:ext uri="{FF2B5EF4-FFF2-40B4-BE49-F238E27FC236}">
-                <a16:creationId xmlns:a16="http://schemas.microsoft.com/office/drawing/2014/main" id="{7DAAB73D-5E6F-4868-B66D-AC2B7FA78951}"/>
-              </a:ext>
-            </a:extLst>
-          </p:cNvPr>
-          <p:cNvSpPr>
-            <a:spLocks noGrp="1"/>
-          </p:cNvSpPr>
-          <p:nvPr>
-            <p:ph type="title"/>
-          </p:nvPr>
-        </p:nvSpPr>
-        <p:spPr/>
-        <p:txBody>
-          <a:bodyPr/>
-          <a:lstStyle/>
-          <a:p>
-            <a:r>
-              <a:rPr lang="nl-NL" dirty="0"/>
-              <a:t>Beschrijving per scenario</a:t>
-            </a:r>
-          </a:p>
-        </p:txBody>
-      </p:sp>
-    </p:spTree>
-    <p:extLst>
-      <p:ext uri="{BB962C8B-B14F-4D97-AF65-F5344CB8AC3E}">
-        <p14:creationId xmlns:p14="http://schemas.microsoft.com/office/powerpoint/2010/main" val="875504885"/>
-      </p:ext>
-    </p:extLst>
-  </p:cSld>
-  <p:clrMapOvr>
-    <a:masterClrMapping/>
-  </p:clrMapOvr>
 </p:sld>
 </file>
 
@@ -13585,6 +14410,12 @@
 </file>
 
 <file path=customXml/item1.xml><?xml version="1.0" encoding="utf-8"?>
+<p:properties xmlns:p="http://schemas.microsoft.com/office/2006/metadata/properties" xmlns:xsi="http://www.w3.org/2001/XMLSchema-instance" xmlns:pc="http://schemas.microsoft.com/office/infopath/2007/PartnerControls">
+  <documentManagement/>
+</p:properties>
+</file>
+
+<file path=customXml/item2.xml><?xml version="1.0" encoding="utf-8"?>
 <ct:contentTypeSchema xmlns:ct="http://schemas.microsoft.com/office/2006/metadata/contentType" xmlns:ma="http://schemas.microsoft.com/office/2006/metadata/properties/metaAttributes" ct:_="" ma:_="" ma:contentTypeName="Document" ma:contentTypeID="0x0101003ADD3040E3157B4E913BCA65F34844D7" ma:contentTypeVersion="10" ma:contentTypeDescription="Een nieuw document maken." ma:contentTypeScope="" ma:versionID="c1765059aa1475931adc12138fdcfd8c">
   <xsd:schema xmlns:xsd="http://www.w3.org/2001/XMLSchema" xmlns:xs="http://www.w3.org/2001/XMLSchema" xmlns:p="http://schemas.microsoft.com/office/2006/metadata/properties" xmlns:ns2="aafb19fa-82be-411d-a6df-c75e9235a4ea" xmlns:ns3="3dfebdfe-2b22-40ba-8672-9fbc9b4066c4" targetNamespace="http://schemas.microsoft.com/office/2006/metadata/properties" ma:root="true" ma:fieldsID="42d79c55539af1f9f274032ce6041302" ns2:_="" ns3:_="">
     <xsd:import namespace="aafb19fa-82be-411d-a6df-c75e9235a4ea"/>
@@ -13787,12 +14618,6 @@
 </ct:contentTypeSchema>
 </file>
 
-<file path=customXml/item2.xml><?xml version="1.0" encoding="utf-8"?>
-<p:properties xmlns:p="http://schemas.microsoft.com/office/2006/metadata/properties" xmlns:xsi="http://www.w3.org/2001/XMLSchema-instance" xmlns:pc="http://schemas.microsoft.com/office/infopath/2007/PartnerControls">
-  <documentManagement/>
-</p:properties>
-</file>
-
 <file path=customXml/item3.xml><?xml version="1.0" encoding="utf-8"?>
 <?mso-contentType ?>
 <FormTemplates xmlns="http://schemas.microsoft.com/sharepoint/v3/contenttype/forms">
@@ -13803,6 +14628,23 @@
 </file>
 
 <file path=customXml/itemProps1.xml><?xml version="1.0" encoding="utf-8"?>
+<ds:datastoreItem xmlns:ds="http://schemas.openxmlformats.org/officeDocument/2006/customXml" ds:itemID="{44F744C1-7216-4F24-AF2B-C028C1AC510B}">
+  <ds:schemaRefs>
+    <ds:schemaRef ds:uri="http://purl.org/dc/elements/1.1/"/>
+    <ds:schemaRef ds:uri="http://purl.org/dc/terms/"/>
+    <ds:schemaRef ds:uri="3dfebdfe-2b22-40ba-8672-9fbc9b4066c4"/>
+    <ds:schemaRef ds:uri="http://www.w3.org/XML/1998/namespace"/>
+    <ds:schemaRef ds:uri="http://schemas.microsoft.com/office/2006/documentManagement/types"/>
+    <ds:schemaRef ds:uri="http://schemas.microsoft.com/office/2006/metadata/properties"/>
+    <ds:schemaRef ds:uri="http://purl.org/dc/dcmitype/"/>
+    <ds:schemaRef ds:uri="http://schemas.microsoft.com/office/infopath/2007/PartnerControls"/>
+    <ds:schemaRef ds:uri="http://schemas.openxmlformats.org/package/2006/metadata/core-properties"/>
+    <ds:schemaRef ds:uri="aafb19fa-82be-411d-a6df-c75e9235a4ea"/>
+  </ds:schemaRefs>
+</ds:datastoreItem>
+</file>
+
+<file path=customXml/itemProps2.xml><?xml version="1.0" encoding="utf-8"?>
 <ds:datastoreItem xmlns:ds="http://schemas.openxmlformats.org/officeDocument/2006/customXml" ds:itemID="{86B9146A-7E8D-43BD-BCDA-EAF916D7BF88}">
   <ds:schemaRefs>
     <ds:schemaRef ds:uri="http://schemas.microsoft.com/office/2006/metadata/contentType"/>
@@ -13821,23 +14663,6 @@
 </ds:datastoreItem>
 </file>
 
-<file path=customXml/itemProps2.xml><?xml version="1.0" encoding="utf-8"?>
-<ds:datastoreItem xmlns:ds="http://schemas.openxmlformats.org/officeDocument/2006/customXml" ds:itemID="{44F744C1-7216-4F24-AF2B-C028C1AC510B}">
-  <ds:schemaRefs>
-    <ds:schemaRef ds:uri="http://purl.org/dc/elements/1.1/"/>
-    <ds:schemaRef ds:uri="http://purl.org/dc/terms/"/>
-    <ds:schemaRef ds:uri="3dfebdfe-2b22-40ba-8672-9fbc9b4066c4"/>
-    <ds:schemaRef ds:uri="http://www.w3.org/XML/1998/namespace"/>
-    <ds:schemaRef ds:uri="http://schemas.microsoft.com/office/2006/documentManagement/types"/>
-    <ds:schemaRef ds:uri="http://schemas.microsoft.com/office/2006/metadata/properties"/>
-    <ds:schemaRef ds:uri="http://purl.org/dc/dcmitype/"/>
-    <ds:schemaRef ds:uri="http://schemas.microsoft.com/office/infopath/2007/PartnerControls"/>
-    <ds:schemaRef ds:uri="http://schemas.openxmlformats.org/package/2006/metadata/core-properties"/>
-    <ds:schemaRef ds:uri="aafb19fa-82be-411d-a6df-c75e9235a4ea"/>
-  </ds:schemaRefs>
-</ds:datastoreItem>
-</file>
-
 <file path=customXml/itemProps3.xml><?xml version="1.0" encoding="utf-8"?>
 <ds:datastoreItem xmlns:ds="http://schemas.openxmlformats.org/officeDocument/2006/customXml" ds:itemID="{F8CFDD08-2AF3-45C0-9BFB-55C0CB45D846}">
   <ds:schemaRefs>

</xml_diff>

<commit_message>
directe mutatie aangepast, en consolidatiemap netter gemaakt
</commit_message>
<xml_diff>
--- a/Submutatiescenario_s.pptx
+++ b/Submutatiescenario_s.pptx
@@ -312,7 +312,7 @@
           <a:p>
             <a:fld id="{2888003D-D75C-40B0-9BFD-C77ECDD13631}" type="datetimeFigureOut">
               <a:rPr lang="nl-NL" smtClean="0"/>
-              <a:t>8-3-2021</a:t>
+              <a:t>24-6-2021</a:t>
             </a:fld>
             <a:endParaRPr lang="nl-NL"/>
           </a:p>
@@ -810,7 +810,7 @@
           <a:p>
             <a:fld id="{02A6C647-4F39-4E22-BFA0-7A057A8C404A}" type="datetimeFigureOut">
               <a:rPr lang="nl-NL" smtClean="0"/>
-              <a:t>8-3-2021</a:t>
+              <a:t>24-6-2021</a:t>
             </a:fld>
             <a:endParaRPr lang="nl-NL"/>
           </a:p>
@@ -1008,7 +1008,7 @@
           <a:p>
             <a:fld id="{02A6C647-4F39-4E22-BFA0-7A057A8C404A}" type="datetimeFigureOut">
               <a:rPr lang="nl-NL" smtClean="0"/>
-              <a:t>8-3-2021</a:t>
+              <a:t>24-6-2021</a:t>
             </a:fld>
             <a:endParaRPr lang="nl-NL"/>
           </a:p>
@@ -1216,7 +1216,7 @@
           <a:p>
             <a:fld id="{02A6C647-4F39-4E22-BFA0-7A057A8C404A}" type="datetimeFigureOut">
               <a:rPr lang="nl-NL" smtClean="0"/>
-              <a:t>8-3-2021</a:t>
+              <a:t>24-6-2021</a:t>
             </a:fld>
             <a:endParaRPr lang="nl-NL"/>
           </a:p>
@@ -1414,7 +1414,7 @@
           <a:p>
             <a:fld id="{02A6C647-4F39-4E22-BFA0-7A057A8C404A}" type="datetimeFigureOut">
               <a:rPr lang="nl-NL" smtClean="0"/>
-              <a:t>8-3-2021</a:t>
+              <a:t>24-6-2021</a:t>
             </a:fld>
             <a:endParaRPr lang="nl-NL"/>
           </a:p>
@@ -1689,7 +1689,7 @@
           <a:p>
             <a:fld id="{02A6C647-4F39-4E22-BFA0-7A057A8C404A}" type="datetimeFigureOut">
               <a:rPr lang="nl-NL" smtClean="0"/>
-              <a:t>8-3-2021</a:t>
+              <a:t>24-6-2021</a:t>
             </a:fld>
             <a:endParaRPr lang="nl-NL"/>
           </a:p>
@@ -1954,7 +1954,7 @@
           <a:p>
             <a:fld id="{02A6C647-4F39-4E22-BFA0-7A057A8C404A}" type="datetimeFigureOut">
               <a:rPr lang="nl-NL" smtClean="0"/>
-              <a:t>8-3-2021</a:t>
+              <a:t>24-6-2021</a:t>
             </a:fld>
             <a:endParaRPr lang="nl-NL"/>
           </a:p>
@@ -2366,7 +2366,7 @@
           <a:p>
             <a:fld id="{02A6C647-4F39-4E22-BFA0-7A057A8C404A}" type="datetimeFigureOut">
               <a:rPr lang="nl-NL" smtClean="0"/>
-              <a:t>8-3-2021</a:t>
+              <a:t>24-6-2021</a:t>
             </a:fld>
             <a:endParaRPr lang="nl-NL"/>
           </a:p>
@@ -2507,7 +2507,7 @@
           <a:p>
             <a:fld id="{02A6C647-4F39-4E22-BFA0-7A057A8C404A}" type="datetimeFigureOut">
               <a:rPr lang="nl-NL" smtClean="0"/>
-              <a:t>8-3-2021</a:t>
+              <a:t>24-6-2021</a:t>
             </a:fld>
             <a:endParaRPr lang="nl-NL"/>
           </a:p>
@@ -2620,7 +2620,7 @@
           <a:p>
             <a:fld id="{02A6C647-4F39-4E22-BFA0-7A057A8C404A}" type="datetimeFigureOut">
               <a:rPr lang="nl-NL" smtClean="0"/>
-              <a:t>8-3-2021</a:t>
+              <a:t>24-6-2021</a:t>
             </a:fld>
             <a:endParaRPr lang="nl-NL"/>
           </a:p>
@@ -2931,7 +2931,7 @@
           <a:p>
             <a:fld id="{02A6C647-4F39-4E22-BFA0-7A057A8C404A}" type="datetimeFigureOut">
               <a:rPr lang="nl-NL" smtClean="0"/>
-              <a:t>8-3-2021</a:t>
+              <a:t>24-6-2021</a:t>
             </a:fld>
             <a:endParaRPr lang="nl-NL"/>
           </a:p>
@@ -3219,7 +3219,7 @@
           <a:p>
             <a:fld id="{02A6C647-4F39-4E22-BFA0-7A057A8C404A}" type="datetimeFigureOut">
               <a:rPr lang="nl-NL" smtClean="0"/>
-              <a:t>8-3-2021</a:t>
+              <a:t>24-6-2021</a:t>
             </a:fld>
             <a:endParaRPr lang="nl-NL"/>
           </a:p>
@@ -3460,7 +3460,7 @@
           <a:p>
             <a:fld id="{02A6C647-4F39-4E22-BFA0-7A057A8C404A}" type="datetimeFigureOut">
               <a:rPr lang="nl-NL" smtClean="0"/>
-              <a:t>8-3-2021</a:t>
+              <a:t>24-6-2021</a:t>
             </a:fld>
             <a:endParaRPr lang="nl-NL"/>
           </a:p>
@@ -7333,23 +7333,34 @@
           <a:p>
             <a:r>
               <a:rPr lang="nl-NL" dirty="0"/>
-              <a:t>B) vervangen van activiteit-locaties (al bestaande </a:t>
-            </a:r>
-            <a:r>
-              <a:rPr lang="nl-NL" dirty="0" err="1"/>
-              <a:t>GIO’s</a:t>
-            </a:r>
-            <a:r>
-              <a:rPr lang="nl-NL" dirty="0"/>
-              <a:t>)</a:t>
+              <a:t>B) beëindigen van activiteit</a:t>
             </a:r>
           </a:p>
           <a:p>
             <a:pPr lvl="1"/>
             <a:r>
-              <a:rPr lang="nl-NL" dirty="0"/>
-              <a:t>[TO-DO]</a:t>
-            </a:r>
+              <a:rPr lang="nl-NL" strike="sngStrike" dirty="0">
+                <a:solidFill>
+                  <a:srgbClr val="FF0000"/>
+                </a:solidFill>
+                <a:highlight>
+                  <a:srgbClr val="FFFFFF"/>
+                </a:highlight>
+              </a:rPr>
+              <a:t>opslaan van motorbrandstoffen niet zijnde lpg </a:t>
+            </a:r>
+            <a:r>
+              <a:rPr lang="nl-NL" dirty="0">
+                <a:solidFill>
+                  <a:srgbClr val="000000"/>
+                </a:solidFill>
+                <a:highlight>
+                  <a:srgbClr val="FFFFFF"/>
+                </a:highlight>
+              </a:rPr>
+              <a:t>laten beëindigen</a:t>
+            </a:r>
+            <a:endParaRPr lang="nl-NL" dirty="0"/>
           </a:p>
           <a:p>
             <a:r>
@@ -7398,8 +7409,29 @@
           <a:p>
             <a:pPr lvl="1"/>
             <a:r>
+              <a:rPr lang="nl-NL" dirty="0">
+                <a:solidFill>
+                  <a:srgbClr val="000000"/>
+                </a:solidFill>
+                <a:highlight>
+                  <a:srgbClr val="FFFFFF"/>
+                </a:highlight>
+              </a:rPr>
+              <a:t>uitoefenen van bedrijfstypen van categorie 3 is</a:t>
+            </a:r>
+            <a:br>
+              <a:rPr lang="nl-NL" dirty="0">
+                <a:solidFill>
+                  <a:srgbClr val="000000"/>
+                </a:solidFill>
+                <a:highlight>
+                  <a:srgbClr val="FFFFFF"/>
+                </a:highlight>
+              </a:rPr>
+            </a:br>
+            <a:r>
               <a:rPr lang="nl-NL" dirty="0"/>
-              <a:t>[TO-DO]</a:t>
+              <a:t>gerelateerd aan uitoefenen van detailhandel in ter plaatse vervaardigde goederen</a:t>
             </a:r>
           </a:p>
           <a:p>
@@ -14410,12 +14442,6 @@
 </file>
 
 <file path=customXml/item1.xml><?xml version="1.0" encoding="utf-8"?>
-<p:properties xmlns:p="http://schemas.microsoft.com/office/2006/metadata/properties" xmlns:xsi="http://www.w3.org/2001/XMLSchema-instance" xmlns:pc="http://schemas.microsoft.com/office/infopath/2007/PartnerControls">
-  <documentManagement/>
-</p:properties>
-</file>
-
-<file path=customXml/item2.xml><?xml version="1.0" encoding="utf-8"?>
 <ct:contentTypeSchema xmlns:ct="http://schemas.microsoft.com/office/2006/metadata/contentType" xmlns:ma="http://schemas.microsoft.com/office/2006/metadata/properties/metaAttributes" ct:_="" ma:_="" ma:contentTypeName="Document" ma:contentTypeID="0x0101003ADD3040E3157B4E913BCA65F34844D7" ma:contentTypeVersion="10" ma:contentTypeDescription="Een nieuw document maken." ma:contentTypeScope="" ma:versionID="c1765059aa1475931adc12138fdcfd8c">
   <xsd:schema xmlns:xsd="http://www.w3.org/2001/XMLSchema" xmlns:xs="http://www.w3.org/2001/XMLSchema" xmlns:p="http://schemas.microsoft.com/office/2006/metadata/properties" xmlns:ns2="aafb19fa-82be-411d-a6df-c75e9235a4ea" xmlns:ns3="3dfebdfe-2b22-40ba-8672-9fbc9b4066c4" targetNamespace="http://schemas.microsoft.com/office/2006/metadata/properties" ma:root="true" ma:fieldsID="42d79c55539af1f9f274032ce6041302" ns2:_="" ns3:_="">
     <xsd:import namespace="aafb19fa-82be-411d-a6df-c75e9235a4ea"/>
@@ -14618,6 +14644,12 @@
 </ct:contentTypeSchema>
 </file>
 
+<file path=customXml/item2.xml><?xml version="1.0" encoding="utf-8"?>
+<p:properties xmlns:p="http://schemas.microsoft.com/office/2006/metadata/properties" xmlns:xsi="http://www.w3.org/2001/XMLSchema-instance" xmlns:pc="http://schemas.microsoft.com/office/infopath/2007/PartnerControls">
+  <documentManagement/>
+</p:properties>
+</file>
+
 <file path=customXml/item3.xml><?xml version="1.0" encoding="utf-8"?>
 <?mso-contentType ?>
 <FormTemplates xmlns="http://schemas.microsoft.com/sharepoint/v3/contenttype/forms">
@@ -14628,23 +14660,6 @@
 </file>
 
 <file path=customXml/itemProps1.xml><?xml version="1.0" encoding="utf-8"?>
-<ds:datastoreItem xmlns:ds="http://schemas.openxmlformats.org/officeDocument/2006/customXml" ds:itemID="{44F744C1-7216-4F24-AF2B-C028C1AC510B}">
-  <ds:schemaRefs>
-    <ds:schemaRef ds:uri="http://purl.org/dc/elements/1.1/"/>
-    <ds:schemaRef ds:uri="http://purl.org/dc/terms/"/>
-    <ds:schemaRef ds:uri="3dfebdfe-2b22-40ba-8672-9fbc9b4066c4"/>
-    <ds:schemaRef ds:uri="http://www.w3.org/XML/1998/namespace"/>
-    <ds:schemaRef ds:uri="http://schemas.microsoft.com/office/2006/documentManagement/types"/>
-    <ds:schemaRef ds:uri="http://schemas.microsoft.com/office/2006/metadata/properties"/>
-    <ds:schemaRef ds:uri="http://purl.org/dc/dcmitype/"/>
-    <ds:schemaRef ds:uri="http://schemas.microsoft.com/office/infopath/2007/PartnerControls"/>
-    <ds:schemaRef ds:uri="http://schemas.openxmlformats.org/package/2006/metadata/core-properties"/>
-    <ds:schemaRef ds:uri="aafb19fa-82be-411d-a6df-c75e9235a4ea"/>
-  </ds:schemaRefs>
-</ds:datastoreItem>
-</file>
-
-<file path=customXml/itemProps2.xml><?xml version="1.0" encoding="utf-8"?>
 <ds:datastoreItem xmlns:ds="http://schemas.openxmlformats.org/officeDocument/2006/customXml" ds:itemID="{86B9146A-7E8D-43BD-BCDA-EAF916D7BF88}">
   <ds:schemaRefs>
     <ds:schemaRef ds:uri="http://schemas.microsoft.com/office/2006/metadata/contentType"/>
@@ -14663,6 +14678,23 @@
 </ds:datastoreItem>
 </file>
 
+<file path=customXml/itemProps2.xml><?xml version="1.0" encoding="utf-8"?>
+<ds:datastoreItem xmlns:ds="http://schemas.openxmlformats.org/officeDocument/2006/customXml" ds:itemID="{44F744C1-7216-4F24-AF2B-C028C1AC510B}">
+  <ds:schemaRefs>
+    <ds:schemaRef ds:uri="http://purl.org/dc/elements/1.1/"/>
+    <ds:schemaRef ds:uri="http://purl.org/dc/terms/"/>
+    <ds:schemaRef ds:uri="3dfebdfe-2b22-40ba-8672-9fbc9b4066c4"/>
+    <ds:schemaRef ds:uri="http://www.w3.org/XML/1998/namespace"/>
+    <ds:schemaRef ds:uri="http://schemas.microsoft.com/office/2006/documentManagement/types"/>
+    <ds:schemaRef ds:uri="http://schemas.microsoft.com/office/2006/metadata/properties"/>
+    <ds:schemaRef ds:uri="http://purl.org/dc/dcmitype/"/>
+    <ds:schemaRef ds:uri="http://schemas.microsoft.com/office/infopath/2007/PartnerControls"/>
+    <ds:schemaRef ds:uri="http://schemas.openxmlformats.org/package/2006/metadata/core-properties"/>
+    <ds:schemaRef ds:uri="aafb19fa-82be-411d-a6df-c75e9235a4ea"/>
+  </ds:schemaRefs>
+</ds:datastoreItem>
+</file>
+
 <file path=customXml/itemProps3.xml><?xml version="1.0" encoding="utf-8"?>
 <ds:datastoreItem xmlns:ds="http://schemas.openxmlformats.org/officeDocument/2006/customXml" ds:itemID="{F8CFDD08-2AF3-45C0-9BFB-55C0CB45D846}">
   <ds:schemaRefs>

</xml_diff>